<commit_message>
initial commit airports csv
</commit_message>
<xml_diff>
--- a/Team_3_Air_Travel_Weather_Satisfaction.pptx
+++ b/Team_3_Air_Travel_Weather_Satisfaction.pptx
@@ -140,7 +140,7 @@
   <pc:docChgLst>
     <pc:chgData name="Calogera McCormick" userId="e0a4c6cb4146cbe1" providerId="LiveId" clId="{43E20478-7581-4DD6-9A41-2D114A35964C}"/>
     <pc:docChg chg="undo custSel addSld modSld sldOrd">
-      <pc:chgData name="Calogera McCormick" userId="e0a4c6cb4146cbe1" providerId="LiveId" clId="{43E20478-7581-4DD6-9A41-2D114A35964C}" dt="2023-02-09T19:06:58.064" v="7682" actId="14100"/>
+      <pc:chgData name="Calogera McCormick" userId="e0a4c6cb4146cbe1" providerId="LiveId" clId="{43E20478-7581-4DD6-9A41-2D114A35964C}" dt="2023-02-09T20:12:21.314" v="7688" actId="1035"/>
       <pc:docMkLst>
         <pc:docMk/>
       </pc:docMkLst>
@@ -486,7 +486,7 @@
         </pc:spChg>
       </pc:sldChg>
       <pc:sldChg chg="addSp delSp modSp new mod modClrScheme chgLayout">
-        <pc:chgData name="Calogera McCormick" userId="e0a4c6cb4146cbe1" providerId="LiveId" clId="{43E20478-7581-4DD6-9A41-2D114A35964C}" dt="2023-02-09T17:08:41.034" v="7418" actId="403"/>
+        <pc:chgData name="Calogera McCormick" userId="e0a4c6cb4146cbe1" providerId="LiveId" clId="{43E20478-7581-4DD6-9A41-2D114A35964C}" dt="2023-02-09T20:08:33.190" v="7683" actId="14734"/>
         <pc:sldMkLst>
           <pc:docMk/>
           <pc:sldMk cId="2504695382" sldId="271"/>
@@ -556,7 +556,7 @@
           </ac:graphicFrameMkLst>
         </pc:graphicFrameChg>
         <pc:graphicFrameChg chg="add mod ord modGraphic">
-          <ac:chgData name="Calogera McCormick" userId="e0a4c6cb4146cbe1" providerId="LiveId" clId="{43E20478-7581-4DD6-9A41-2D114A35964C}" dt="2023-02-09T17:08:41.034" v="7418" actId="403"/>
+          <ac:chgData name="Calogera McCormick" userId="e0a4c6cb4146cbe1" providerId="LiveId" clId="{43E20478-7581-4DD6-9A41-2D114A35964C}" dt="2023-02-09T20:08:33.190" v="7683" actId="14734"/>
           <ac:graphicFrameMkLst>
             <pc:docMk/>
             <pc:sldMk cId="2504695382" sldId="271"/>
@@ -565,7 +565,7 @@
         </pc:graphicFrameChg>
       </pc:sldChg>
       <pc:sldChg chg="modSp add mod">
-        <pc:chgData name="Calogera McCormick" userId="e0a4c6cb4146cbe1" providerId="LiveId" clId="{43E20478-7581-4DD6-9A41-2D114A35964C}" dt="2023-02-09T19:06:58.064" v="7682" actId="14100"/>
+        <pc:chgData name="Calogera McCormick" userId="e0a4c6cb4146cbe1" providerId="LiveId" clId="{43E20478-7581-4DD6-9A41-2D114A35964C}" dt="2023-02-09T20:12:21.314" v="7688" actId="1035"/>
         <pc:sldMkLst>
           <pc:docMk/>
           <pc:sldMk cId="3040459613" sldId="272"/>
@@ -579,7 +579,7 @@
           </ac:spMkLst>
         </pc:spChg>
         <pc:graphicFrameChg chg="mod modGraphic">
-          <ac:chgData name="Calogera McCormick" userId="e0a4c6cb4146cbe1" providerId="LiveId" clId="{43E20478-7581-4DD6-9A41-2D114A35964C}" dt="2023-02-09T19:06:58.064" v="7682" actId="14100"/>
+          <ac:chgData name="Calogera McCormick" userId="e0a4c6cb4146cbe1" providerId="LiveId" clId="{43E20478-7581-4DD6-9A41-2D114A35964C}" dt="2023-02-09T20:12:21.314" v="7688" actId="1035"/>
           <ac:graphicFrameMkLst>
             <pc:docMk/>
             <pc:sldMk cId="3040459613" sldId="272"/>
@@ -642,7 +642,7 @@
           <a:noFill/>
           <a:extLst>
             <a:ext uri="{909E8E84-426E-40dd-AFC4-6F175D3DCCD1}">
-              <a14:hiddenFill xmlns:a14="http://schemas.microsoft.com/office/drawing/2010/main" xmlns="">
+              <a14:hiddenFill xmlns="" xmlns:a14="http://schemas.microsoft.com/office/drawing/2010/main">
                 <a:solidFill>
                   <a:srgbClr val="FFFFFF"/>
                 </a:solidFill>
@@ -702,7 +702,7 @@
             </a:ln>
             <a:extLst>
               <a:ext uri="{91240B29-F687-4f45-9708-019B960494DF}">
-                <a14:hiddenLine xmlns:a14="http://schemas.microsoft.com/office/drawing/2010/main" xmlns="" w="9525">
+                <a14:hiddenLine xmlns="" xmlns:a14="http://schemas.microsoft.com/office/drawing/2010/main" w="9525">
                   <a:solidFill>
                     <a:srgbClr val="000000"/>
                   </a:solidFill>
@@ -792,7 +792,7 @@
             </a:ln>
             <a:extLst>
               <a:ext uri="{91240B29-F687-4f45-9708-019B960494DF}">
-                <a14:hiddenLine xmlns:a14="http://schemas.microsoft.com/office/drawing/2010/main" xmlns="" w="9525">
+                <a14:hiddenLine xmlns="" xmlns:a14="http://schemas.microsoft.com/office/drawing/2010/main" w="9525">
                   <a:solidFill>
                     <a:srgbClr val="000000"/>
                   </a:solidFill>
@@ -882,7 +882,7 @@
             </a:ln>
             <a:extLst>
               <a:ext uri="{91240B29-F687-4f45-9708-019B960494DF}">
-                <a14:hiddenLine xmlns:a14="http://schemas.microsoft.com/office/drawing/2010/main" xmlns="" w="9525">
+                <a14:hiddenLine xmlns="" xmlns:a14="http://schemas.microsoft.com/office/drawing/2010/main" w="9525">
                   <a:solidFill>
                     <a:srgbClr val="000000"/>
                   </a:solidFill>
@@ -916,7 +916,7 @@
             </a:ln>
             <a:extLst>
               <a:ext uri="{91240B29-F687-4f45-9708-019B960494DF}">
-                <a14:hiddenLine xmlns:a14="http://schemas.microsoft.com/office/drawing/2010/main" xmlns="" w="9525">
+                <a14:hiddenLine xmlns="" xmlns:a14="http://schemas.microsoft.com/office/drawing/2010/main" w="9525">
                   <a:solidFill>
                     <a:srgbClr val="000000"/>
                   </a:solidFill>
@@ -1006,7 +1006,7 @@
             </a:ln>
             <a:extLst>
               <a:ext uri="{91240B29-F687-4f45-9708-019B960494DF}">
-                <a14:hiddenLine xmlns:a14="http://schemas.microsoft.com/office/drawing/2010/main" xmlns="" w="9525">
+                <a14:hiddenLine xmlns="" xmlns:a14="http://schemas.microsoft.com/office/drawing/2010/main" w="9525">
                   <a:solidFill>
                     <a:srgbClr val="000000"/>
                   </a:solidFill>
@@ -1068,7 +1068,7 @@
             </a:ln>
             <a:extLst>
               <a:ext uri="{91240B29-F687-4f45-9708-019B960494DF}">
-                <a14:hiddenLine xmlns:a14="http://schemas.microsoft.com/office/drawing/2010/main" xmlns="" w="9525">
+                <a14:hiddenLine xmlns="" xmlns:a14="http://schemas.microsoft.com/office/drawing/2010/main" w="9525">
                   <a:solidFill>
                     <a:srgbClr val="000000"/>
                   </a:solidFill>
@@ -1130,7 +1130,7 @@
             </a:ln>
             <a:extLst>
               <a:ext uri="{91240B29-F687-4f45-9708-019B960494DF}">
-                <a14:hiddenLine xmlns:a14="http://schemas.microsoft.com/office/drawing/2010/main" xmlns="" w="9525">
+                <a14:hiddenLine xmlns="" xmlns:a14="http://schemas.microsoft.com/office/drawing/2010/main" w="9525">
                   <a:solidFill>
                     <a:srgbClr val="000000"/>
                   </a:solidFill>
@@ -1220,7 +1220,7 @@
             </a:ln>
             <a:extLst>
               <a:ext uri="{91240B29-F687-4f45-9708-019B960494DF}">
-                <a14:hiddenLine xmlns:a14="http://schemas.microsoft.com/office/drawing/2010/main" xmlns="" w="9525">
+                <a14:hiddenLine xmlns="" xmlns:a14="http://schemas.microsoft.com/office/drawing/2010/main" w="9525">
                   <a:solidFill>
                     <a:srgbClr val="000000"/>
                   </a:solidFill>
@@ -1282,7 +1282,7 @@
             </a:ln>
             <a:extLst>
               <a:ext uri="{91240B29-F687-4f45-9708-019B960494DF}">
-                <a14:hiddenLine xmlns:a14="http://schemas.microsoft.com/office/drawing/2010/main" xmlns="" w="9525">
+                <a14:hiddenLine xmlns="" xmlns:a14="http://schemas.microsoft.com/office/drawing/2010/main" w="9525">
                   <a:solidFill>
                     <a:srgbClr val="000000"/>
                   </a:solidFill>
@@ -1344,7 +1344,7 @@
             </a:ln>
             <a:extLst>
               <a:ext uri="{91240B29-F687-4f45-9708-019B960494DF}">
-                <a14:hiddenLine xmlns:a14="http://schemas.microsoft.com/office/drawing/2010/main" xmlns="" w="9525">
+                <a14:hiddenLine xmlns="" xmlns:a14="http://schemas.microsoft.com/office/drawing/2010/main" w="9525">
                   <a:solidFill>
                     <a:srgbClr val="000000"/>
                   </a:solidFill>
@@ -1434,7 +1434,7 @@
             </a:ln>
             <a:extLst>
               <a:ext uri="{91240B29-F687-4f45-9708-019B960494DF}">
-                <a14:hiddenLine xmlns:a14="http://schemas.microsoft.com/office/drawing/2010/main" xmlns="" w="9525">
+                <a14:hiddenLine xmlns="" xmlns:a14="http://schemas.microsoft.com/office/drawing/2010/main" w="9525">
                   <a:solidFill>
                     <a:srgbClr val="000000"/>
                   </a:solidFill>
@@ -1524,7 +1524,7 @@
             </a:ln>
             <a:extLst>
               <a:ext uri="{91240B29-F687-4f45-9708-019B960494DF}">
-                <a14:hiddenLine xmlns:a14="http://schemas.microsoft.com/office/drawing/2010/main" xmlns="" w="9525">
+                <a14:hiddenLine xmlns="" xmlns:a14="http://schemas.microsoft.com/office/drawing/2010/main" w="9525">
                   <a:solidFill>
                     <a:srgbClr val="000000"/>
                   </a:solidFill>
@@ -1586,7 +1586,7 @@
             </a:ln>
             <a:extLst>
               <a:ext uri="{91240B29-F687-4f45-9708-019B960494DF}">
-                <a14:hiddenLine xmlns:a14="http://schemas.microsoft.com/office/drawing/2010/main" xmlns="" w="9525">
+                <a14:hiddenLine xmlns="" xmlns:a14="http://schemas.microsoft.com/office/drawing/2010/main" w="9525">
                   <a:solidFill>
                     <a:srgbClr val="000000"/>
                   </a:solidFill>
@@ -1696,7 +1696,7 @@
             </a:ln>
             <a:extLst>
               <a:ext uri="{91240B29-F687-4f45-9708-019B960494DF}">
-                <a14:hiddenLine xmlns:a14="http://schemas.microsoft.com/office/drawing/2010/main" xmlns="" w="9525">
+                <a14:hiddenLine xmlns="" xmlns:a14="http://schemas.microsoft.com/office/drawing/2010/main" w="9525">
                   <a:solidFill>
                     <a:srgbClr val="000000"/>
                   </a:solidFill>
@@ -1758,7 +1758,7 @@
             </a:ln>
             <a:extLst>
               <a:ext uri="{91240B29-F687-4f45-9708-019B960494DF}">
-                <a14:hiddenLine xmlns:a14="http://schemas.microsoft.com/office/drawing/2010/main" xmlns="" w="9525">
+                <a14:hiddenLine xmlns="" xmlns:a14="http://schemas.microsoft.com/office/drawing/2010/main" w="9525">
                   <a:solidFill>
                     <a:srgbClr val="000000"/>
                   </a:solidFill>
@@ -1848,7 +1848,7 @@
             </a:ln>
             <a:extLst>
               <a:ext uri="{91240B29-F687-4f45-9708-019B960494DF}">
-                <a14:hiddenLine xmlns:a14="http://schemas.microsoft.com/office/drawing/2010/main" xmlns="" w="9525">
+                <a14:hiddenLine xmlns="" xmlns:a14="http://schemas.microsoft.com/office/drawing/2010/main" w="9525">
                   <a:solidFill>
                     <a:srgbClr val="000000"/>
                   </a:solidFill>
@@ -1938,7 +1938,7 @@
             </a:ln>
             <a:extLst>
               <a:ext uri="{91240B29-F687-4f45-9708-019B960494DF}">
-                <a14:hiddenLine xmlns:a14="http://schemas.microsoft.com/office/drawing/2010/main" xmlns="" w="9525">
+                <a14:hiddenLine xmlns="" xmlns:a14="http://schemas.microsoft.com/office/drawing/2010/main" w="9525">
                   <a:solidFill>
                     <a:srgbClr val="000000"/>
                   </a:solidFill>
@@ -2000,7 +2000,7 @@
             </a:ln>
             <a:extLst>
               <a:ext uri="{91240B29-F687-4f45-9708-019B960494DF}">
-                <a14:hiddenLine xmlns:a14="http://schemas.microsoft.com/office/drawing/2010/main" xmlns="" w="9525">
+                <a14:hiddenLine xmlns="" xmlns:a14="http://schemas.microsoft.com/office/drawing/2010/main" w="9525">
                   <a:solidFill>
                     <a:srgbClr val="000000"/>
                   </a:solidFill>
@@ -2090,7 +2090,7 @@
             </a:ln>
             <a:extLst>
               <a:ext uri="{91240B29-F687-4f45-9708-019B960494DF}">
-                <a14:hiddenLine xmlns:a14="http://schemas.microsoft.com/office/drawing/2010/main" xmlns="" w="9525">
+                <a14:hiddenLine xmlns="" xmlns:a14="http://schemas.microsoft.com/office/drawing/2010/main" w="9525">
                   <a:solidFill>
                     <a:srgbClr val="000000"/>
                   </a:solidFill>
@@ -2180,7 +2180,7 @@
             </a:ln>
             <a:extLst>
               <a:ext uri="{91240B29-F687-4f45-9708-019B960494DF}">
-                <a14:hiddenLine xmlns:a14="http://schemas.microsoft.com/office/drawing/2010/main" xmlns="" w="9525">
+                <a14:hiddenLine xmlns="" xmlns:a14="http://schemas.microsoft.com/office/drawing/2010/main" w="9525">
                   <a:solidFill>
                     <a:srgbClr val="000000"/>
                   </a:solidFill>
@@ -2236,7 +2236,7 @@
             </a:ln>
             <a:extLst>
               <a:ext uri="{91240B29-F687-4f45-9708-019B960494DF}">
-                <a14:hiddenLine xmlns:a14="http://schemas.microsoft.com/office/drawing/2010/main" xmlns="" w="9525">
+                <a14:hiddenLine xmlns="" xmlns:a14="http://schemas.microsoft.com/office/drawing/2010/main" w="9525">
                   <a:solidFill>
                     <a:srgbClr val="000000"/>
                   </a:solidFill>
@@ -2326,7 +2326,7 @@
             </a:ln>
             <a:extLst>
               <a:ext uri="{91240B29-F687-4f45-9708-019B960494DF}">
-                <a14:hiddenLine xmlns:a14="http://schemas.microsoft.com/office/drawing/2010/main" xmlns="" w="9525">
+                <a14:hiddenLine xmlns="" xmlns:a14="http://schemas.microsoft.com/office/drawing/2010/main" w="9525">
                   <a:solidFill>
                     <a:srgbClr val="000000"/>
                   </a:solidFill>
@@ -2382,7 +2382,7 @@
             </a:ln>
             <a:extLst>
               <a:ext uri="{91240B29-F687-4f45-9708-019B960494DF}">
-                <a14:hiddenLine xmlns:a14="http://schemas.microsoft.com/office/drawing/2010/main" xmlns="" w="9525">
+                <a14:hiddenLine xmlns="" xmlns:a14="http://schemas.microsoft.com/office/drawing/2010/main" w="9525">
                   <a:solidFill>
                     <a:srgbClr val="000000"/>
                   </a:solidFill>
@@ -2472,7 +2472,7 @@
             </a:ln>
             <a:extLst>
               <a:ext uri="{91240B29-F687-4f45-9708-019B960494DF}">
-                <a14:hiddenLine xmlns:a14="http://schemas.microsoft.com/office/drawing/2010/main" xmlns="" w="9525">
+                <a14:hiddenLine xmlns="" xmlns:a14="http://schemas.microsoft.com/office/drawing/2010/main" w="9525">
                   <a:solidFill>
                     <a:srgbClr val="000000"/>
                   </a:solidFill>
@@ -2540,7 +2540,7 @@
             </a:ln>
             <a:extLst>
               <a:ext uri="{91240B29-F687-4f45-9708-019B960494DF}">
-                <a14:hiddenLine xmlns:a14="http://schemas.microsoft.com/office/drawing/2010/main" xmlns="" w="9525">
+                <a14:hiddenLine xmlns="" xmlns:a14="http://schemas.microsoft.com/office/drawing/2010/main" w="9525">
                   <a:solidFill>
                     <a:srgbClr val="000000"/>
                   </a:solidFill>
@@ -2630,7 +2630,7 @@
             </a:ln>
             <a:extLst>
               <a:ext uri="{91240B29-F687-4f45-9708-019B960494DF}">
-                <a14:hiddenLine xmlns:a14="http://schemas.microsoft.com/office/drawing/2010/main" xmlns="" w="9525">
+                <a14:hiddenLine xmlns="" xmlns:a14="http://schemas.microsoft.com/office/drawing/2010/main" w="9525">
                   <a:solidFill>
                     <a:srgbClr val="000000"/>
                   </a:solidFill>
@@ -2698,7 +2698,7 @@
             </a:ln>
             <a:extLst>
               <a:ext uri="{91240B29-F687-4f45-9708-019B960494DF}">
-                <a14:hiddenLine xmlns:a14="http://schemas.microsoft.com/office/drawing/2010/main" xmlns="" w="9525">
+                <a14:hiddenLine xmlns="" xmlns:a14="http://schemas.microsoft.com/office/drawing/2010/main" w="9525">
                   <a:solidFill>
                     <a:srgbClr val="000000"/>
                   </a:solidFill>
@@ -2788,7 +2788,7 @@
             </a:ln>
             <a:extLst>
               <a:ext uri="{91240B29-F687-4f45-9708-019B960494DF}">
-                <a14:hiddenLine xmlns:a14="http://schemas.microsoft.com/office/drawing/2010/main" xmlns="" w="9525">
+                <a14:hiddenLine xmlns="" xmlns:a14="http://schemas.microsoft.com/office/drawing/2010/main" w="9525">
                   <a:solidFill>
                     <a:srgbClr val="000000"/>
                   </a:solidFill>
@@ -2822,7 +2822,7 @@
             </a:ln>
             <a:extLst>
               <a:ext uri="{91240B29-F687-4f45-9708-019B960494DF}">
-                <a14:hiddenLine xmlns:a14="http://schemas.microsoft.com/office/drawing/2010/main" xmlns="" w="9525">
+                <a14:hiddenLine xmlns="" xmlns:a14="http://schemas.microsoft.com/office/drawing/2010/main" w="9525">
                   <a:solidFill>
                     <a:srgbClr val="000000"/>
                   </a:solidFill>
@@ -2912,7 +2912,7 @@
             </a:ln>
             <a:extLst>
               <a:ext uri="{91240B29-F687-4f45-9708-019B960494DF}">
-                <a14:hiddenLine xmlns:a14="http://schemas.microsoft.com/office/drawing/2010/main" xmlns="" w="9525">
+                <a14:hiddenLine xmlns="" xmlns:a14="http://schemas.microsoft.com/office/drawing/2010/main" w="9525">
                   <a:solidFill>
                     <a:srgbClr val="000000"/>
                   </a:solidFill>
@@ -2974,7 +2974,7 @@
             </a:ln>
             <a:extLst>
               <a:ext uri="{91240B29-F687-4f45-9708-019B960494DF}">
-                <a14:hiddenLine xmlns:a14="http://schemas.microsoft.com/office/drawing/2010/main" xmlns="" w="9525">
+                <a14:hiddenLine xmlns="" xmlns:a14="http://schemas.microsoft.com/office/drawing/2010/main" w="9525">
                   <a:solidFill>
                     <a:srgbClr val="000000"/>
                   </a:solidFill>
@@ -3036,7 +3036,7 @@
             </a:ln>
             <a:extLst>
               <a:ext uri="{91240B29-F687-4f45-9708-019B960494DF}">
-                <a14:hiddenLine xmlns:a14="http://schemas.microsoft.com/office/drawing/2010/main" xmlns="" w="9525">
+                <a14:hiddenLine xmlns="" xmlns:a14="http://schemas.microsoft.com/office/drawing/2010/main" w="9525">
                   <a:solidFill>
                     <a:srgbClr val="000000"/>
                   </a:solidFill>
@@ -3126,7 +3126,7 @@
             </a:ln>
             <a:extLst>
               <a:ext uri="{91240B29-F687-4f45-9708-019B960494DF}">
-                <a14:hiddenLine xmlns:a14="http://schemas.microsoft.com/office/drawing/2010/main" xmlns="" w="9525">
+                <a14:hiddenLine xmlns="" xmlns:a14="http://schemas.microsoft.com/office/drawing/2010/main" w="9525">
                   <a:solidFill>
                     <a:srgbClr val="000000"/>
                   </a:solidFill>
@@ -3194,7 +3194,7 @@
             </a:ln>
             <a:extLst>
               <a:ext uri="{91240B29-F687-4f45-9708-019B960494DF}">
-                <a14:hiddenLine xmlns:a14="http://schemas.microsoft.com/office/drawing/2010/main" xmlns="" w="9525">
+                <a14:hiddenLine xmlns="" xmlns:a14="http://schemas.microsoft.com/office/drawing/2010/main" w="9525">
                   <a:solidFill>
                     <a:srgbClr val="000000"/>
                   </a:solidFill>
@@ -3256,7 +3256,7 @@
             </a:ln>
             <a:extLst>
               <a:ext uri="{91240B29-F687-4f45-9708-019B960494DF}">
-                <a14:hiddenLine xmlns:a14="http://schemas.microsoft.com/office/drawing/2010/main" xmlns="" w="9525">
+                <a14:hiddenLine xmlns="" xmlns:a14="http://schemas.microsoft.com/office/drawing/2010/main" w="9525">
                   <a:solidFill>
                     <a:srgbClr val="000000"/>
                   </a:solidFill>
@@ -3346,7 +3346,7 @@
             </a:ln>
             <a:extLst>
               <a:ext uri="{91240B29-F687-4f45-9708-019B960494DF}">
-                <a14:hiddenLine xmlns:a14="http://schemas.microsoft.com/office/drawing/2010/main" xmlns="" w="9525">
+                <a14:hiddenLine xmlns="" xmlns:a14="http://schemas.microsoft.com/office/drawing/2010/main" w="9525">
                   <a:solidFill>
                     <a:srgbClr val="000000"/>
                   </a:solidFill>
@@ -3408,7 +3408,7 @@
             </a:ln>
             <a:extLst>
               <a:ext uri="{91240B29-F687-4f45-9708-019B960494DF}">
-                <a14:hiddenLine xmlns:a14="http://schemas.microsoft.com/office/drawing/2010/main" xmlns="" w="9525">
+                <a14:hiddenLine xmlns="" xmlns:a14="http://schemas.microsoft.com/office/drawing/2010/main" w="9525">
                   <a:solidFill>
                     <a:srgbClr val="000000"/>
                   </a:solidFill>
@@ -3498,7 +3498,7 @@
             </a:ln>
             <a:extLst>
               <a:ext uri="{91240B29-F687-4f45-9708-019B960494DF}">
-                <a14:hiddenLine xmlns:a14="http://schemas.microsoft.com/office/drawing/2010/main" xmlns="" w="9525">
+                <a14:hiddenLine xmlns="" xmlns:a14="http://schemas.microsoft.com/office/drawing/2010/main" w="9525">
                   <a:solidFill>
                     <a:srgbClr val="000000"/>
                   </a:solidFill>
@@ -3560,7 +3560,7 @@
             </a:ln>
             <a:extLst>
               <a:ext uri="{91240B29-F687-4f45-9708-019B960494DF}">
-                <a14:hiddenLine xmlns:a14="http://schemas.microsoft.com/office/drawing/2010/main" xmlns="" w="9525">
+                <a14:hiddenLine xmlns="" xmlns:a14="http://schemas.microsoft.com/office/drawing/2010/main" w="9525">
                   <a:solidFill>
                     <a:srgbClr val="000000"/>
                   </a:solidFill>
@@ -3650,7 +3650,7 @@
             </a:ln>
             <a:extLst>
               <a:ext uri="{91240B29-F687-4f45-9708-019B960494DF}">
-                <a14:hiddenLine xmlns:a14="http://schemas.microsoft.com/office/drawing/2010/main" xmlns="" w="9525">
+                <a14:hiddenLine xmlns="" xmlns:a14="http://schemas.microsoft.com/office/drawing/2010/main" w="9525">
                   <a:solidFill>
                     <a:srgbClr val="000000"/>
                   </a:solidFill>
@@ -3684,7 +3684,7 @@
             </a:ln>
             <a:extLst>
               <a:ext uri="{91240B29-F687-4f45-9708-019B960494DF}">
-                <a14:hiddenLine xmlns:a14="http://schemas.microsoft.com/office/drawing/2010/main" xmlns="" w="9525">
+                <a14:hiddenLine xmlns="" xmlns:a14="http://schemas.microsoft.com/office/drawing/2010/main" w="9525">
                   <a:solidFill>
                     <a:srgbClr val="000000"/>
                   </a:solidFill>
@@ -3749,7 +3749,7 @@
             </a:ln>
             <a:extLst>
               <a:ext uri="{91240B29-F687-4f45-9708-019B960494DF}">
-                <a14:hiddenLine xmlns:a14="http://schemas.microsoft.com/office/drawing/2010/main" xmlns="" w="9525">
+                <a14:hiddenLine xmlns="" xmlns:a14="http://schemas.microsoft.com/office/drawing/2010/main" w="9525">
                   <a:solidFill>
                     <a:srgbClr val="000000"/>
                   </a:solidFill>
@@ -3839,7 +3839,7 @@
             </a:ln>
             <a:extLst>
               <a:ext uri="{91240B29-F687-4f45-9708-019B960494DF}">
-                <a14:hiddenLine xmlns:a14="http://schemas.microsoft.com/office/drawing/2010/main" xmlns="" w="9525">
+                <a14:hiddenLine xmlns="" xmlns:a14="http://schemas.microsoft.com/office/drawing/2010/main" w="9525">
                   <a:solidFill>
                     <a:srgbClr val="000000"/>
                   </a:solidFill>
@@ -3901,7 +3901,7 @@
             </a:ln>
             <a:extLst>
               <a:ext uri="{91240B29-F687-4f45-9708-019B960494DF}">
-                <a14:hiddenLine xmlns:a14="http://schemas.microsoft.com/office/drawing/2010/main" xmlns="" w="9525">
+                <a14:hiddenLine xmlns="" xmlns:a14="http://schemas.microsoft.com/office/drawing/2010/main" w="9525">
                   <a:solidFill>
                     <a:srgbClr val="000000"/>
                   </a:solidFill>
@@ -3991,7 +3991,7 @@
             </a:ln>
             <a:extLst>
               <a:ext uri="{91240B29-F687-4f45-9708-019B960494DF}">
-                <a14:hiddenLine xmlns:a14="http://schemas.microsoft.com/office/drawing/2010/main" xmlns="" w="9525">
+                <a14:hiddenLine xmlns="" xmlns:a14="http://schemas.microsoft.com/office/drawing/2010/main" w="9525">
                   <a:solidFill>
                     <a:srgbClr val="000000"/>
                   </a:solidFill>
@@ -4081,7 +4081,7 @@
             </a:ln>
             <a:extLst>
               <a:ext uri="{91240B29-F687-4f45-9708-019B960494DF}">
-                <a14:hiddenLine xmlns:a14="http://schemas.microsoft.com/office/drawing/2010/main" xmlns="" w="9525">
+                <a14:hiddenLine xmlns="" xmlns:a14="http://schemas.microsoft.com/office/drawing/2010/main" w="9525">
                   <a:solidFill>
                     <a:srgbClr val="000000"/>
                   </a:solidFill>
@@ -4146,7 +4146,7 @@
             </a:ln>
             <a:extLst>
               <a:ext uri="{91240B29-F687-4f45-9708-019B960494DF}">
-                <a14:hiddenLine xmlns:a14="http://schemas.microsoft.com/office/drawing/2010/main" xmlns="" w="9525">
+                <a14:hiddenLine xmlns="" xmlns:a14="http://schemas.microsoft.com/office/drawing/2010/main" w="9525">
                   <a:solidFill>
                     <a:srgbClr val="000000"/>
                   </a:solidFill>
@@ -4208,7 +4208,7 @@
             </a:ln>
             <a:extLst>
               <a:ext uri="{91240B29-F687-4f45-9708-019B960494DF}">
-                <a14:hiddenLine xmlns:a14="http://schemas.microsoft.com/office/drawing/2010/main" xmlns="" w="9525">
+                <a14:hiddenLine xmlns="" xmlns:a14="http://schemas.microsoft.com/office/drawing/2010/main" w="9525">
                   <a:solidFill>
                     <a:srgbClr val="000000"/>
                   </a:solidFill>
@@ -4298,7 +4298,7 @@
             </a:ln>
             <a:extLst>
               <a:ext uri="{91240B29-F687-4f45-9708-019B960494DF}">
-                <a14:hiddenLine xmlns:a14="http://schemas.microsoft.com/office/drawing/2010/main" xmlns="" w="9525">
+                <a14:hiddenLine xmlns="" xmlns:a14="http://schemas.microsoft.com/office/drawing/2010/main" w="9525">
                   <a:solidFill>
                     <a:srgbClr val="000000"/>
                   </a:solidFill>
@@ -4388,7 +4388,7 @@
             </a:ln>
             <a:extLst>
               <a:ext uri="{91240B29-F687-4f45-9708-019B960494DF}">
-                <a14:hiddenLine xmlns:a14="http://schemas.microsoft.com/office/drawing/2010/main" xmlns="" w="9525">
+                <a14:hiddenLine xmlns="" xmlns:a14="http://schemas.microsoft.com/office/drawing/2010/main" w="9525">
                   <a:solidFill>
                     <a:srgbClr val="000000"/>
                   </a:solidFill>
@@ -4450,7 +4450,7 @@
             </a:ln>
             <a:extLst>
               <a:ext uri="{91240B29-F687-4f45-9708-019B960494DF}">
-                <a14:hiddenLine xmlns:a14="http://schemas.microsoft.com/office/drawing/2010/main" xmlns="" w="9525">
+                <a14:hiddenLine xmlns="" xmlns:a14="http://schemas.microsoft.com/office/drawing/2010/main" w="9525">
                   <a:solidFill>
                     <a:srgbClr val="000000"/>
                   </a:solidFill>
@@ -4570,7 +4570,7 @@
             </a:ln>
             <a:extLst>
               <a:ext uri="{91240B29-F687-4f45-9708-019B960494DF}">
-                <a14:hiddenLine xmlns:a14="http://schemas.microsoft.com/office/drawing/2010/main" xmlns="" w="9525">
+                <a14:hiddenLine xmlns="" xmlns:a14="http://schemas.microsoft.com/office/drawing/2010/main" w="9525">
                   <a:solidFill>
                     <a:srgbClr val="000000"/>
                   </a:solidFill>
@@ -4638,7 +4638,7 @@
             </a:ln>
             <a:extLst>
               <a:ext uri="{91240B29-F687-4f45-9708-019B960494DF}">
-                <a14:hiddenLine xmlns:a14="http://schemas.microsoft.com/office/drawing/2010/main" xmlns="" w="9525">
+                <a14:hiddenLine xmlns="" xmlns:a14="http://schemas.microsoft.com/office/drawing/2010/main" w="9525">
                   <a:solidFill>
                     <a:srgbClr val="000000"/>
                   </a:solidFill>
@@ -4728,7 +4728,7 @@
             </a:ln>
             <a:extLst>
               <a:ext uri="{91240B29-F687-4f45-9708-019B960494DF}">
-                <a14:hiddenLine xmlns:a14="http://schemas.microsoft.com/office/drawing/2010/main" xmlns="" w="9525">
+                <a14:hiddenLine xmlns="" xmlns:a14="http://schemas.microsoft.com/office/drawing/2010/main" w="9525">
                   <a:solidFill>
                     <a:srgbClr val="000000"/>
                   </a:solidFill>
@@ -4868,7 +4868,7 @@
           <a:p>
             <a:fld id="{C21E9E10-B59A-4E9D-AF95-0F4C2023A7FB}" type="datetimeFigureOut">
               <a:rPr lang="en-US" smtClean="0"/>
-              <a:t>2/8/2023</a:t>
+              <a:t>2/9/2023</a:t>
             </a:fld>
             <a:endParaRPr lang="en-US"/>
           </a:p>
@@ -5135,7 +5135,7 @@
           <a:p>
             <a:fld id="{C21E9E10-B59A-4E9D-AF95-0F4C2023A7FB}" type="datetimeFigureOut">
               <a:rPr lang="en-US" smtClean="0"/>
-              <a:t>2/8/2023</a:t>
+              <a:t>2/9/2023</a:t>
             </a:fld>
             <a:endParaRPr lang="en-US"/>
           </a:p>
@@ -5331,7 +5331,7 @@
           <a:p>
             <a:fld id="{C21E9E10-B59A-4E9D-AF95-0F4C2023A7FB}" type="datetimeFigureOut">
               <a:rPr lang="en-US" smtClean="0"/>
-              <a:t>2/8/2023</a:t>
+              <a:t>2/9/2023</a:t>
             </a:fld>
             <a:endParaRPr lang="en-US"/>
           </a:p>
@@ -5594,7 +5594,7 @@
           <a:p>
             <a:fld id="{C21E9E10-B59A-4E9D-AF95-0F4C2023A7FB}" type="datetimeFigureOut">
               <a:rPr lang="en-US" smtClean="0"/>
-              <a:t>2/8/2023</a:t>
+              <a:t>2/9/2023</a:t>
             </a:fld>
             <a:endParaRPr lang="en-US"/>
           </a:p>
@@ -6028,7 +6028,7 @@
           <a:p>
             <a:fld id="{C21E9E10-B59A-4E9D-AF95-0F4C2023A7FB}" type="datetimeFigureOut">
               <a:rPr lang="en-US" smtClean="0"/>
-              <a:t>2/8/2023</a:t>
+              <a:t>2/9/2023</a:t>
             </a:fld>
             <a:endParaRPr lang="en-US"/>
           </a:p>
@@ -6574,7 +6574,7 @@
           <a:p>
             <a:fld id="{C21E9E10-B59A-4E9D-AF95-0F4C2023A7FB}" type="datetimeFigureOut">
               <a:rPr lang="en-US" smtClean="0"/>
-              <a:t>2/8/2023</a:t>
+              <a:t>2/9/2023</a:t>
             </a:fld>
             <a:endParaRPr lang="en-US"/>
           </a:p>
@@ -7294,7 +7294,7 @@
           <a:p>
             <a:fld id="{C21E9E10-B59A-4E9D-AF95-0F4C2023A7FB}" type="datetimeFigureOut">
               <a:rPr lang="en-US" smtClean="0"/>
-              <a:t>2/8/2023</a:t>
+              <a:t>2/9/2023</a:t>
             </a:fld>
             <a:endParaRPr lang="en-US"/>
           </a:p>
@@ -7464,7 +7464,7 @@
           <a:p>
             <a:fld id="{C21E9E10-B59A-4E9D-AF95-0F4C2023A7FB}" type="datetimeFigureOut">
               <a:rPr lang="en-US" smtClean="0"/>
-              <a:t>2/8/2023</a:t>
+              <a:t>2/9/2023</a:t>
             </a:fld>
             <a:endParaRPr lang="en-US"/>
           </a:p>
@@ -7644,7 +7644,7 @@
           <a:p>
             <a:fld id="{C21E9E10-B59A-4E9D-AF95-0F4C2023A7FB}" type="datetimeFigureOut">
               <a:rPr lang="en-US" smtClean="0"/>
-              <a:t>2/8/2023</a:t>
+              <a:t>2/9/2023</a:t>
             </a:fld>
             <a:endParaRPr lang="en-US"/>
           </a:p>
@@ -7814,7 +7814,7 @@
           <a:p>
             <a:fld id="{C21E9E10-B59A-4E9D-AF95-0F4C2023A7FB}" type="datetimeFigureOut">
               <a:rPr lang="en-US" smtClean="0"/>
-              <a:t>2/8/2023</a:t>
+              <a:t>2/9/2023</a:t>
             </a:fld>
             <a:endParaRPr lang="en-US"/>
           </a:p>
@@ -8064,7 +8064,7 @@
           <a:p>
             <a:fld id="{C21E9E10-B59A-4E9D-AF95-0F4C2023A7FB}" type="datetimeFigureOut">
               <a:rPr lang="en-US" smtClean="0"/>
-              <a:t>2/8/2023</a:t>
+              <a:t>2/9/2023</a:t>
             </a:fld>
             <a:endParaRPr lang="en-US"/>
           </a:p>
@@ -8296,7 +8296,7 @@
           <a:p>
             <a:fld id="{C21E9E10-B59A-4E9D-AF95-0F4C2023A7FB}" type="datetimeFigureOut">
               <a:rPr lang="en-US" smtClean="0"/>
-              <a:t>2/8/2023</a:t>
+              <a:t>2/9/2023</a:t>
             </a:fld>
             <a:endParaRPr lang="en-US"/>
           </a:p>
@@ -8677,7 +8677,7 @@
           <a:p>
             <a:fld id="{C21E9E10-B59A-4E9D-AF95-0F4C2023A7FB}" type="datetimeFigureOut">
               <a:rPr lang="en-US" smtClean="0"/>
-              <a:t>2/8/2023</a:t>
+              <a:t>2/9/2023</a:t>
             </a:fld>
             <a:endParaRPr lang="en-US"/>
           </a:p>
@@ -8795,7 +8795,7 @@
           <a:p>
             <a:fld id="{C21E9E10-B59A-4E9D-AF95-0F4C2023A7FB}" type="datetimeFigureOut">
               <a:rPr lang="en-US" smtClean="0"/>
-              <a:t>2/8/2023</a:t>
+              <a:t>2/9/2023</a:t>
             </a:fld>
             <a:endParaRPr lang="en-US"/>
           </a:p>
@@ -8890,7 +8890,7 @@
           <a:p>
             <a:fld id="{C21E9E10-B59A-4E9D-AF95-0F4C2023A7FB}" type="datetimeFigureOut">
               <a:rPr lang="en-US" smtClean="0"/>
-              <a:t>2/8/2023</a:t>
+              <a:t>2/9/2023</a:t>
             </a:fld>
             <a:endParaRPr lang="en-US"/>
           </a:p>
@@ -9139,7 +9139,7 @@
           <a:p>
             <a:fld id="{C21E9E10-B59A-4E9D-AF95-0F4C2023A7FB}" type="datetimeFigureOut">
               <a:rPr lang="en-US" smtClean="0"/>
-              <a:t>2/8/2023</a:t>
+              <a:t>2/9/2023</a:t>
             </a:fld>
             <a:endParaRPr lang="en-US"/>
           </a:p>
@@ -9419,7 +9419,7 @@
           <a:p>
             <a:fld id="{C21E9E10-B59A-4E9D-AF95-0F4C2023A7FB}" type="datetimeFigureOut">
               <a:rPr lang="en-US" smtClean="0"/>
-              <a:t>2/8/2023</a:t>
+              <a:t>2/9/2023</a:t>
             </a:fld>
             <a:endParaRPr lang="en-US"/>
           </a:p>
@@ -9535,7 +9535,7 @@
           <a:noFill/>
           <a:extLst>
             <a:ext uri="{909E8E84-426E-40dd-AFC4-6F175D3DCCD1}">
-              <a14:hiddenFill xmlns:a14="http://schemas.microsoft.com/office/drawing/2010/main" xmlns="">
+              <a14:hiddenFill xmlns="" xmlns:a14="http://schemas.microsoft.com/office/drawing/2010/main">
                 <a:solidFill>
                   <a:srgbClr val="FFFFFF"/>
                 </a:solidFill>
@@ -9609,7 +9609,7 @@
               </a:ln>
               <a:extLst>
                 <a:ext uri="{91240B29-F687-4f45-9708-019B960494DF}">
-                  <a14:hiddenLine xmlns:a14="http://schemas.microsoft.com/office/drawing/2010/main" xmlns="" w="9525">
+                  <a14:hiddenLine xmlns="" xmlns:a14="http://schemas.microsoft.com/office/drawing/2010/main" w="9525">
                     <a:solidFill>
                       <a:srgbClr val="000000"/>
                     </a:solidFill>
@@ -9699,7 +9699,7 @@
               </a:ln>
               <a:extLst>
                 <a:ext uri="{91240B29-F687-4f45-9708-019B960494DF}">
-                  <a14:hiddenLine xmlns:a14="http://schemas.microsoft.com/office/drawing/2010/main" xmlns="" w="9525">
+                  <a14:hiddenLine xmlns="" xmlns:a14="http://schemas.microsoft.com/office/drawing/2010/main" w="9525">
                     <a:solidFill>
                       <a:srgbClr val="000000"/>
                     </a:solidFill>
@@ -9789,7 +9789,7 @@
               </a:ln>
               <a:extLst>
                 <a:ext uri="{91240B29-F687-4f45-9708-019B960494DF}">
-                  <a14:hiddenLine xmlns:a14="http://schemas.microsoft.com/office/drawing/2010/main" xmlns="" w="9525">
+                  <a14:hiddenLine xmlns="" xmlns:a14="http://schemas.microsoft.com/office/drawing/2010/main" w="9525">
                     <a:solidFill>
                       <a:srgbClr val="000000"/>
                     </a:solidFill>
@@ -9851,7 +9851,7 @@
               </a:ln>
               <a:extLst>
                 <a:ext uri="{91240B29-F687-4f45-9708-019B960494DF}">
-                  <a14:hiddenLine xmlns:a14="http://schemas.microsoft.com/office/drawing/2010/main" xmlns="" w="9525">
+                  <a14:hiddenLine xmlns="" xmlns:a14="http://schemas.microsoft.com/office/drawing/2010/main" w="9525">
                     <a:solidFill>
                       <a:srgbClr val="000000"/>
                     </a:solidFill>
@@ -9941,7 +9941,7 @@
               </a:ln>
               <a:extLst>
                 <a:ext uri="{91240B29-F687-4f45-9708-019B960494DF}">
-                  <a14:hiddenLine xmlns:a14="http://schemas.microsoft.com/office/drawing/2010/main" xmlns="" w="9525">
+                  <a14:hiddenLine xmlns="" xmlns:a14="http://schemas.microsoft.com/office/drawing/2010/main" w="9525">
                     <a:solidFill>
                       <a:srgbClr val="000000"/>
                     </a:solidFill>
@@ -10003,7 +10003,7 @@
               </a:ln>
               <a:extLst>
                 <a:ext uri="{91240B29-F687-4f45-9708-019B960494DF}">
-                  <a14:hiddenLine xmlns:a14="http://schemas.microsoft.com/office/drawing/2010/main" xmlns="" w="9525">
+                  <a14:hiddenLine xmlns="" xmlns:a14="http://schemas.microsoft.com/office/drawing/2010/main" w="9525">
                     <a:solidFill>
                       <a:srgbClr val="000000"/>
                     </a:solidFill>
@@ -10065,7 +10065,7 @@
               </a:ln>
               <a:extLst>
                 <a:ext uri="{91240B29-F687-4f45-9708-019B960494DF}">
-                  <a14:hiddenLine xmlns:a14="http://schemas.microsoft.com/office/drawing/2010/main" xmlns="" w="9525">
+                  <a14:hiddenLine xmlns="" xmlns:a14="http://schemas.microsoft.com/office/drawing/2010/main" w="9525">
                     <a:solidFill>
                       <a:srgbClr val="000000"/>
                     </a:solidFill>
@@ -10155,7 +10155,7 @@
               </a:ln>
               <a:extLst>
                 <a:ext uri="{91240B29-F687-4f45-9708-019B960494DF}">
-                  <a14:hiddenLine xmlns:a14="http://schemas.microsoft.com/office/drawing/2010/main" xmlns="" w="9525">
+                  <a14:hiddenLine xmlns="" xmlns:a14="http://schemas.microsoft.com/office/drawing/2010/main" w="9525">
                     <a:solidFill>
                       <a:srgbClr val="000000"/>
                     </a:solidFill>
@@ -10245,7 +10245,7 @@
               </a:ln>
               <a:extLst>
                 <a:ext uri="{91240B29-F687-4f45-9708-019B960494DF}">
-                  <a14:hiddenLine xmlns:a14="http://schemas.microsoft.com/office/drawing/2010/main" xmlns="" w="9525">
+                  <a14:hiddenLine xmlns="" xmlns:a14="http://schemas.microsoft.com/office/drawing/2010/main" w="9525">
                     <a:solidFill>
                       <a:srgbClr val="000000"/>
                     </a:solidFill>
@@ -10307,7 +10307,7 @@
               </a:ln>
               <a:extLst>
                 <a:ext uri="{91240B29-F687-4f45-9708-019B960494DF}">
-                  <a14:hiddenLine xmlns:a14="http://schemas.microsoft.com/office/drawing/2010/main" xmlns="" w="9525">
+                  <a14:hiddenLine xmlns="" xmlns:a14="http://schemas.microsoft.com/office/drawing/2010/main" w="9525">
                     <a:solidFill>
                       <a:srgbClr val="000000"/>
                     </a:solidFill>
@@ -10417,7 +10417,7 @@
               </a:ln>
               <a:extLst>
                 <a:ext uri="{91240B29-F687-4f45-9708-019B960494DF}">
-                  <a14:hiddenLine xmlns:a14="http://schemas.microsoft.com/office/drawing/2010/main" xmlns="" w="9525">
+                  <a14:hiddenLine xmlns="" xmlns:a14="http://schemas.microsoft.com/office/drawing/2010/main" w="9525">
                     <a:solidFill>
                       <a:srgbClr val="000000"/>
                     </a:solidFill>
@@ -10501,7 +10501,7 @@
               </a:ln>
               <a:extLst>
                 <a:ext uri="{91240B29-F687-4f45-9708-019B960494DF}">
-                  <a14:hiddenLine xmlns:a14="http://schemas.microsoft.com/office/drawing/2010/main" xmlns="" w="9525">
+                  <a14:hiddenLine xmlns="" xmlns:a14="http://schemas.microsoft.com/office/drawing/2010/main" w="9525">
                     <a:solidFill>
                       <a:srgbClr val="000000"/>
                     </a:solidFill>
@@ -10563,7 +10563,7 @@
               </a:ln>
               <a:extLst>
                 <a:ext uri="{91240B29-F687-4f45-9708-019B960494DF}">
-                  <a14:hiddenLine xmlns:a14="http://schemas.microsoft.com/office/drawing/2010/main" xmlns="" w="9525">
+                  <a14:hiddenLine xmlns="" xmlns:a14="http://schemas.microsoft.com/office/drawing/2010/main" w="9525">
                     <a:solidFill>
                       <a:srgbClr val="000000"/>
                     </a:solidFill>
@@ -10625,7 +10625,7 @@
               </a:ln>
               <a:extLst>
                 <a:ext uri="{91240B29-F687-4f45-9708-019B960494DF}">
-                  <a14:hiddenLine xmlns:a14="http://schemas.microsoft.com/office/drawing/2010/main" xmlns="" w="9525">
+                  <a14:hiddenLine xmlns="" xmlns:a14="http://schemas.microsoft.com/office/drawing/2010/main" w="9525">
                     <a:solidFill>
                       <a:srgbClr val="000000"/>
                     </a:solidFill>
@@ -10715,7 +10715,7 @@
               </a:ln>
               <a:extLst>
                 <a:ext uri="{91240B29-F687-4f45-9708-019B960494DF}">
-                  <a14:hiddenLine xmlns:a14="http://schemas.microsoft.com/office/drawing/2010/main" xmlns="" w="9525">
+                  <a14:hiddenLine xmlns="" xmlns:a14="http://schemas.microsoft.com/office/drawing/2010/main" w="9525">
                     <a:solidFill>
                       <a:srgbClr val="000000"/>
                     </a:solidFill>
@@ -10749,7 +10749,7 @@
               </a:ln>
               <a:extLst>
                 <a:ext uri="{91240B29-F687-4f45-9708-019B960494DF}">
-                  <a14:hiddenLine xmlns:a14="http://schemas.microsoft.com/office/drawing/2010/main" xmlns="" w="9525">
+                  <a14:hiddenLine xmlns="" xmlns:a14="http://schemas.microsoft.com/office/drawing/2010/main" w="9525">
                     <a:solidFill>
                       <a:srgbClr val="000000"/>
                     </a:solidFill>
@@ -10814,7 +10814,7 @@
               </a:ln>
               <a:extLst>
                 <a:ext uri="{91240B29-F687-4f45-9708-019B960494DF}">
-                  <a14:hiddenLine xmlns:a14="http://schemas.microsoft.com/office/drawing/2010/main" xmlns="" w="9525">
+                  <a14:hiddenLine xmlns="" xmlns:a14="http://schemas.microsoft.com/office/drawing/2010/main" w="9525">
                     <a:solidFill>
                       <a:srgbClr val="000000"/>
                     </a:solidFill>
@@ -10904,7 +10904,7 @@
               </a:ln>
               <a:extLst>
                 <a:ext uri="{91240B29-F687-4f45-9708-019B960494DF}">
-                  <a14:hiddenLine xmlns:a14="http://schemas.microsoft.com/office/drawing/2010/main" xmlns="" w="9525">
+                  <a14:hiddenLine xmlns="" xmlns:a14="http://schemas.microsoft.com/office/drawing/2010/main" w="9525">
                     <a:solidFill>
                       <a:srgbClr val="000000"/>
                     </a:solidFill>
@@ -10966,7 +10966,7 @@
               </a:ln>
               <a:extLst>
                 <a:ext uri="{91240B29-F687-4f45-9708-019B960494DF}">
-                  <a14:hiddenLine xmlns:a14="http://schemas.microsoft.com/office/drawing/2010/main" xmlns="" w="9525">
+                  <a14:hiddenLine xmlns="" xmlns:a14="http://schemas.microsoft.com/office/drawing/2010/main" w="9525">
                     <a:solidFill>
                       <a:srgbClr val="000000"/>
                     </a:solidFill>
@@ -11056,7 +11056,7 @@
               </a:ln>
               <a:extLst>
                 <a:ext uri="{91240B29-F687-4f45-9708-019B960494DF}">
-                  <a14:hiddenLine xmlns:a14="http://schemas.microsoft.com/office/drawing/2010/main" xmlns="" w="9525">
+                  <a14:hiddenLine xmlns="" xmlns:a14="http://schemas.microsoft.com/office/drawing/2010/main" w="9525">
                     <a:solidFill>
                       <a:srgbClr val="000000"/>
                     </a:solidFill>
@@ -11121,7 +11121,7 @@
               </a:ln>
               <a:extLst>
                 <a:ext uri="{91240B29-F687-4f45-9708-019B960494DF}">
-                  <a14:hiddenLine xmlns:a14="http://schemas.microsoft.com/office/drawing/2010/main" xmlns="" w="9525">
+                  <a14:hiddenLine xmlns="" xmlns:a14="http://schemas.microsoft.com/office/drawing/2010/main" w="9525">
                     <a:solidFill>
                       <a:srgbClr val="000000"/>
                     </a:solidFill>
@@ -11183,7 +11183,7 @@
               </a:ln>
               <a:extLst>
                 <a:ext uri="{91240B29-F687-4f45-9708-019B960494DF}">
-                  <a14:hiddenLine xmlns:a14="http://schemas.microsoft.com/office/drawing/2010/main" xmlns="" w="9525">
+                  <a14:hiddenLine xmlns="" xmlns:a14="http://schemas.microsoft.com/office/drawing/2010/main" w="9525">
                     <a:solidFill>
                       <a:srgbClr val="000000"/>
                     </a:solidFill>
@@ -11273,7 +11273,7 @@
               </a:ln>
               <a:extLst>
                 <a:ext uri="{91240B29-F687-4f45-9708-019B960494DF}">
-                  <a14:hiddenLine xmlns:a14="http://schemas.microsoft.com/office/drawing/2010/main" xmlns="" w="9525">
+                  <a14:hiddenLine xmlns="" xmlns:a14="http://schemas.microsoft.com/office/drawing/2010/main" w="9525">
                     <a:solidFill>
                       <a:srgbClr val="000000"/>
                     </a:solidFill>
@@ -11363,7 +11363,7 @@
               </a:ln>
               <a:extLst>
                 <a:ext uri="{91240B29-F687-4f45-9708-019B960494DF}">
-                  <a14:hiddenLine xmlns:a14="http://schemas.microsoft.com/office/drawing/2010/main" xmlns="" w="9525">
+                  <a14:hiddenLine xmlns="" xmlns:a14="http://schemas.microsoft.com/office/drawing/2010/main" w="9525">
                     <a:solidFill>
                       <a:srgbClr val="000000"/>
                     </a:solidFill>
@@ -11428,7 +11428,7 @@
               </a:ln>
               <a:extLst>
                 <a:ext uri="{91240B29-F687-4f45-9708-019B960494DF}">
-                  <a14:hiddenLine xmlns:a14="http://schemas.microsoft.com/office/drawing/2010/main" xmlns="" w="9525">
+                  <a14:hiddenLine xmlns="" xmlns:a14="http://schemas.microsoft.com/office/drawing/2010/main" w="9525">
                     <a:solidFill>
                       <a:srgbClr val="000000"/>
                     </a:solidFill>
@@ -11548,7 +11548,7 @@
               </a:ln>
               <a:extLst>
                 <a:ext uri="{91240B29-F687-4f45-9708-019B960494DF}">
-                  <a14:hiddenLine xmlns:a14="http://schemas.microsoft.com/office/drawing/2010/main" xmlns="" w="9525">
+                  <a14:hiddenLine xmlns="" xmlns:a14="http://schemas.microsoft.com/office/drawing/2010/main" w="9525">
                     <a:solidFill>
                       <a:srgbClr val="000000"/>
                     </a:solidFill>
@@ -11646,7 +11646,7 @@
               </a:ln>
               <a:extLst>
                 <a:ext uri="{91240B29-F687-4f45-9708-019B960494DF}">
-                  <a14:hiddenLine xmlns:a14="http://schemas.microsoft.com/office/drawing/2010/main" xmlns="" w="9525">
+                  <a14:hiddenLine xmlns="" xmlns:a14="http://schemas.microsoft.com/office/drawing/2010/main" w="9525">
                     <a:solidFill>
                       <a:srgbClr val="000000"/>
                     </a:solidFill>
@@ -11761,7 +11761,7 @@
               </a:ln>
               <a:extLst>
                 <a:ext uri="{91240B29-F687-4f45-9708-019B960494DF}">
-                  <a14:hiddenLine xmlns:a14="http://schemas.microsoft.com/office/drawing/2010/main" xmlns="" w="9525">
+                  <a14:hiddenLine xmlns="" xmlns:a14="http://schemas.microsoft.com/office/drawing/2010/main" w="9525">
                     <a:solidFill>
                       <a:srgbClr val="000000"/>
                     </a:solidFill>
@@ -11851,7 +11851,7 @@
               </a:ln>
               <a:extLst>
                 <a:ext uri="{91240B29-F687-4f45-9708-019B960494DF}">
-                  <a14:hiddenLine xmlns:a14="http://schemas.microsoft.com/office/drawing/2010/main" xmlns="" w="9525">
+                  <a14:hiddenLine xmlns="" xmlns:a14="http://schemas.microsoft.com/office/drawing/2010/main" w="9525">
                     <a:solidFill>
                       <a:srgbClr val="000000"/>
                     </a:solidFill>
@@ -11916,7 +11916,7 @@
               </a:ln>
               <a:extLst>
                 <a:ext uri="{91240B29-F687-4f45-9708-019B960494DF}">
-                  <a14:hiddenLine xmlns:a14="http://schemas.microsoft.com/office/drawing/2010/main" xmlns="" w="9525">
+                  <a14:hiddenLine xmlns="" xmlns:a14="http://schemas.microsoft.com/office/drawing/2010/main" w="9525">
                     <a:solidFill>
                       <a:srgbClr val="000000"/>
                     </a:solidFill>
@@ -12006,7 +12006,7 @@
               </a:ln>
               <a:extLst>
                 <a:ext uri="{91240B29-F687-4f45-9708-019B960494DF}">
-                  <a14:hiddenLine xmlns:a14="http://schemas.microsoft.com/office/drawing/2010/main" xmlns="" w="9525">
+                  <a14:hiddenLine xmlns="" xmlns:a14="http://schemas.microsoft.com/office/drawing/2010/main" w="9525">
                     <a:solidFill>
                       <a:srgbClr val="000000"/>
                     </a:solidFill>
@@ -12074,7 +12074,7 @@
               </a:ln>
               <a:extLst>
                 <a:ext uri="{91240B29-F687-4f45-9708-019B960494DF}">
-                  <a14:hiddenLine xmlns:a14="http://schemas.microsoft.com/office/drawing/2010/main" xmlns="" w="9525">
+                  <a14:hiddenLine xmlns="" xmlns:a14="http://schemas.microsoft.com/office/drawing/2010/main" w="9525">
                     <a:solidFill>
                       <a:srgbClr val="000000"/>
                     </a:solidFill>
@@ -12164,7 +12164,7 @@
               </a:ln>
               <a:extLst>
                 <a:ext uri="{91240B29-F687-4f45-9708-019B960494DF}">
-                  <a14:hiddenLine xmlns:a14="http://schemas.microsoft.com/office/drawing/2010/main" xmlns="" w="9525">
+                  <a14:hiddenLine xmlns="" xmlns:a14="http://schemas.microsoft.com/office/drawing/2010/main" w="9525">
                     <a:solidFill>
                       <a:srgbClr val="000000"/>
                     </a:solidFill>
@@ -12232,7 +12232,7 @@
               </a:ln>
               <a:extLst>
                 <a:ext uri="{91240B29-F687-4f45-9708-019B960494DF}">
-                  <a14:hiddenLine xmlns:a14="http://schemas.microsoft.com/office/drawing/2010/main" xmlns="" w="9525">
+                  <a14:hiddenLine xmlns="" xmlns:a14="http://schemas.microsoft.com/office/drawing/2010/main" w="9525">
                     <a:solidFill>
                       <a:srgbClr val="000000"/>
                     </a:solidFill>
@@ -12322,7 +12322,7 @@
               </a:ln>
               <a:extLst>
                 <a:ext uri="{91240B29-F687-4f45-9708-019B960494DF}">
-                  <a14:hiddenLine xmlns:a14="http://schemas.microsoft.com/office/drawing/2010/main" xmlns="" w="9525">
+                  <a14:hiddenLine xmlns="" xmlns:a14="http://schemas.microsoft.com/office/drawing/2010/main" w="9525">
                     <a:solidFill>
                       <a:srgbClr val="000000"/>
                     </a:solidFill>
@@ -12356,7 +12356,7 @@
               </a:ln>
               <a:extLst>
                 <a:ext uri="{91240B29-F687-4f45-9708-019B960494DF}">
-                  <a14:hiddenLine xmlns:a14="http://schemas.microsoft.com/office/drawing/2010/main" xmlns="" w="9525">
+                  <a14:hiddenLine xmlns="" xmlns:a14="http://schemas.microsoft.com/office/drawing/2010/main" w="9525">
                     <a:solidFill>
                       <a:srgbClr val="000000"/>
                     </a:solidFill>
@@ -12496,7 +12496,7 @@
           <a:p>
             <a:fld id="{C21E9E10-B59A-4E9D-AF95-0F4C2023A7FB}" type="datetimeFigureOut">
               <a:rPr lang="en-US" smtClean="0"/>
-              <a:t>2/8/2023</a:t>
+              <a:t>2/9/2023</a:t>
             </a:fld>
             <a:endParaRPr lang="en-US"/>
           </a:p>
@@ -13238,13 +13238,13 @@
             <p:ph idx="1"/>
             <p:extLst>
               <p:ext uri="{D42A27DB-BD31-4B8C-83A1-F6EECF244321}">
-                <p14:modId xmlns:p14="http://schemas.microsoft.com/office/powerpoint/2010/main" val="94665209"/>
+                <p14:modId xmlns:p14="http://schemas.microsoft.com/office/powerpoint/2010/main" val="1133119910"/>
               </p:ext>
             </p:extLst>
           </p:nvPr>
         </p:nvGraphicFramePr>
         <p:xfrm>
-          <a:off x="411480" y="743639"/>
+          <a:off x="411480" y="720074"/>
           <a:ext cx="11262361" cy="5797754"/>
         </p:xfrm>
         <a:graphic>
@@ -13485,7 +13485,7 @@
                     <a:p>
                       <a:pPr algn="l" rtl="0" fontAlgn="ctr"/>
                       <a:r>
-                        <a:rPr lang="en-US" sz="1400" b="0" i="0" u="none" strike="noStrike">
+                        <a:rPr lang="en-US" sz="1400" b="0" i="0" u="none" strike="noStrike" dirty="0">
                           <a:solidFill>
                             <a:srgbClr val="000000"/>
                           </a:solidFill>
@@ -13505,7 +13505,7 @@
                     <a:p>
                       <a:pPr algn="ctr" rtl="0" fontAlgn="ctr"/>
                       <a:r>
-                        <a:rPr lang="en-US" sz="1400" b="0" i="0" u="none" strike="noStrike">
+                        <a:rPr lang="en-US" sz="1400" b="0" i="0" u="none" strike="noStrike" dirty="0">
                           <a:solidFill>
                             <a:srgbClr val="000000"/>
                           </a:solidFill>
@@ -13525,7 +13525,7 @@
                     <a:p>
                       <a:pPr algn="ctr" rtl="0" fontAlgn="ctr"/>
                       <a:r>
-                        <a:rPr lang="en-US" sz="1400" b="0" i="0" u="none" strike="noStrike">
+                        <a:rPr lang="en-US" sz="1400" b="0" i="0" u="none" strike="noStrike" dirty="0">
                           <a:solidFill>
                             <a:srgbClr val="000000"/>
                           </a:solidFill>
@@ -13672,7 +13672,7 @@
                     <a:p>
                       <a:pPr algn="l" rtl="0" fontAlgn="ctr"/>
                       <a:r>
-                        <a:rPr lang="en-US" sz="1400" b="0" i="0" u="none" strike="noStrike">
+                        <a:rPr lang="en-US" sz="1400" b="0" i="0" u="none" strike="noStrike" dirty="0">
                           <a:solidFill>
                             <a:srgbClr val="000000"/>
                           </a:solidFill>
@@ -13712,7 +13712,7 @@
                     <a:p>
                       <a:pPr algn="ctr" rtl="0" fontAlgn="ctr"/>
                       <a:r>
-                        <a:rPr lang="en-US" sz="1400" b="0" i="0" u="none" strike="noStrike">
+                        <a:rPr lang="en-US" sz="1400" b="0" i="0" u="none" strike="noStrike" dirty="0">
                           <a:solidFill>
                             <a:srgbClr val="000000"/>
                           </a:solidFill>
@@ -13859,7 +13859,7 @@
                     <a:p>
                       <a:pPr algn="l" rtl="0" fontAlgn="ctr"/>
                       <a:r>
-                        <a:rPr lang="en-US" sz="1400" b="0" i="0" u="none" strike="noStrike">
+                        <a:rPr lang="en-US" sz="1400" b="0" i="0" u="none" strike="noStrike" dirty="0">
                           <a:solidFill>
                             <a:srgbClr val="000000"/>
                           </a:solidFill>
@@ -13899,7 +13899,7 @@
                     <a:p>
                       <a:pPr algn="ctr" rtl="0" fontAlgn="ctr"/>
                       <a:r>
-                        <a:rPr lang="en-US" sz="1400" b="0" i="0" u="none" strike="noStrike">
+                        <a:rPr lang="en-US" sz="1400" b="0" i="0" u="none" strike="noStrike" dirty="0">
                           <a:solidFill>
                             <a:srgbClr val="000000"/>
                           </a:solidFill>
@@ -13919,7 +13919,7 @@
                     <a:p>
                       <a:pPr algn="ctr" rtl="0" fontAlgn="ctr"/>
                       <a:r>
-                        <a:rPr lang="en-US" sz="1400" b="0" i="0" u="none" strike="noStrike">
+                        <a:rPr lang="en-US" sz="1400" b="0" i="0" u="none" strike="noStrike" dirty="0">
                           <a:solidFill>
                             <a:srgbClr val="000000"/>
                           </a:solidFill>
@@ -14046,7 +14046,7 @@
                     <a:p>
                       <a:pPr algn="l" rtl="0" fontAlgn="ctr"/>
                       <a:r>
-                        <a:rPr lang="en-US" sz="1400" b="0" i="0" u="none" strike="noStrike">
+                        <a:rPr lang="en-US" sz="1400" b="0" i="0" u="none" strike="noStrike" dirty="0">
                           <a:solidFill>
                             <a:srgbClr val="000000"/>
                           </a:solidFill>
@@ -14086,7 +14086,7 @@
                     <a:p>
                       <a:pPr algn="ctr" rtl="0" fontAlgn="ctr"/>
                       <a:r>
-                        <a:rPr lang="en-US" sz="1400" b="0" i="0" u="none" strike="noStrike">
+                        <a:rPr lang="en-US" sz="1400" b="0" i="0" u="none" strike="noStrike" dirty="0">
                           <a:solidFill>
                             <a:srgbClr val="000000"/>
                           </a:solidFill>
@@ -14106,7 +14106,7 @@
                     <a:p>
                       <a:pPr algn="ctr" rtl="0" fontAlgn="ctr"/>
                       <a:r>
-                        <a:rPr lang="en-US" sz="1400" b="0" i="0" u="none" strike="noStrike">
+                        <a:rPr lang="en-US" sz="1400" b="0" i="0" u="none" strike="noStrike" dirty="0">
                           <a:solidFill>
                             <a:srgbClr val="000000"/>
                           </a:solidFill>
@@ -14233,7 +14233,7 @@
                     <a:p>
                       <a:pPr algn="l" rtl="0" fontAlgn="ctr"/>
                       <a:r>
-                        <a:rPr lang="en-US" sz="1400" b="0" i="0" u="none" strike="noStrike">
+                        <a:rPr lang="en-US" sz="1400" b="0" i="0" u="none" strike="noStrike" dirty="0">
                           <a:solidFill>
                             <a:srgbClr val="000000"/>
                           </a:solidFill>
@@ -14253,7 +14253,7 @@
                     <a:p>
                       <a:pPr algn="ctr" rtl="0" fontAlgn="ctr"/>
                       <a:r>
-                        <a:rPr lang="en-US" sz="1400" b="0" i="0" u="none" strike="noStrike">
+                        <a:rPr lang="en-US" sz="1400" b="0" i="0" u="none" strike="noStrike" dirty="0">
                           <a:solidFill>
                             <a:srgbClr val="000000"/>
                           </a:solidFill>
@@ -14273,7 +14273,7 @@
                     <a:p>
                       <a:pPr algn="ctr" rtl="0" fontAlgn="ctr"/>
                       <a:r>
-                        <a:rPr lang="en-US" sz="1400" b="0" i="0" u="none" strike="noStrike">
+                        <a:rPr lang="en-US" sz="1400" b="0" i="0" u="none" strike="noStrike" dirty="0">
                           <a:solidFill>
                             <a:srgbClr val="000000"/>
                           </a:solidFill>
@@ -14460,7 +14460,7 @@
                     <a:p>
                       <a:pPr algn="ctr" rtl="0" fontAlgn="ctr"/>
                       <a:r>
-                        <a:rPr lang="en-US" sz="1400" b="0" i="0" u="none" strike="noStrike">
+                        <a:rPr lang="en-US" sz="1400" b="0" i="0" u="none" strike="noStrike" dirty="0">
                           <a:solidFill>
                             <a:srgbClr val="000000"/>
                           </a:solidFill>
@@ -14480,7 +14480,7 @@
                     <a:p>
                       <a:pPr algn="ctr" rtl="0" fontAlgn="ctr"/>
                       <a:r>
-                        <a:rPr lang="en-US" sz="1400" b="0" i="0" u="none" strike="noStrike">
+                        <a:rPr lang="en-US" sz="1400" b="0" i="0" u="none" strike="noStrike" dirty="0">
                           <a:solidFill>
                             <a:srgbClr val="000000"/>
                           </a:solidFill>
@@ -14794,7 +14794,7 @@
                     <a:p>
                       <a:pPr algn="l" rtl="0" fontAlgn="ctr"/>
                       <a:r>
-                        <a:rPr lang="en-US" sz="1400" b="0" i="0" u="none" strike="noStrike">
+                        <a:rPr lang="en-US" sz="1400" b="0" i="0" u="none" strike="noStrike" dirty="0">
                           <a:solidFill>
                             <a:srgbClr val="000000"/>
                           </a:solidFill>
@@ -14814,7 +14814,7 @@
                     <a:p>
                       <a:pPr algn="ctr" rtl="0" fontAlgn="ctr"/>
                       <a:r>
-                        <a:rPr lang="en-US" sz="1400" b="0" i="0" u="none" strike="noStrike">
+                        <a:rPr lang="en-US" sz="1400" b="0" i="0" u="none" strike="noStrike" dirty="0">
                           <a:solidFill>
                             <a:srgbClr val="000000"/>
                           </a:solidFill>
@@ -14834,7 +14834,7 @@
                     <a:p>
                       <a:pPr algn="ctr" rtl="0" fontAlgn="ctr"/>
                       <a:r>
-                        <a:rPr lang="en-US" sz="1400" b="0" i="0" u="none" strike="noStrike">
+                        <a:rPr lang="en-US" sz="1400" b="0" i="0" u="none" strike="noStrike" dirty="0">
                           <a:solidFill>
                             <a:srgbClr val="000000"/>
                           </a:solidFill>
@@ -14854,7 +14854,7 @@
                     <a:p>
                       <a:pPr algn="ctr" rtl="0" fontAlgn="ctr"/>
                       <a:r>
-                        <a:rPr lang="en-US" sz="1400" b="0" i="0" u="none" strike="noStrike">
+                        <a:rPr lang="en-US" sz="1400" b="0" i="0" u="none" strike="noStrike" dirty="0">
                           <a:solidFill>
                             <a:srgbClr val="000000"/>
                           </a:solidFill>
@@ -15041,7 +15041,7 @@
                     <a:p>
                       <a:pPr algn="ctr" rtl="0" fontAlgn="ctr"/>
                       <a:r>
-                        <a:rPr lang="en-US" sz="1400" b="0" i="0" u="none" strike="noStrike">
+                        <a:rPr lang="en-US" sz="1400" b="0" i="0" u="none" strike="noStrike" dirty="0">
                           <a:solidFill>
                             <a:srgbClr val="000000"/>
                           </a:solidFill>
@@ -17135,14 +17135,14 @@
             <p:ph sz="half" idx="2"/>
             <p:extLst>
               <p:ext uri="{D42A27DB-BD31-4B8C-83A1-F6EECF244321}">
-                <p14:modId xmlns:p14="http://schemas.microsoft.com/office/powerpoint/2010/main" val="1255735733"/>
+                <p14:modId xmlns:p14="http://schemas.microsoft.com/office/powerpoint/2010/main" val="3393404155"/>
               </p:ext>
             </p:extLst>
           </p:nvPr>
         </p:nvGraphicFramePr>
         <p:xfrm>
-          <a:off x="1141413" y="2261231"/>
-          <a:ext cx="4878386" cy="4206240"/>
+          <a:off x="1145357" y="2261231"/>
+          <a:ext cx="4874442" cy="4206240"/>
         </p:xfrm>
         <a:graphic>
           <a:graphicData uri="http://schemas.openxmlformats.org/drawingml/2006/table">
@@ -17151,7 +17151,7 @@
                 <a:tableStyleId>{5C22544A-7EE6-4342-B048-85BDC9FD1C3A}</a:tableStyleId>
               </a:tblPr>
               <a:tblGrid>
-                <a:gridCol w="2439193">
+                <a:gridCol w="2435249">
                   <a:extLst>
                     <a:ext uri="{9D8B030D-6E8A-4147-A177-3AD203B41FA5}">
                       <a16:colId xmlns:a16="http://schemas.microsoft.com/office/drawing/2014/main" val="893569035"/>
@@ -18723,7 +18723,7 @@
             <a:noFill/>
             <a:extLst>
               <a:ext uri="{909E8E84-426E-40dd-AFC4-6F175D3DCCD1}">
-                <a14:hiddenFill xmlns:p14="http://schemas.microsoft.com/office/powerpoint/2010/main" xmlns:a14="http://schemas.microsoft.com/office/drawing/2010/main" xmlns:a16="http://schemas.microsoft.com/office/drawing/2014/main" xmlns="">
+                <a14:hiddenFill xmlns="" xmlns:a16="http://schemas.microsoft.com/office/drawing/2014/main" xmlns:a14="http://schemas.microsoft.com/office/drawing/2010/main" xmlns:p14="http://schemas.microsoft.com/office/powerpoint/2010/main">
                   <a:solidFill>
                     <a:srgbClr val="FFFFFF"/>
                   </a:solidFill>
@@ -18903,7 +18903,7 @@
             </a:ln>
             <a:extLst>
               <a:ext uri="{91240B29-F687-4f45-9708-019B960494DF}">
-                <a14:hiddenLine xmlns:p14="http://schemas.microsoft.com/office/powerpoint/2010/main" xmlns:a14="http://schemas.microsoft.com/office/drawing/2010/main" xmlns:a16="http://schemas.microsoft.com/office/drawing/2014/main" xmlns="" w="9525">
+                <a14:hiddenLine xmlns="" xmlns:a16="http://schemas.microsoft.com/office/drawing/2014/main" xmlns:a14="http://schemas.microsoft.com/office/drawing/2010/main" xmlns:p14="http://schemas.microsoft.com/office/powerpoint/2010/main" w="9525">
                   <a:solidFill>
                     <a:srgbClr val="000000"/>
                   </a:solidFill>
@@ -19008,7 +19008,7 @@
             </a:ln>
             <a:extLst>
               <a:ext uri="{91240B29-F687-4f45-9708-019B960494DF}">
-                <a14:hiddenLine xmlns:p14="http://schemas.microsoft.com/office/powerpoint/2010/main" xmlns:a14="http://schemas.microsoft.com/office/drawing/2010/main" xmlns:a16="http://schemas.microsoft.com/office/drawing/2014/main" xmlns="" w="9525">
+                <a14:hiddenLine xmlns="" xmlns:a16="http://schemas.microsoft.com/office/drawing/2014/main" xmlns:a14="http://schemas.microsoft.com/office/drawing/2010/main" xmlns:p14="http://schemas.microsoft.com/office/powerpoint/2010/main" w="9525">
                   <a:solidFill>
                     <a:srgbClr val="000000"/>
                   </a:solidFill>
@@ -19113,7 +19113,7 @@
             </a:ln>
             <a:extLst>
               <a:ext uri="{91240B29-F687-4f45-9708-019B960494DF}">
-                <a14:hiddenLine xmlns:p14="http://schemas.microsoft.com/office/powerpoint/2010/main" xmlns:a14="http://schemas.microsoft.com/office/drawing/2010/main" xmlns:a16="http://schemas.microsoft.com/office/drawing/2014/main" xmlns="" w="9525">
+                <a14:hiddenLine xmlns="" xmlns:a16="http://schemas.microsoft.com/office/drawing/2014/main" xmlns:a14="http://schemas.microsoft.com/office/drawing/2010/main" xmlns:p14="http://schemas.microsoft.com/office/powerpoint/2010/main" w="9525">
                   <a:solidFill>
                     <a:srgbClr val="000000"/>
                   </a:solidFill>
@@ -19162,7 +19162,7 @@
             </a:ln>
             <a:extLst>
               <a:ext uri="{91240B29-F687-4f45-9708-019B960494DF}">
-                <a14:hiddenLine xmlns:p14="http://schemas.microsoft.com/office/powerpoint/2010/main" xmlns:a14="http://schemas.microsoft.com/office/drawing/2010/main" xmlns:a16="http://schemas.microsoft.com/office/drawing/2014/main" xmlns="" w="9525">
+                <a14:hiddenLine xmlns="" xmlns:a16="http://schemas.microsoft.com/office/drawing/2014/main" xmlns:a14="http://schemas.microsoft.com/office/drawing/2010/main" xmlns:p14="http://schemas.microsoft.com/office/powerpoint/2010/main" w="9525">
                   <a:solidFill>
                     <a:srgbClr val="000000"/>
                   </a:solidFill>
@@ -19267,7 +19267,7 @@
             </a:ln>
             <a:extLst>
               <a:ext uri="{91240B29-F687-4f45-9708-019B960494DF}">
-                <a14:hiddenLine xmlns:p14="http://schemas.microsoft.com/office/powerpoint/2010/main" xmlns:a14="http://schemas.microsoft.com/office/drawing/2010/main" xmlns:a16="http://schemas.microsoft.com/office/drawing/2014/main" xmlns="" w="9525">
+                <a14:hiddenLine xmlns="" xmlns:a16="http://schemas.microsoft.com/office/drawing/2014/main" xmlns:a14="http://schemas.microsoft.com/office/drawing/2010/main" xmlns:p14="http://schemas.microsoft.com/office/powerpoint/2010/main" w="9525">
                   <a:solidFill>
                     <a:srgbClr val="000000"/>
                   </a:solidFill>
@@ -19344,7 +19344,7 @@
             </a:ln>
             <a:extLst>
               <a:ext uri="{91240B29-F687-4f45-9708-019B960494DF}">
-                <a14:hiddenLine xmlns:p14="http://schemas.microsoft.com/office/powerpoint/2010/main" xmlns:a14="http://schemas.microsoft.com/office/drawing/2010/main" xmlns:a16="http://schemas.microsoft.com/office/drawing/2014/main" xmlns="" w="9525">
+                <a14:hiddenLine xmlns="" xmlns:a16="http://schemas.microsoft.com/office/drawing/2014/main" xmlns:a14="http://schemas.microsoft.com/office/drawing/2010/main" xmlns:p14="http://schemas.microsoft.com/office/powerpoint/2010/main" w="9525">
                   <a:solidFill>
                     <a:srgbClr val="000000"/>
                   </a:solidFill>
@@ -19421,7 +19421,7 @@
             </a:ln>
             <a:extLst>
               <a:ext uri="{91240B29-F687-4f45-9708-019B960494DF}">
-                <a14:hiddenLine xmlns:p14="http://schemas.microsoft.com/office/powerpoint/2010/main" xmlns:a14="http://schemas.microsoft.com/office/drawing/2010/main" xmlns:a16="http://schemas.microsoft.com/office/drawing/2014/main" xmlns="" w="9525">
+                <a14:hiddenLine xmlns="" xmlns:a16="http://schemas.microsoft.com/office/drawing/2014/main" xmlns:a14="http://schemas.microsoft.com/office/drawing/2010/main" xmlns:p14="http://schemas.microsoft.com/office/powerpoint/2010/main" w="9525">
                   <a:solidFill>
                     <a:srgbClr val="000000"/>
                   </a:solidFill>
@@ -19526,7 +19526,7 @@
             </a:ln>
             <a:extLst>
               <a:ext uri="{91240B29-F687-4f45-9708-019B960494DF}">
-                <a14:hiddenLine xmlns:p14="http://schemas.microsoft.com/office/powerpoint/2010/main" xmlns:a14="http://schemas.microsoft.com/office/drawing/2010/main" xmlns:a16="http://schemas.microsoft.com/office/drawing/2014/main" xmlns="" w="9525">
+                <a14:hiddenLine xmlns="" xmlns:a16="http://schemas.microsoft.com/office/drawing/2014/main" xmlns:a14="http://schemas.microsoft.com/office/drawing/2010/main" xmlns:p14="http://schemas.microsoft.com/office/powerpoint/2010/main" w="9525">
                   <a:solidFill>
                     <a:srgbClr val="000000"/>
                   </a:solidFill>
@@ -19603,7 +19603,7 @@
             </a:ln>
             <a:extLst>
               <a:ext uri="{91240B29-F687-4f45-9708-019B960494DF}">
-                <a14:hiddenLine xmlns:p14="http://schemas.microsoft.com/office/powerpoint/2010/main" xmlns:a14="http://schemas.microsoft.com/office/drawing/2010/main" xmlns:a16="http://schemas.microsoft.com/office/drawing/2014/main" xmlns="" w="9525">
+                <a14:hiddenLine xmlns="" xmlns:a16="http://schemas.microsoft.com/office/drawing/2014/main" xmlns:a14="http://schemas.microsoft.com/office/drawing/2010/main" xmlns:p14="http://schemas.microsoft.com/office/powerpoint/2010/main" w="9525">
                   <a:solidFill>
                     <a:srgbClr val="000000"/>
                   </a:solidFill>
@@ -19680,7 +19680,7 @@
             </a:ln>
             <a:extLst>
               <a:ext uri="{91240B29-F687-4f45-9708-019B960494DF}">
-                <a14:hiddenLine xmlns:p14="http://schemas.microsoft.com/office/powerpoint/2010/main" xmlns:a14="http://schemas.microsoft.com/office/drawing/2010/main" xmlns:a16="http://schemas.microsoft.com/office/drawing/2014/main" xmlns="" w="9525">
+                <a14:hiddenLine xmlns="" xmlns:a16="http://schemas.microsoft.com/office/drawing/2014/main" xmlns:a14="http://schemas.microsoft.com/office/drawing/2010/main" xmlns:p14="http://schemas.microsoft.com/office/powerpoint/2010/main" w="9525">
                   <a:solidFill>
                     <a:srgbClr val="000000"/>
                   </a:solidFill>
@@ -19785,7 +19785,7 @@
             </a:ln>
             <a:extLst>
               <a:ext uri="{91240B29-F687-4f45-9708-019B960494DF}">
-                <a14:hiddenLine xmlns:p14="http://schemas.microsoft.com/office/powerpoint/2010/main" xmlns:a14="http://schemas.microsoft.com/office/drawing/2010/main" xmlns:a16="http://schemas.microsoft.com/office/drawing/2014/main" xmlns="" w="9525">
+                <a14:hiddenLine xmlns="" xmlns:a16="http://schemas.microsoft.com/office/drawing/2014/main" xmlns:a14="http://schemas.microsoft.com/office/drawing/2010/main" xmlns:p14="http://schemas.microsoft.com/office/powerpoint/2010/main" w="9525">
                   <a:solidFill>
                     <a:srgbClr val="000000"/>
                   </a:solidFill>
@@ -19890,7 +19890,7 @@
             </a:ln>
             <a:extLst>
               <a:ext uri="{91240B29-F687-4f45-9708-019B960494DF}">
-                <a14:hiddenLine xmlns:p14="http://schemas.microsoft.com/office/powerpoint/2010/main" xmlns:a14="http://schemas.microsoft.com/office/drawing/2010/main" xmlns:a16="http://schemas.microsoft.com/office/drawing/2014/main" xmlns="" w="9525">
+                <a14:hiddenLine xmlns="" xmlns:a16="http://schemas.microsoft.com/office/drawing/2014/main" xmlns:a14="http://schemas.microsoft.com/office/drawing/2010/main" xmlns:p14="http://schemas.microsoft.com/office/powerpoint/2010/main" w="9525">
                   <a:solidFill>
                     <a:srgbClr val="000000"/>
                   </a:solidFill>
@@ -19967,7 +19967,7 @@
             </a:ln>
             <a:extLst>
               <a:ext uri="{91240B29-F687-4f45-9708-019B960494DF}">
-                <a14:hiddenLine xmlns:p14="http://schemas.microsoft.com/office/powerpoint/2010/main" xmlns:a14="http://schemas.microsoft.com/office/drawing/2010/main" xmlns:a16="http://schemas.microsoft.com/office/drawing/2014/main" xmlns="" w="9525">
+                <a14:hiddenLine xmlns="" xmlns:a16="http://schemas.microsoft.com/office/drawing/2014/main" xmlns:a14="http://schemas.microsoft.com/office/drawing/2010/main" xmlns:p14="http://schemas.microsoft.com/office/powerpoint/2010/main" w="9525">
                   <a:solidFill>
                     <a:srgbClr val="000000"/>
                   </a:solidFill>
@@ -20092,7 +20092,7 @@
             </a:ln>
             <a:extLst>
               <a:ext uri="{91240B29-F687-4f45-9708-019B960494DF}">
-                <a14:hiddenLine xmlns:p14="http://schemas.microsoft.com/office/powerpoint/2010/main" xmlns:a14="http://schemas.microsoft.com/office/drawing/2010/main" xmlns:a16="http://schemas.microsoft.com/office/drawing/2014/main" xmlns="" w="9525">
+                <a14:hiddenLine xmlns="" xmlns:a16="http://schemas.microsoft.com/office/drawing/2014/main" xmlns:a14="http://schemas.microsoft.com/office/drawing/2010/main" xmlns:p14="http://schemas.microsoft.com/office/powerpoint/2010/main" w="9525">
                   <a:solidFill>
                     <a:srgbClr val="000000"/>
                   </a:solidFill>
@@ -20169,7 +20169,7 @@
             </a:ln>
             <a:extLst>
               <a:ext uri="{91240B29-F687-4f45-9708-019B960494DF}">
-                <a14:hiddenLine xmlns:p14="http://schemas.microsoft.com/office/powerpoint/2010/main" xmlns:a14="http://schemas.microsoft.com/office/drawing/2010/main" xmlns:a16="http://schemas.microsoft.com/office/drawing/2014/main" xmlns="" w="9525">
+                <a14:hiddenLine xmlns="" xmlns:a16="http://schemas.microsoft.com/office/drawing/2014/main" xmlns:a14="http://schemas.microsoft.com/office/drawing/2010/main" xmlns:p14="http://schemas.microsoft.com/office/powerpoint/2010/main" w="9525">
                   <a:solidFill>
                     <a:srgbClr val="000000"/>
                   </a:solidFill>
@@ -20274,7 +20274,7 @@
             </a:ln>
             <a:extLst>
               <a:ext uri="{91240B29-F687-4f45-9708-019B960494DF}">
-                <a14:hiddenLine xmlns:p14="http://schemas.microsoft.com/office/powerpoint/2010/main" xmlns:a14="http://schemas.microsoft.com/office/drawing/2010/main" xmlns:a16="http://schemas.microsoft.com/office/drawing/2014/main" xmlns="" w="9525">
+                <a14:hiddenLine xmlns="" xmlns:a16="http://schemas.microsoft.com/office/drawing/2014/main" xmlns:a14="http://schemas.microsoft.com/office/drawing/2010/main" xmlns:p14="http://schemas.microsoft.com/office/powerpoint/2010/main" w="9525">
                   <a:solidFill>
                     <a:srgbClr val="000000"/>
                   </a:solidFill>
@@ -20379,7 +20379,7 @@
             </a:ln>
             <a:extLst>
               <a:ext uri="{91240B29-F687-4f45-9708-019B960494DF}">
-                <a14:hiddenLine xmlns:p14="http://schemas.microsoft.com/office/powerpoint/2010/main" xmlns:a14="http://schemas.microsoft.com/office/drawing/2010/main" xmlns:a16="http://schemas.microsoft.com/office/drawing/2014/main" xmlns="" w="9525">
+                <a14:hiddenLine xmlns="" xmlns:a16="http://schemas.microsoft.com/office/drawing/2014/main" xmlns:a14="http://schemas.microsoft.com/office/drawing/2010/main" xmlns:p14="http://schemas.microsoft.com/office/powerpoint/2010/main" w="9525">
                   <a:solidFill>
                     <a:srgbClr val="000000"/>
                   </a:solidFill>
@@ -20456,7 +20456,7 @@
             </a:ln>
             <a:extLst>
               <a:ext uri="{91240B29-F687-4f45-9708-019B960494DF}">
-                <a14:hiddenLine xmlns:p14="http://schemas.microsoft.com/office/powerpoint/2010/main" xmlns:a14="http://schemas.microsoft.com/office/drawing/2010/main" xmlns:a16="http://schemas.microsoft.com/office/drawing/2014/main" xmlns="" w="9525">
+                <a14:hiddenLine xmlns="" xmlns:a16="http://schemas.microsoft.com/office/drawing/2014/main" xmlns:a14="http://schemas.microsoft.com/office/drawing/2010/main" xmlns:p14="http://schemas.microsoft.com/office/powerpoint/2010/main" w="9525">
                   <a:solidFill>
                     <a:srgbClr val="000000"/>
                   </a:solidFill>
@@ -20561,7 +20561,7 @@
             </a:ln>
             <a:extLst>
               <a:ext uri="{91240B29-F687-4f45-9708-019B960494DF}">
-                <a14:hiddenLine xmlns:p14="http://schemas.microsoft.com/office/powerpoint/2010/main" xmlns:a14="http://schemas.microsoft.com/office/drawing/2010/main" xmlns:a16="http://schemas.microsoft.com/office/drawing/2014/main" xmlns="" w="9525">
+                <a14:hiddenLine xmlns="" xmlns:a16="http://schemas.microsoft.com/office/drawing/2014/main" xmlns:a14="http://schemas.microsoft.com/office/drawing/2010/main" xmlns:p14="http://schemas.microsoft.com/office/powerpoint/2010/main" w="9525">
                   <a:solidFill>
                     <a:srgbClr val="000000"/>
                   </a:solidFill>
@@ -20666,7 +20666,7 @@
             </a:ln>
             <a:extLst>
               <a:ext uri="{91240B29-F687-4f45-9708-019B960494DF}">
-                <a14:hiddenLine xmlns:p14="http://schemas.microsoft.com/office/powerpoint/2010/main" xmlns:a14="http://schemas.microsoft.com/office/drawing/2010/main" xmlns:a16="http://schemas.microsoft.com/office/drawing/2014/main" xmlns="" w="9525">
+                <a14:hiddenLine xmlns="" xmlns:a16="http://schemas.microsoft.com/office/drawing/2014/main" xmlns:a14="http://schemas.microsoft.com/office/drawing/2010/main" xmlns:p14="http://schemas.microsoft.com/office/powerpoint/2010/main" w="9525">
                   <a:solidFill>
                     <a:srgbClr val="000000"/>
                   </a:solidFill>
@@ -20737,7 +20737,7 @@
             </a:ln>
             <a:extLst>
               <a:ext uri="{91240B29-F687-4f45-9708-019B960494DF}">
-                <a14:hiddenLine xmlns:p14="http://schemas.microsoft.com/office/powerpoint/2010/main" xmlns:a14="http://schemas.microsoft.com/office/drawing/2010/main" xmlns:a16="http://schemas.microsoft.com/office/drawing/2014/main" xmlns="" w="9525">
+                <a14:hiddenLine xmlns="" xmlns:a16="http://schemas.microsoft.com/office/drawing/2014/main" xmlns:a14="http://schemas.microsoft.com/office/drawing/2010/main" xmlns:p14="http://schemas.microsoft.com/office/powerpoint/2010/main" w="9525">
                   <a:solidFill>
                     <a:srgbClr val="000000"/>
                   </a:solidFill>
@@ -20842,7 +20842,7 @@
             </a:ln>
             <a:extLst>
               <a:ext uri="{91240B29-F687-4f45-9708-019B960494DF}">
-                <a14:hiddenLine xmlns:p14="http://schemas.microsoft.com/office/powerpoint/2010/main" xmlns:a14="http://schemas.microsoft.com/office/drawing/2010/main" xmlns:a16="http://schemas.microsoft.com/office/drawing/2014/main" xmlns="" w="9525">
+                <a14:hiddenLine xmlns="" xmlns:a16="http://schemas.microsoft.com/office/drawing/2014/main" xmlns:a14="http://schemas.microsoft.com/office/drawing/2010/main" xmlns:p14="http://schemas.microsoft.com/office/powerpoint/2010/main" w="9525">
                   <a:solidFill>
                     <a:srgbClr val="000000"/>
                   </a:solidFill>
@@ -20913,7 +20913,7 @@
             </a:ln>
             <a:extLst>
               <a:ext uri="{91240B29-F687-4f45-9708-019B960494DF}">
-                <a14:hiddenLine xmlns:p14="http://schemas.microsoft.com/office/powerpoint/2010/main" xmlns:a14="http://schemas.microsoft.com/office/drawing/2010/main" xmlns:a16="http://schemas.microsoft.com/office/drawing/2014/main" xmlns="" w="9525">
+                <a14:hiddenLine xmlns="" xmlns:a16="http://schemas.microsoft.com/office/drawing/2014/main" xmlns:a14="http://schemas.microsoft.com/office/drawing/2010/main" xmlns:p14="http://schemas.microsoft.com/office/powerpoint/2010/main" w="9525">
                   <a:solidFill>
                     <a:srgbClr val="000000"/>
                   </a:solidFill>
@@ -21018,7 +21018,7 @@
             </a:ln>
             <a:extLst>
               <a:ext uri="{91240B29-F687-4f45-9708-019B960494DF}">
-                <a14:hiddenLine xmlns:p14="http://schemas.microsoft.com/office/powerpoint/2010/main" xmlns:a14="http://schemas.microsoft.com/office/drawing/2010/main" xmlns:a16="http://schemas.microsoft.com/office/drawing/2014/main" xmlns="" w="9525">
+                <a14:hiddenLine xmlns="" xmlns:a16="http://schemas.microsoft.com/office/drawing/2014/main" xmlns:a14="http://schemas.microsoft.com/office/drawing/2010/main" xmlns:p14="http://schemas.microsoft.com/office/powerpoint/2010/main" w="9525">
                   <a:solidFill>
                     <a:srgbClr val="000000"/>
                   </a:solidFill>
@@ -21101,7 +21101,7 @@
             </a:ln>
             <a:extLst>
               <a:ext uri="{91240B29-F687-4f45-9708-019B960494DF}">
-                <a14:hiddenLine xmlns:p14="http://schemas.microsoft.com/office/powerpoint/2010/main" xmlns:a14="http://schemas.microsoft.com/office/drawing/2010/main" xmlns:a16="http://schemas.microsoft.com/office/drawing/2014/main" xmlns="" w="9525">
+                <a14:hiddenLine xmlns="" xmlns:a16="http://schemas.microsoft.com/office/drawing/2014/main" xmlns:a14="http://schemas.microsoft.com/office/drawing/2010/main" xmlns:p14="http://schemas.microsoft.com/office/powerpoint/2010/main" w="9525">
                   <a:solidFill>
                     <a:srgbClr val="000000"/>
                   </a:solidFill>
@@ -21206,7 +21206,7 @@
             </a:ln>
             <a:extLst>
               <a:ext uri="{91240B29-F687-4f45-9708-019B960494DF}">
-                <a14:hiddenLine xmlns:p14="http://schemas.microsoft.com/office/powerpoint/2010/main" xmlns:a14="http://schemas.microsoft.com/office/drawing/2010/main" xmlns:a16="http://schemas.microsoft.com/office/drawing/2014/main" xmlns="" w="9525">
+                <a14:hiddenLine xmlns="" xmlns:a16="http://schemas.microsoft.com/office/drawing/2014/main" xmlns:a14="http://schemas.microsoft.com/office/drawing/2010/main" xmlns:p14="http://schemas.microsoft.com/office/powerpoint/2010/main" w="9525">
                   <a:solidFill>
                     <a:srgbClr val="000000"/>
                   </a:solidFill>
@@ -21289,7 +21289,7 @@
             </a:ln>
             <a:extLst>
               <a:ext uri="{91240B29-F687-4f45-9708-019B960494DF}">
-                <a14:hiddenLine xmlns:p14="http://schemas.microsoft.com/office/powerpoint/2010/main" xmlns:a14="http://schemas.microsoft.com/office/drawing/2010/main" xmlns:a16="http://schemas.microsoft.com/office/drawing/2014/main" xmlns="" w="9525">
+                <a14:hiddenLine xmlns="" xmlns:a16="http://schemas.microsoft.com/office/drawing/2014/main" xmlns:a14="http://schemas.microsoft.com/office/drawing/2010/main" xmlns:p14="http://schemas.microsoft.com/office/powerpoint/2010/main" w="9525">
                   <a:solidFill>
                     <a:srgbClr val="000000"/>
                   </a:solidFill>
@@ -21394,7 +21394,7 @@
             </a:ln>
             <a:extLst>
               <a:ext uri="{91240B29-F687-4f45-9708-019B960494DF}">
-                <a14:hiddenLine xmlns:p14="http://schemas.microsoft.com/office/powerpoint/2010/main" xmlns:a14="http://schemas.microsoft.com/office/drawing/2010/main" xmlns:a16="http://schemas.microsoft.com/office/drawing/2014/main" xmlns="" w="9525">
+                <a14:hiddenLine xmlns="" xmlns:a16="http://schemas.microsoft.com/office/drawing/2014/main" xmlns:a14="http://schemas.microsoft.com/office/drawing/2010/main" xmlns:p14="http://schemas.microsoft.com/office/powerpoint/2010/main" w="9525">
                   <a:solidFill>
                     <a:srgbClr val="000000"/>
                   </a:solidFill>
@@ -21443,7 +21443,7 @@
             </a:ln>
             <a:extLst>
               <a:ext uri="{91240B29-F687-4f45-9708-019B960494DF}">
-                <a14:hiddenLine xmlns:p14="http://schemas.microsoft.com/office/powerpoint/2010/main" xmlns:a14="http://schemas.microsoft.com/office/drawing/2010/main" xmlns:a16="http://schemas.microsoft.com/office/drawing/2014/main" xmlns="" w="9525">
+                <a14:hiddenLine xmlns="" xmlns:a16="http://schemas.microsoft.com/office/drawing/2014/main" xmlns:a14="http://schemas.microsoft.com/office/drawing/2010/main" xmlns:p14="http://schemas.microsoft.com/office/powerpoint/2010/main" w="9525">
                   <a:solidFill>
                     <a:srgbClr val="000000"/>
                   </a:solidFill>
@@ -21548,7 +21548,7 @@
             </a:ln>
             <a:extLst>
               <a:ext uri="{91240B29-F687-4f45-9708-019B960494DF}">
-                <a14:hiddenLine xmlns:p14="http://schemas.microsoft.com/office/powerpoint/2010/main" xmlns:a14="http://schemas.microsoft.com/office/drawing/2010/main" xmlns:a16="http://schemas.microsoft.com/office/drawing/2014/main" xmlns="" w="9525">
+                <a14:hiddenLine xmlns="" xmlns:a16="http://schemas.microsoft.com/office/drawing/2014/main" xmlns:a14="http://schemas.microsoft.com/office/drawing/2010/main" xmlns:p14="http://schemas.microsoft.com/office/powerpoint/2010/main" w="9525">
                   <a:solidFill>
                     <a:srgbClr val="000000"/>
                   </a:solidFill>
@@ -21625,7 +21625,7 @@
             </a:ln>
             <a:extLst>
               <a:ext uri="{91240B29-F687-4f45-9708-019B960494DF}">
-                <a14:hiddenLine xmlns:p14="http://schemas.microsoft.com/office/powerpoint/2010/main" xmlns:a14="http://schemas.microsoft.com/office/drawing/2010/main" xmlns:a16="http://schemas.microsoft.com/office/drawing/2014/main" xmlns="" w="9525">
+                <a14:hiddenLine xmlns="" xmlns:a16="http://schemas.microsoft.com/office/drawing/2014/main" xmlns:a14="http://schemas.microsoft.com/office/drawing/2010/main" xmlns:p14="http://schemas.microsoft.com/office/powerpoint/2010/main" w="9525">
                   <a:solidFill>
                     <a:srgbClr val="000000"/>
                   </a:solidFill>
@@ -21702,7 +21702,7 @@
             </a:ln>
             <a:extLst>
               <a:ext uri="{91240B29-F687-4f45-9708-019B960494DF}">
-                <a14:hiddenLine xmlns:p14="http://schemas.microsoft.com/office/powerpoint/2010/main" xmlns:a14="http://schemas.microsoft.com/office/drawing/2010/main" xmlns:a16="http://schemas.microsoft.com/office/drawing/2014/main" xmlns="" w="9525">
+                <a14:hiddenLine xmlns="" xmlns:a16="http://schemas.microsoft.com/office/drawing/2014/main" xmlns:a14="http://schemas.microsoft.com/office/drawing/2010/main" xmlns:p14="http://schemas.microsoft.com/office/powerpoint/2010/main" w="9525">
                   <a:solidFill>
                     <a:srgbClr val="000000"/>
                   </a:solidFill>
@@ -21807,7 +21807,7 @@
             </a:ln>
             <a:extLst>
               <a:ext uri="{91240B29-F687-4f45-9708-019B960494DF}">
-                <a14:hiddenLine xmlns:p14="http://schemas.microsoft.com/office/powerpoint/2010/main" xmlns:a14="http://schemas.microsoft.com/office/drawing/2010/main" xmlns:a16="http://schemas.microsoft.com/office/drawing/2014/main" xmlns="" w="9525">
+                <a14:hiddenLine xmlns="" xmlns:a16="http://schemas.microsoft.com/office/drawing/2014/main" xmlns:a14="http://schemas.microsoft.com/office/drawing/2010/main" xmlns:p14="http://schemas.microsoft.com/office/powerpoint/2010/main" w="9525">
                   <a:solidFill>
                     <a:srgbClr val="000000"/>
                   </a:solidFill>
@@ -21890,7 +21890,7 @@
             </a:ln>
             <a:extLst>
               <a:ext uri="{91240B29-F687-4f45-9708-019B960494DF}">
-                <a14:hiddenLine xmlns:p14="http://schemas.microsoft.com/office/powerpoint/2010/main" xmlns:a14="http://schemas.microsoft.com/office/drawing/2010/main" xmlns:a16="http://schemas.microsoft.com/office/drawing/2014/main" xmlns="" w="9525">
+                <a14:hiddenLine xmlns="" xmlns:a16="http://schemas.microsoft.com/office/drawing/2014/main" xmlns:a14="http://schemas.microsoft.com/office/drawing/2010/main" xmlns:p14="http://schemas.microsoft.com/office/powerpoint/2010/main" w="9525">
                   <a:solidFill>
                     <a:srgbClr val="000000"/>
                   </a:solidFill>
@@ -21967,7 +21967,7 @@
             </a:ln>
             <a:extLst>
               <a:ext uri="{91240B29-F687-4f45-9708-019B960494DF}">
-                <a14:hiddenLine xmlns:p14="http://schemas.microsoft.com/office/powerpoint/2010/main" xmlns:a14="http://schemas.microsoft.com/office/drawing/2010/main" xmlns:a16="http://schemas.microsoft.com/office/drawing/2014/main" xmlns="" w="9525">
+                <a14:hiddenLine xmlns="" xmlns:a16="http://schemas.microsoft.com/office/drawing/2014/main" xmlns:a14="http://schemas.microsoft.com/office/drawing/2010/main" xmlns:p14="http://schemas.microsoft.com/office/powerpoint/2010/main" w="9525">
                   <a:solidFill>
                     <a:srgbClr val="000000"/>
                   </a:solidFill>
@@ -22072,7 +22072,7 @@
             </a:ln>
             <a:extLst>
               <a:ext uri="{91240B29-F687-4f45-9708-019B960494DF}">
-                <a14:hiddenLine xmlns:p14="http://schemas.microsoft.com/office/powerpoint/2010/main" xmlns:a14="http://schemas.microsoft.com/office/drawing/2010/main" xmlns:a16="http://schemas.microsoft.com/office/drawing/2014/main" xmlns="" w="9525">
+                <a14:hiddenLine xmlns="" xmlns:a16="http://schemas.microsoft.com/office/drawing/2014/main" xmlns:a14="http://schemas.microsoft.com/office/drawing/2010/main" xmlns:p14="http://schemas.microsoft.com/office/powerpoint/2010/main" w="9525">
                   <a:solidFill>
                     <a:srgbClr val="000000"/>
                   </a:solidFill>
@@ -22149,7 +22149,7 @@
             </a:ln>
             <a:extLst>
               <a:ext uri="{91240B29-F687-4f45-9708-019B960494DF}">
-                <a14:hiddenLine xmlns:p14="http://schemas.microsoft.com/office/powerpoint/2010/main" xmlns:a14="http://schemas.microsoft.com/office/drawing/2010/main" xmlns:a16="http://schemas.microsoft.com/office/drawing/2014/main" xmlns="" w="9525">
+                <a14:hiddenLine xmlns="" xmlns:a16="http://schemas.microsoft.com/office/drawing/2014/main" xmlns:a14="http://schemas.microsoft.com/office/drawing/2010/main" xmlns:p14="http://schemas.microsoft.com/office/powerpoint/2010/main" w="9525">
                   <a:solidFill>
                     <a:srgbClr val="000000"/>
                   </a:solidFill>
@@ -22254,7 +22254,7 @@
             </a:ln>
             <a:extLst>
               <a:ext uri="{91240B29-F687-4f45-9708-019B960494DF}">
-                <a14:hiddenLine xmlns:p14="http://schemas.microsoft.com/office/powerpoint/2010/main" xmlns:a14="http://schemas.microsoft.com/office/drawing/2010/main" xmlns:a16="http://schemas.microsoft.com/office/drawing/2014/main" xmlns="" w="9525">
+                <a14:hiddenLine xmlns="" xmlns:a16="http://schemas.microsoft.com/office/drawing/2014/main" xmlns:a14="http://schemas.microsoft.com/office/drawing/2010/main" xmlns:p14="http://schemas.microsoft.com/office/powerpoint/2010/main" w="9525">
                   <a:solidFill>
                     <a:srgbClr val="000000"/>
                   </a:solidFill>
@@ -22331,7 +22331,7 @@
             </a:ln>
             <a:extLst>
               <a:ext uri="{91240B29-F687-4f45-9708-019B960494DF}">
-                <a14:hiddenLine xmlns:p14="http://schemas.microsoft.com/office/powerpoint/2010/main" xmlns:a14="http://schemas.microsoft.com/office/drawing/2010/main" xmlns:a16="http://schemas.microsoft.com/office/drawing/2014/main" xmlns="" w="9525">
+                <a14:hiddenLine xmlns="" xmlns:a16="http://schemas.microsoft.com/office/drawing/2014/main" xmlns:a14="http://schemas.microsoft.com/office/drawing/2010/main" xmlns:p14="http://schemas.microsoft.com/office/powerpoint/2010/main" w="9525">
                   <a:solidFill>
                     <a:srgbClr val="000000"/>
                   </a:solidFill>
@@ -22436,7 +22436,7 @@
             </a:ln>
             <a:extLst>
               <a:ext uri="{91240B29-F687-4f45-9708-019B960494DF}">
-                <a14:hiddenLine xmlns:p14="http://schemas.microsoft.com/office/powerpoint/2010/main" xmlns:a14="http://schemas.microsoft.com/office/drawing/2010/main" xmlns:a16="http://schemas.microsoft.com/office/drawing/2014/main" xmlns="" w="9525">
+                <a14:hiddenLine xmlns="" xmlns:a16="http://schemas.microsoft.com/office/drawing/2014/main" xmlns:a14="http://schemas.microsoft.com/office/drawing/2010/main" xmlns:p14="http://schemas.microsoft.com/office/powerpoint/2010/main" w="9525">
                   <a:solidFill>
                     <a:srgbClr val="000000"/>
                   </a:solidFill>
@@ -22485,7 +22485,7 @@
             </a:ln>
             <a:extLst>
               <a:ext uri="{91240B29-F687-4f45-9708-019B960494DF}">
-                <a14:hiddenLine xmlns:p14="http://schemas.microsoft.com/office/powerpoint/2010/main" xmlns:a14="http://schemas.microsoft.com/office/drawing/2010/main" xmlns:a16="http://schemas.microsoft.com/office/drawing/2014/main" xmlns="" w="9525">
+                <a14:hiddenLine xmlns="" xmlns:a16="http://schemas.microsoft.com/office/drawing/2014/main" xmlns:a14="http://schemas.microsoft.com/office/drawing/2010/main" xmlns:p14="http://schemas.microsoft.com/office/powerpoint/2010/main" w="9525">
                   <a:solidFill>
                     <a:srgbClr val="000000"/>
                   </a:solidFill>
@@ -22565,7 +22565,7 @@
             </a:ln>
             <a:extLst>
               <a:ext uri="{91240B29-F687-4f45-9708-019B960494DF}">
-                <a14:hiddenLine xmlns:p14="http://schemas.microsoft.com/office/powerpoint/2010/main" xmlns:a14="http://schemas.microsoft.com/office/drawing/2010/main" xmlns:a16="http://schemas.microsoft.com/office/drawing/2014/main" xmlns="" w="9525">
+                <a14:hiddenLine xmlns="" xmlns:a16="http://schemas.microsoft.com/office/drawing/2014/main" xmlns:a14="http://schemas.microsoft.com/office/drawing/2010/main" xmlns:p14="http://schemas.microsoft.com/office/powerpoint/2010/main" w="9525">
                   <a:solidFill>
                     <a:srgbClr val="000000"/>
                   </a:solidFill>
@@ -22670,7 +22670,7 @@
             </a:ln>
             <a:extLst>
               <a:ext uri="{91240B29-F687-4f45-9708-019B960494DF}">
-                <a14:hiddenLine xmlns:p14="http://schemas.microsoft.com/office/powerpoint/2010/main" xmlns:a14="http://schemas.microsoft.com/office/drawing/2010/main" xmlns:a16="http://schemas.microsoft.com/office/drawing/2014/main" xmlns="" w="9525">
+                <a14:hiddenLine xmlns="" xmlns:a16="http://schemas.microsoft.com/office/drawing/2014/main" xmlns:a14="http://schemas.microsoft.com/office/drawing/2010/main" xmlns:p14="http://schemas.microsoft.com/office/powerpoint/2010/main" w="9525">
                   <a:solidFill>
                     <a:srgbClr val="000000"/>
                   </a:solidFill>
@@ -22747,7 +22747,7 @@
             </a:ln>
             <a:extLst>
               <a:ext uri="{91240B29-F687-4f45-9708-019B960494DF}">
-                <a14:hiddenLine xmlns:p14="http://schemas.microsoft.com/office/powerpoint/2010/main" xmlns:a14="http://schemas.microsoft.com/office/drawing/2010/main" xmlns:a16="http://schemas.microsoft.com/office/drawing/2014/main" xmlns="" w="9525">
+                <a14:hiddenLine xmlns="" xmlns:a16="http://schemas.microsoft.com/office/drawing/2014/main" xmlns:a14="http://schemas.microsoft.com/office/drawing/2010/main" xmlns:p14="http://schemas.microsoft.com/office/powerpoint/2010/main" w="9525">
                   <a:solidFill>
                     <a:srgbClr val="000000"/>
                   </a:solidFill>
@@ -22852,7 +22852,7 @@
             </a:ln>
             <a:extLst>
               <a:ext uri="{91240B29-F687-4f45-9708-019B960494DF}">
-                <a14:hiddenLine xmlns:p14="http://schemas.microsoft.com/office/powerpoint/2010/main" xmlns:a14="http://schemas.microsoft.com/office/drawing/2010/main" xmlns:a16="http://schemas.microsoft.com/office/drawing/2014/main" xmlns="" w="9525">
+                <a14:hiddenLine xmlns="" xmlns:a16="http://schemas.microsoft.com/office/drawing/2014/main" xmlns:a14="http://schemas.microsoft.com/office/drawing/2010/main" xmlns:p14="http://schemas.microsoft.com/office/powerpoint/2010/main" w="9525">
                   <a:solidFill>
                     <a:srgbClr val="000000"/>
                   </a:solidFill>
@@ -22957,7 +22957,7 @@
             </a:ln>
             <a:extLst>
               <a:ext uri="{91240B29-F687-4f45-9708-019B960494DF}">
-                <a14:hiddenLine xmlns:p14="http://schemas.microsoft.com/office/powerpoint/2010/main" xmlns:a14="http://schemas.microsoft.com/office/drawing/2010/main" xmlns:a16="http://schemas.microsoft.com/office/drawing/2014/main" xmlns="" w="9525">
+                <a14:hiddenLine xmlns="" xmlns:a16="http://schemas.microsoft.com/office/drawing/2014/main" xmlns:a14="http://schemas.microsoft.com/office/drawing/2010/main" xmlns:p14="http://schemas.microsoft.com/office/powerpoint/2010/main" w="9525">
                   <a:solidFill>
                     <a:srgbClr val="000000"/>
                   </a:solidFill>
@@ -23037,7 +23037,7 @@
             </a:ln>
             <a:extLst>
               <a:ext uri="{91240B29-F687-4f45-9708-019B960494DF}">
-                <a14:hiddenLine xmlns:p14="http://schemas.microsoft.com/office/powerpoint/2010/main" xmlns:a14="http://schemas.microsoft.com/office/drawing/2010/main" xmlns:a16="http://schemas.microsoft.com/office/drawing/2014/main" xmlns="" w="9525">
+                <a14:hiddenLine xmlns="" xmlns:a16="http://schemas.microsoft.com/office/drawing/2014/main" xmlns:a14="http://schemas.microsoft.com/office/drawing/2010/main" xmlns:p14="http://schemas.microsoft.com/office/powerpoint/2010/main" w="9525">
                   <a:solidFill>
                     <a:srgbClr val="000000"/>
                   </a:solidFill>
@@ -23114,7 +23114,7 @@
             </a:ln>
             <a:extLst>
               <a:ext uri="{91240B29-F687-4f45-9708-019B960494DF}">
-                <a14:hiddenLine xmlns:p14="http://schemas.microsoft.com/office/powerpoint/2010/main" xmlns:a14="http://schemas.microsoft.com/office/drawing/2010/main" xmlns:a16="http://schemas.microsoft.com/office/drawing/2014/main" xmlns="" w="9525">
+                <a14:hiddenLine xmlns="" xmlns:a16="http://schemas.microsoft.com/office/drawing/2014/main" xmlns:a14="http://schemas.microsoft.com/office/drawing/2010/main" xmlns:p14="http://schemas.microsoft.com/office/powerpoint/2010/main" w="9525">
                   <a:solidFill>
                     <a:srgbClr val="000000"/>
                   </a:solidFill>
@@ -23219,7 +23219,7 @@
             </a:ln>
             <a:extLst>
               <a:ext uri="{91240B29-F687-4f45-9708-019B960494DF}">
-                <a14:hiddenLine xmlns:p14="http://schemas.microsoft.com/office/powerpoint/2010/main" xmlns:a14="http://schemas.microsoft.com/office/drawing/2010/main" xmlns:a16="http://schemas.microsoft.com/office/drawing/2014/main" xmlns="" w="9525">
+                <a14:hiddenLine xmlns="" xmlns:a16="http://schemas.microsoft.com/office/drawing/2014/main" xmlns:a14="http://schemas.microsoft.com/office/drawing/2010/main" xmlns:p14="http://schemas.microsoft.com/office/powerpoint/2010/main" w="9525">
                   <a:solidFill>
                     <a:srgbClr val="000000"/>
                   </a:solidFill>
@@ -23324,7 +23324,7 @@
             </a:ln>
             <a:extLst>
               <a:ext uri="{91240B29-F687-4f45-9708-019B960494DF}">
-                <a14:hiddenLine xmlns:p14="http://schemas.microsoft.com/office/powerpoint/2010/main" xmlns:a14="http://schemas.microsoft.com/office/drawing/2010/main" xmlns:a16="http://schemas.microsoft.com/office/drawing/2014/main" xmlns="" w="9525">
+                <a14:hiddenLine xmlns="" xmlns:a16="http://schemas.microsoft.com/office/drawing/2014/main" xmlns:a14="http://schemas.microsoft.com/office/drawing/2010/main" xmlns:p14="http://schemas.microsoft.com/office/powerpoint/2010/main" w="9525">
                   <a:solidFill>
                     <a:srgbClr val="000000"/>
                   </a:solidFill>
@@ -23401,7 +23401,7 @@
             </a:ln>
             <a:extLst>
               <a:ext uri="{91240B29-F687-4f45-9708-019B960494DF}">
-                <a14:hiddenLine xmlns:p14="http://schemas.microsoft.com/office/powerpoint/2010/main" xmlns:a14="http://schemas.microsoft.com/office/drawing/2010/main" xmlns:a16="http://schemas.microsoft.com/office/drawing/2014/main" xmlns="" w="9525">
+                <a14:hiddenLine xmlns="" xmlns:a16="http://schemas.microsoft.com/office/drawing/2014/main" xmlns:a14="http://schemas.microsoft.com/office/drawing/2010/main" xmlns:p14="http://schemas.microsoft.com/office/powerpoint/2010/main" w="9525">
                   <a:solidFill>
                     <a:srgbClr val="000000"/>
                   </a:solidFill>
@@ -23536,7 +23536,7 @@
             </a:ln>
             <a:extLst>
               <a:ext uri="{91240B29-F687-4f45-9708-019B960494DF}">
-                <a14:hiddenLine xmlns:p14="http://schemas.microsoft.com/office/powerpoint/2010/main" xmlns:a14="http://schemas.microsoft.com/office/drawing/2010/main" xmlns:a16="http://schemas.microsoft.com/office/drawing/2014/main" xmlns="" w="9525">
+                <a14:hiddenLine xmlns="" xmlns:a16="http://schemas.microsoft.com/office/drawing/2014/main" xmlns:a14="http://schemas.microsoft.com/office/drawing/2010/main" xmlns:p14="http://schemas.microsoft.com/office/powerpoint/2010/main" w="9525">
                   <a:solidFill>
                     <a:srgbClr val="000000"/>
                   </a:solidFill>
@@ -23619,7 +23619,7 @@
             </a:ln>
             <a:extLst>
               <a:ext uri="{91240B29-F687-4f45-9708-019B960494DF}">
-                <a14:hiddenLine xmlns:p14="http://schemas.microsoft.com/office/powerpoint/2010/main" xmlns:a14="http://schemas.microsoft.com/office/drawing/2010/main" xmlns:a16="http://schemas.microsoft.com/office/drawing/2014/main" xmlns="" w="9525">
+                <a14:hiddenLine xmlns="" xmlns:a16="http://schemas.microsoft.com/office/drawing/2014/main" xmlns:a14="http://schemas.microsoft.com/office/drawing/2010/main" xmlns:p14="http://schemas.microsoft.com/office/powerpoint/2010/main" w="9525">
                   <a:solidFill>
                     <a:srgbClr val="000000"/>
                   </a:solidFill>
@@ -23724,7 +23724,7 @@
             </a:ln>
             <a:extLst>
               <a:ext uri="{91240B29-F687-4f45-9708-019B960494DF}">
-                <a14:hiddenLine xmlns:p14="http://schemas.microsoft.com/office/powerpoint/2010/main" xmlns:a14="http://schemas.microsoft.com/office/drawing/2010/main" xmlns:a16="http://schemas.microsoft.com/office/drawing/2014/main" xmlns="" w="9525">
+                <a14:hiddenLine xmlns="" xmlns:a16="http://schemas.microsoft.com/office/drawing/2014/main" xmlns:a14="http://schemas.microsoft.com/office/drawing/2010/main" xmlns:p14="http://schemas.microsoft.com/office/powerpoint/2010/main" w="9525">
                   <a:solidFill>
                     <a:srgbClr val="000000"/>
                   </a:solidFill>
@@ -23854,7 +23854,7 @@
             </a:ln>
             <a:extLst>
               <a:ext uri="{91240B29-F687-4f45-9708-019B960494DF}">
-                <a14:hiddenLine xmlns:p14="http://schemas.microsoft.com/office/powerpoint/2010/main" xmlns:a14="http://schemas.microsoft.com/office/drawing/2010/main" xmlns:a16="http://schemas.microsoft.com/office/drawing/2014/main" xmlns="" w="9525">
+                <a14:hiddenLine xmlns="" xmlns:a16="http://schemas.microsoft.com/office/drawing/2014/main" xmlns:a14="http://schemas.microsoft.com/office/drawing/2010/main" xmlns:p14="http://schemas.microsoft.com/office/powerpoint/2010/main" w="9525">
                   <a:solidFill>
                     <a:srgbClr val="000000"/>
                   </a:solidFill>
@@ -23984,7 +23984,7 @@
             </a:ln>
             <a:extLst>
               <a:ext uri="{91240B29-F687-4f45-9708-019B960494DF}">
-                <a14:hiddenLine xmlns:p14="http://schemas.microsoft.com/office/powerpoint/2010/main" xmlns:a14="http://schemas.microsoft.com/office/drawing/2010/main" xmlns:a16="http://schemas.microsoft.com/office/drawing/2014/main" xmlns="" w="9525">
+                <a14:hiddenLine xmlns="" xmlns:a16="http://schemas.microsoft.com/office/drawing/2014/main" xmlns:a14="http://schemas.microsoft.com/office/drawing/2010/main" xmlns:p14="http://schemas.microsoft.com/office/powerpoint/2010/main" w="9525">
                   <a:solidFill>
                     <a:srgbClr val="000000"/>
                   </a:solidFill>
@@ -24089,7 +24089,7 @@
             </a:ln>
             <a:extLst>
               <a:ext uri="{91240B29-F687-4f45-9708-019B960494DF}">
-                <a14:hiddenLine xmlns:p14="http://schemas.microsoft.com/office/powerpoint/2010/main" xmlns:a14="http://schemas.microsoft.com/office/drawing/2010/main" xmlns:a16="http://schemas.microsoft.com/office/drawing/2014/main" xmlns="" w="9525">
+                <a14:hiddenLine xmlns="" xmlns:a16="http://schemas.microsoft.com/office/drawing/2014/main" xmlns:a14="http://schemas.microsoft.com/office/drawing/2010/main" xmlns:p14="http://schemas.microsoft.com/office/powerpoint/2010/main" w="9525">
                   <a:solidFill>
                     <a:srgbClr val="000000"/>
                   </a:solidFill>
@@ -24169,7 +24169,7 @@
             </a:ln>
             <a:extLst>
               <a:ext uri="{91240B29-F687-4f45-9708-019B960494DF}">
-                <a14:hiddenLine xmlns:p14="http://schemas.microsoft.com/office/powerpoint/2010/main" xmlns:a14="http://schemas.microsoft.com/office/drawing/2010/main" xmlns:a16="http://schemas.microsoft.com/office/drawing/2014/main" xmlns="" w="9525">
+                <a14:hiddenLine xmlns="" xmlns:a16="http://schemas.microsoft.com/office/drawing/2014/main" xmlns:a14="http://schemas.microsoft.com/office/drawing/2010/main" xmlns:p14="http://schemas.microsoft.com/office/powerpoint/2010/main" w="9525">
                   <a:solidFill>
                     <a:srgbClr val="000000"/>
                   </a:solidFill>
@@ -24274,7 +24274,7 @@
             </a:ln>
             <a:extLst>
               <a:ext uri="{91240B29-F687-4f45-9708-019B960494DF}">
-                <a14:hiddenLine xmlns:p14="http://schemas.microsoft.com/office/powerpoint/2010/main" xmlns:a14="http://schemas.microsoft.com/office/drawing/2010/main" xmlns:a16="http://schemas.microsoft.com/office/drawing/2014/main" xmlns="" w="9525">
+                <a14:hiddenLine xmlns="" xmlns:a16="http://schemas.microsoft.com/office/drawing/2014/main" xmlns:a14="http://schemas.microsoft.com/office/drawing/2010/main" xmlns:p14="http://schemas.microsoft.com/office/powerpoint/2010/main" w="9525">
                   <a:solidFill>
                     <a:srgbClr val="000000"/>
                   </a:solidFill>
@@ -24357,7 +24357,7 @@
             </a:ln>
             <a:extLst>
               <a:ext uri="{91240B29-F687-4f45-9708-019B960494DF}">
-                <a14:hiddenLine xmlns:p14="http://schemas.microsoft.com/office/powerpoint/2010/main" xmlns:a14="http://schemas.microsoft.com/office/drawing/2010/main" xmlns:a16="http://schemas.microsoft.com/office/drawing/2014/main" xmlns="" w="9525">
+                <a14:hiddenLine xmlns="" xmlns:a16="http://schemas.microsoft.com/office/drawing/2014/main" xmlns:a14="http://schemas.microsoft.com/office/drawing/2010/main" xmlns:p14="http://schemas.microsoft.com/office/powerpoint/2010/main" w="9525">
                   <a:solidFill>
                     <a:srgbClr val="000000"/>
                   </a:solidFill>
@@ -24462,7 +24462,7 @@
             </a:ln>
             <a:extLst>
               <a:ext uri="{91240B29-F687-4f45-9708-019B960494DF}">
-                <a14:hiddenLine xmlns:p14="http://schemas.microsoft.com/office/powerpoint/2010/main" xmlns:a14="http://schemas.microsoft.com/office/drawing/2010/main" xmlns:a16="http://schemas.microsoft.com/office/drawing/2014/main" xmlns="" w="9525">
+                <a14:hiddenLine xmlns="" xmlns:a16="http://schemas.microsoft.com/office/drawing/2014/main" xmlns:a14="http://schemas.microsoft.com/office/drawing/2010/main" xmlns:p14="http://schemas.microsoft.com/office/powerpoint/2010/main" w="9525">
                   <a:solidFill>
                     <a:srgbClr val="000000"/>
                   </a:solidFill>
@@ -24545,7 +24545,7 @@
             </a:ln>
             <a:extLst>
               <a:ext uri="{91240B29-F687-4f45-9708-019B960494DF}">
-                <a14:hiddenLine xmlns:p14="http://schemas.microsoft.com/office/powerpoint/2010/main" xmlns:a14="http://schemas.microsoft.com/office/drawing/2010/main" xmlns:a16="http://schemas.microsoft.com/office/drawing/2014/main" xmlns="" w="9525">
+                <a14:hiddenLine xmlns="" xmlns:a16="http://schemas.microsoft.com/office/drawing/2014/main" xmlns:a14="http://schemas.microsoft.com/office/drawing/2010/main" xmlns:p14="http://schemas.microsoft.com/office/powerpoint/2010/main" w="9525">
                   <a:solidFill>
                     <a:srgbClr val="000000"/>
                   </a:solidFill>
@@ -24650,7 +24650,7 @@
             </a:ln>
             <a:extLst>
               <a:ext uri="{91240B29-F687-4f45-9708-019B960494DF}">
-                <a14:hiddenLine xmlns:p14="http://schemas.microsoft.com/office/powerpoint/2010/main" xmlns:a14="http://schemas.microsoft.com/office/drawing/2010/main" xmlns:a16="http://schemas.microsoft.com/office/drawing/2014/main" xmlns="" w="9525">
+                <a14:hiddenLine xmlns="" xmlns:a16="http://schemas.microsoft.com/office/drawing/2014/main" xmlns:a14="http://schemas.microsoft.com/office/drawing/2010/main" xmlns:p14="http://schemas.microsoft.com/office/powerpoint/2010/main" w="9525">
                   <a:solidFill>
                     <a:srgbClr val="000000"/>
                   </a:solidFill>
@@ -24699,7 +24699,7 @@
             </a:ln>
             <a:extLst>
               <a:ext uri="{91240B29-F687-4f45-9708-019B960494DF}">
-                <a14:hiddenLine xmlns:p14="http://schemas.microsoft.com/office/powerpoint/2010/main" xmlns:a14="http://schemas.microsoft.com/office/drawing/2010/main" xmlns:a16="http://schemas.microsoft.com/office/drawing/2014/main" xmlns="" w="9525">
+                <a14:hiddenLine xmlns="" xmlns:a16="http://schemas.microsoft.com/office/drawing/2014/main" xmlns:a14="http://schemas.microsoft.com/office/drawing/2010/main" xmlns:p14="http://schemas.microsoft.com/office/powerpoint/2010/main" w="9525">
                   <a:solidFill>
                     <a:srgbClr val="000000"/>
                   </a:solidFill>
@@ -29645,7 +29645,7 @@
                     <a:p>
                       <a:pPr algn="l" rtl="0" fontAlgn="ctr"/>
                       <a:r>
-                        <a:rPr lang="en-US" sz="1400" b="0" i="0" u="none" strike="noStrike">
+                        <a:rPr lang="en-US" sz="1400" b="0" i="0" u="none" strike="noStrike" dirty="0">
                           <a:solidFill>
                             <a:srgbClr val="000000"/>
                           </a:solidFill>
@@ -29852,7 +29852,7 @@
                     <a:p>
                       <a:pPr algn="ctr" rtl="0" fontAlgn="ctr"/>
                       <a:r>
-                        <a:rPr lang="en-US" sz="1400" b="0" i="0" u="none" strike="noStrike">
+                        <a:rPr lang="en-US" sz="1400" b="0" i="0" u="none" strike="noStrike" dirty="0">
                           <a:solidFill>
                             <a:srgbClr val="000000"/>
                           </a:solidFill>
@@ -29872,7 +29872,7 @@
                     <a:p>
                       <a:pPr algn="ctr" rtl="0" fontAlgn="ctr"/>
                       <a:r>
-                        <a:rPr lang="en-US" sz="1400" b="0" i="0" u="none" strike="noStrike">
+                        <a:rPr lang="en-US" sz="1400" b="0" i="0" u="none" strike="noStrike" dirty="0">
                           <a:solidFill>
                             <a:srgbClr val="000000"/>
                           </a:solidFill>
@@ -30059,7 +30059,7 @@
                     <a:p>
                       <a:pPr algn="ctr" rtl="0" fontAlgn="ctr"/>
                       <a:r>
-                        <a:rPr lang="en-US" sz="1400" b="0" i="0" u="none" strike="noStrike">
+                        <a:rPr lang="en-US" sz="1400" b="0" i="0" u="none" strike="noStrike" dirty="0">
                           <a:solidFill>
                             <a:srgbClr val="000000"/>
                           </a:solidFill>
@@ -30246,7 +30246,7 @@
                     <a:p>
                       <a:pPr algn="ctr" rtl="0" fontAlgn="ctr"/>
                       <a:r>
-                        <a:rPr lang="en-US" sz="1400" b="0" i="0" u="none" strike="noStrike">
+                        <a:rPr lang="en-US" sz="1400" b="0" i="0" u="none" strike="noStrike" dirty="0">
                           <a:solidFill>
                             <a:srgbClr val="000000"/>
                           </a:solidFill>

</xml_diff>

<commit_message>
added table title - modified column names
</commit_message>
<xml_diff>
--- a/Team_3_Air_Travel_Weather_Satisfaction.pptx
+++ b/Team_3_Air_Travel_Weather_Satisfaction.pptx
@@ -23,6 +23,7 @@
     <p:sldId id="268" r:id="rId17"/>
     <p:sldId id="259" r:id="rId18"/>
     <p:sldId id="273" r:id="rId19"/>
+    <p:sldId id="275" r:id="rId20"/>
   </p:sldIdLst>
   <p:sldSz cx="12192000" cy="6858000"/>
   <p:notesSz cx="6858000" cy="9144000"/>
@@ -132,7 +133,7 @@
 <file path=ppt/revisionInfo.xml><?xml version="1.0" encoding="utf-8"?>
 <p1510:revInfo xmlns:a="http://schemas.openxmlformats.org/drawingml/2006/main" xmlns:r="http://schemas.openxmlformats.org/officeDocument/2006/relationships" xmlns:p1510="http://schemas.microsoft.com/office/powerpoint/2015/10/main">
   <p1510:revLst>
-    <p1510:client id="{43E20478-7581-4DD6-9A41-2D114A35964C}" v="80" dt="2023-02-10T03:02:57.522"/>
+    <p1510:client id="{43E20478-7581-4DD6-9A41-2D114A35964C}" v="89" dt="2023-02-12T00:57:50.869"/>
   </p1510:revLst>
 </p1510:revInfo>
 </file>
@@ -142,7 +143,7 @@
   <pc:docChgLst>
     <pc:chgData name="Calogera McCormick" userId="e0a4c6cb4146cbe1" providerId="LiveId" clId="{43E20478-7581-4DD6-9A41-2D114A35964C}"/>
     <pc:docChg chg="undo custSel addSld delSld modSld sldOrd">
-      <pc:chgData name="Calogera McCormick" userId="e0a4c6cb4146cbe1" providerId="LiveId" clId="{43E20478-7581-4DD6-9A41-2D114A35964C}" dt="2023-02-10T03:05:39.586" v="9063" actId="14100"/>
+      <pc:chgData name="Calogera McCormick" userId="e0a4c6cb4146cbe1" providerId="LiveId" clId="{43E20478-7581-4DD6-9A41-2D114A35964C}" dt="2023-02-12T01:20:07.789" v="9859" actId="20577"/>
       <pc:docMkLst>
         <pc:docMk/>
       </pc:docMkLst>
@@ -372,7 +373,7 @@
         </pc:picChg>
       </pc:sldChg>
       <pc:sldChg chg="addSp modSp add mod">
-        <pc:chgData name="Calogera McCormick" userId="e0a4c6cb4146cbe1" providerId="LiveId" clId="{43E20478-7581-4DD6-9A41-2D114A35964C}" dt="2023-02-10T03:05:39.586" v="9063" actId="14100"/>
+        <pc:chgData name="Calogera McCormick" userId="e0a4c6cb4146cbe1" providerId="LiveId" clId="{43E20478-7581-4DD6-9A41-2D114A35964C}" dt="2023-02-12T01:20:07.789" v="9859" actId="20577"/>
         <pc:sldMkLst>
           <pc:docMk/>
           <pc:sldMk cId="2652164246" sldId="264"/>
@@ -394,7 +395,7 @@
           </ac:spMkLst>
         </pc:spChg>
         <pc:graphicFrameChg chg="mod modGraphic">
-          <ac:chgData name="Calogera McCormick" userId="e0a4c6cb4146cbe1" providerId="LiveId" clId="{43E20478-7581-4DD6-9A41-2D114A35964C}" dt="2023-02-10T03:05:39.586" v="9063" actId="14100"/>
+          <ac:chgData name="Calogera McCormick" userId="e0a4c6cb4146cbe1" providerId="LiveId" clId="{43E20478-7581-4DD6-9A41-2D114A35964C}" dt="2023-02-12T01:20:07.789" v="9859" actId="20577"/>
           <ac:graphicFrameMkLst>
             <pc:docMk/>
             <pc:sldMk cId="2652164246" sldId="264"/>
@@ -815,6 +816,37 @@
           </ac:spMkLst>
         </pc:spChg>
       </pc:sldChg>
+      <pc:sldChg chg="modSp new mod">
+        <pc:chgData name="Calogera McCormick" userId="e0a4c6cb4146cbe1" providerId="LiveId" clId="{43E20478-7581-4DD6-9A41-2D114A35964C}" dt="2023-02-12T00:05:23.967" v="9255" actId="20577"/>
+        <pc:sldMkLst>
+          <pc:docMk/>
+          <pc:sldMk cId="1632897692" sldId="275"/>
+        </pc:sldMkLst>
+        <pc:spChg chg="mod">
+          <ac:chgData name="Calogera McCormick" userId="e0a4c6cb4146cbe1" providerId="LiveId" clId="{43E20478-7581-4DD6-9A41-2D114A35964C}" dt="2023-02-12T00:04:30.463" v="9112" actId="20577"/>
+          <ac:spMkLst>
+            <pc:docMk/>
+            <pc:sldMk cId="1632897692" sldId="275"/>
+            <ac:spMk id="2" creationId="{7ABA32C3-8E37-A477-75EF-9607C456E63C}"/>
+          </ac:spMkLst>
+        </pc:spChg>
+        <pc:spChg chg="mod">
+          <ac:chgData name="Calogera McCormick" userId="e0a4c6cb4146cbe1" providerId="LiveId" clId="{43E20478-7581-4DD6-9A41-2D114A35964C}" dt="2023-02-12T00:05:17.572" v="9241" actId="14100"/>
+          <ac:spMkLst>
+            <pc:docMk/>
+            <pc:sldMk cId="1632897692" sldId="275"/>
+            <ac:spMk id="3" creationId="{C78ACF02-BA7D-D456-6F9A-D21AEAB61A0D}"/>
+          </ac:spMkLst>
+        </pc:spChg>
+        <pc:spChg chg="mod">
+          <ac:chgData name="Calogera McCormick" userId="e0a4c6cb4146cbe1" providerId="LiveId" clId="{43E20478-7581-4DD6-9A41-2D114A35964C}" dt="2023-02-12T00:05:23.967" v="9255" actId="20577"/>
+          <ac:spMkLst>
+            <pc:docMk/>
+            <pc:sldMk cId="1632897692" sldId="275"/>
+            <ac:spMk id="4" creationId="{BC44D4DF-7575-9D62-00C1-6A8672929F0D}"/>
+          </ac:spMkLst>
+        </pc:spChg>
+      </pc:sldChg>
     </pc:docChg>
   </pc:docChgLst>
 </pc:chgInfo>
@@ -953,7 +985,7 @@
           <a:p>
             <a:fld id="{C21E9E10-B59A-4E9D-AF95-0F4C2023A7FB}" type="datetimeFigureOut">
               <a:rPr lang="en-US" smtClean="0"/>
-              <a:t>2/9/2023</a:t>
+              <a:t>2/11/2023</a:t>
             </a:fld>
             <a:endParaRPr lang="en-US"/>
           </a:p>
@@ -1240,7 +1272,7 @@
           <a:p>
             <a:fld id="{C21E9E10-B59A-4E9D-AF95-0F4C2023A7FB}" type="datetimeFigureOut">
               <a:rPr lang="en-US" smtClean="0"/>
-              <a:t>2/9/2023</a:t>
+              <a:t>2/11/2023</a:t>
             </a:fld>
             <a:endParaRPr lang="en-US"/>
           </a:p>
@@ -1432,7 +1464,7 @@
           <a:p>
             <a:fld id="{C21E9E10-B59A-4E9D-AF95-0F4C2023A7FB}" type="datetimeFigureOut">
               <a:rPr lang="en-US" smtClean="0"/>
-              <a:t>2/9/2023</a:t>
+              <a:t>2/11/2023</a:t>
             </a:fld>
             <a:endParaRPr lang="en-US"/>
           </a:p>
@@ -1693,7 +1725,7 @@
           <a:p>
             <a:fld id="{C21E9E10-B59A-4E9D-AF95-0F4C2023A7FB}" type="datetimeFigureOut">
               <a:rPr lang="en-US" smtClean="0"/>
-              <a:t>2/9/2023</a:t>
+              <a:t>2/11/2023</a:t>
             </a:fld>
             <a:endParaRPr lang="en-US"/>
           </a:p>
@@ -2117,7 +2149,7 @@
           <a:p>
             <a:fld id="{C21E9E10-B59A-4E9D-AF95-0F4C2023A7FB}" type="datetimeFigureOut">
               <a:rPr lang="en-US" smtClean="0"/>
-              <a:t>2/9/2023</a:t>
+              <a:t>2/11/2023</a:t>
             </a:fld>
             <a:endParaRPr lang="en-US"/>
           </a:p>
@@ -2663,7 +2695,7 @@
           <a:p>
             <a:fld id="{C21E9E10-B59A-4E9D-AF95-0F4C2023A7FB}" type="datetimeFigureOut">
               <a:rPr lang="en-US" smtClean="0"/>
-              <a:t>2/9/2023</a:t>
+              <a:t>2/11/2023</a:t>
             </a:fld>
             <a:endParaRPr lang="en-US"/>
           </a:p>
@@ -3503,7 +3535,7 @@
           <a:p>
             <a:fld id="{C21E9E10-B59A-4E9D-AF95-0F4C2023A7FB}" type="datetimeFigureOut">
               <a:rPr lang="en-US" smtClean="0"/>
-              <a:t>2/9/2023</a:t>
+              <a:t>2/11/2023</a:t>
             </a:fld>
             <a:endParaRPr lang="en-US"/>
           </a:p>
@@ -3673,7 +3705,7 @@
           <a:p>
             <a:fld id="{C21E9E10-B59A-4E9D-AF95-0F4C2023A7FB}" type="datetimeFigureOut">
               <a:rPr lang="en-US" smtClean="0"/>
-              <a:t>2/9/2023</a:t>
+              <a:t>2/11/2023</a:t>
             </a:fld>
             <a:endParaRPr lang="en-US"/>
           </a:p>
@@ -3857,7 +3889,7 @@
           <a:p>
             <a:fld id="{C21E9E10-B59A-4E9D-AF95-0F4C2023A7FB}" type="datetimeFigureOut">
               <a:rPr lang="en-US" smtClean="0"/>
-              <a:t>2/9/2023</a:t>
+              <a:t>2/11/2023</a:t>
             </a:fld>
             <a:endParaRPr lang="en-US"/>
           </a:p>
@@ -4027,7 +4059,7 @@
           <a:p>
             <a:fld id="{C21E9E10-B59A-4E9D-AF95-0F4C2023A7FB}" type="datetimeFigureOut">
               <a:rPr lang="en-US" smtClean="0"/>
-              <a:t>2/9/2023</a:t>
+              <a:t>2/11/2023</a:t>
             </a:fld>
             <a:endParaRPr lang="en-US"/>
           </a:p>
@@ -4275,7 +4307,7 @@
           <a:p>
             <a:fld id="{C21E9E10-B59A-4E9D-AF95-0F4C2023A7FB}" type="datetimeFigureOut">
               <a:rPr lang="en-US" smtClean="0"/>
-              <a:t>2/9/2023</a:t>
+              <a:t>2/11/2023</a:t>
             </a:fld>
             <a:endParaRPr lang="en-US"/>
           </a:p>
@@ -4512,7 +4544,7 @@
           <a:p>
             <a:fld id="{C21E9E10-B59A-4E9D-AF95-0F4C2023A7FB}" type="datetimeFigureOut">
               <a:rPr lang="en-US" smtClean="0"/>
-              <a:t>2/9/2023</a:t>
+              <a:t>2/11/2023</a:t>
             </a:fld>
             <a:endParaRPr lang="en-US"/>
           </a:p>
@@ -4885,7 +4917,7 @@
           <a:p>
             <a:fld id="{C21E9E10-B59A-4E9D-AF95-0F4C2023A7FB}" type="datetimeFigureOut">
               <a:rPr lang="en-US" smtClean="0"/>
-              <a:t>2/9/2023</a:t>
+              <a:t>2/11/2023</a:t>
             </a:fld>
             <a:endParaRPr lang="en-US"/>
           </a:p>
@@ -5003,7 +5035,7 @@
           <a:p>
             <a:fld id="{C21E9E10-B59A-4E9D-AF95-0F4C2023A7FB}" type="datetimeFigureOut">
               <a:rPr lang="en-US" smtClean="0"/>
-              <a:t>2/9/2023</a:t>
+              <a:t>2/11/2023</a:t>
             </a:fld>
             <a:endParaRPr lang="en-US"/>
           </a:p>
@@ -5098,7 +5130,7 @@
           <a:p>
             <a:fld id="{C21E9E10-B59A-4E9D-AF95-0F4C2023A7FB}" type="datetimeFigureOut">
               <a:rPr lang="en-US" smtClean="0"/>
-              <a:t>2/9/2023</a:t>
+              <a:t>2/11/2023</a:t>
             </a:fld>
             <a:endParaRPr lang="en-US"/>
           </a:p>
@@ -5349,7 +5381,7 @@
           <a:p>
             <a:fld id="{C21E9E10-B59A-4E9D-AF95-0F4C2023A7FB}" type="datetimeFigureOut">
               <a:rPr lang="en-US" smtClean="0"/>
-              <a:t>2/9/2023</a:t>
+              <a:t>2/11/2023</a:t>
             </a:fld>
             <a:endParaRPr lang="en-US"/>
           </a:p>
@@ -5636,7 +5668,7 @@
           <a:p>
             <a:fld id="{C21E9E10-B59A-4E9D-AF95-0F4C2023A7FB}" type="datetimeFigureOut">
               <a:rPr lang="en-US" smtClean="0"/>
-              <a:t>2/9/2023</a:t>
+              <a:t>2/11/2023</a:t>
             </a:fld>
             <a:endParaRPr lang="en-US"/>
           </a:p>
@@ -5849,7 +5881,7 @@
           <a:p>
             <a:fld id="{C21E9E10-B59A-4E9D-AF95-0F4C2023A7FB}" type="datetimeFigureOut">
               <a:rPr lang="en-US" smtClean="0"/>
-              <a:t>2/9/2023</a:t>
+              <a:t>2/11/2023</a:t>
             </a:fld>
             <a:endParaRPr lang="en-US"/>
           </a:p>
@@ -11769,6 +11801,179 @@
 </p:sld>
 </file>
 
+<file path=ppt/slides/slide19.xml><?xml version="1.0" encoding="utf-8"?>
+<p:sld xmlns:a="http://schemas.openxmlformats.org/drawingml/2006/main" xmlns:r="http://schemas.openxmlformats.org/officeDocument/2006/relationships" xmlns:p="http://schemas.openxmlformats.org/presentationml/2006/main">
+  <p:cSld>
+    <p:spTree>
+      <p:nvGrpSpPr>
+        <p:cNvPr id="1" name=""/>
+        <p:cNvGrpSpPr/>
+        <p:nvPr/>
+      </p:nvGrpSpPr>
+      <p:grpSpPr>
+        <a:xfrm>
+          <a:off x="0" y="0"/>
+          <a:ext cx="0" cy="0"/>
+          <a:chOff x="0" y="0"/>
+          <a:chExt cx="0" cy="0"/>
+        </a:xfrm>
+      </p:grpSpPr>
+      <p:sp>
+        <p:nvSpPr>
+          <p:cNvPr id="2" name="Title 1">
+            <a:extLst>
+              <a:ext uri="{FF2B5EF4-FFF2-40B4-BE49-F238E27FC236}">
+                <a16:creationId xmlns:a16="http://schemas.microsoft.com/office/drawing/2014/main" id="{7ABA32C3-8E37-A477-75EF-9607C456E63C}"/>
+              </a:ext>
+            </a:extLst>
+          </p:cNvPr>
+          <p:cNvSpPr>
+            <a:spLocks noGrp="1"/>
+          </p:cNvSpPr>
+          <p:nvPr>
+            <p:ph type="title"/>
+          </p:nvPr>
+        </p:nvSpPr>
+        <p:spPr/>
+        <p:txBody>
+          <a:bodyPr/>
+          <a:lstStyle/>
+          <a:p>
+            <a:r>
+              <a:rPr lang="en-US" dirty="0" err="1"/>
+              <a:t>TakeAWAYS</a:t>
+            </a:r>
+            <a:endParaRPr lang="en-US" dirty="0"/>
+          </a:p>
+        </p:txBody>
+      </p:sp>
+      <p:sp>
+        <p:nvSpPr>
+          <p:cNvPr id="3" name="Text Placeholder 2">
+            <a:extLst>
+              <a:ext uri="{FF2B5EF4-FFF2-40B4-BE49-F238E27FC236}">
+                <a16:creationId xmlns:a16="http://schemas.microsoft.com/office/drawing/2014/main" id="{C78ACF02-BA7D-D456-6F9A-D21AEAB61A0D}"/>
+              </a:ext>
+            </a:extLst>
+          </p:cNvPr>
+          <p:cNvSpPr>
+            <a:spLocks noGrp="1"/>
+          </p:cNvSpPr>
+          <p:nvPr>
+            <p:ph type="body" idx="1"/>
+          </p:nvPr>
+        </p:nvSpPr>
+        <p:spPr>
+          <a:xfrm>
+            <a:off x="924444" y="2088320"/>
+            <a:ext cx="5096560" cy="823912"/>
+          </a:xfrm>
+        </p:spPr>
+        <p:txBody>
+          <a:bodyPr/>
+          <a:lstStyle/>
+          <a:p>
+            <a:endParaRPr lang="en-US"/>
+          </a:p>
+        </p:txBody>
+      </p:sp>
+      <p:sp>
+        <p:nvSpPr>
+          <p:cNvPr id="4" name="Content Placeholder 3">
+            <a:extLst>
+              <a:ext uri="{FF2B5EF4-FFF2-40B4-BE49-F238E27FC236}">
+                <a16:creationId xmlns:a16="http://schemas.microsoft.com/office/drawing/2014/main" id="{BC44D4DF-7575-9D62-00C1-6A8672929F0D}"/>
+              </a:ext>
+            </a:extLst>
+          </p:cNvPr>
+          <p:cNvSpPr>
+            <a:spLocks noGrp="1"/>
+          </p:cNvSpPr>
+          <p:nvPr>
+            <p:ph sz="half" idx="2"/>
+          </p:nvPr>
+        </p:nvSpPr>
+        <p:spPr/>
+        <p:txBody>
+          <a:bodyPr/>
+          <a:lstStyle/>
+          <a:p>
+            <a:r>
+              <a:rPr lang="en-US" dirty="0"/>
+              <a:t>Order of programming matters – example weather subgroup before or after</a:t>
+            </a:r>
+          </a:p>
+          <a:p>
+            <a:r>
+              <a:rPr lang="en-US" dirty="0"/>
+              <a:t>Use other tools for logic check, if needed</a:t>
+            </a:r>
+          </a:p>
+        </p:txBody>
+      </p:sp>
+      <p:sp>
+        <p:nvSpPr>
+          <p:cNvPr id="5" name="Text Placeholder 4">
+            <a:extLst>
+              <a:ext uri="{FF2B5EF4-FFF2-40B4-BE49-F238E27FC236}">
+                <a16:creationId xmlns:a16="http://schemas.microsoft.com/office/drawing/2014/main" id="{B6983070-CDA1-EAE4-D4A2-0F7BFB0A4D92}"/>
+              </a:ext>
+            </a:extLst>
+          </p:cNvPr>
+          <p:cNvSpPr>
+            <a:spLocks noGrp="1"/>
+          </p:cNvSpPr>
+          <p:nvPr>
+            <p:ph type="body" sz="quarter" idx="3"/>
+          </p:nvPr>
+        </p:nvSpPr>
+        <p:spPr/>
+        <p:txBody>
+          <a:bodyPr/>
+          <a:lstStyle/>
+          <a:p>
+            <a:endParaRPr lang="en-US"/>
+          </a:p>
+        </p:txBody>
+      </p:sp>
+      <p:sp>
+        <p:nvSpPr>
+          <p:cNvPr id="6" name="Content Placeholder 5">
+            <a:extLst>
+              <a:ext uri="{FF2B5EF4-FFF2-40B4-BE49-F238E27FC236}">
+                <a16:creationId xmlns:a16="http://schemas.microsoft.com/office/drawing/2014/main" id="{86334E78-C71D-C0F6-79CE-7956E53D9D03}"/>
+              </a:ext>
+            </a:extLst>
+          </p:cNvPr>
+          <p:cNvSpPr>
+            <a:spLocks noGrp="1"/>
+          </p:cNvSpPr>
+          <p:nvPr>
+            <p:ph sz="quarter" idx="4"/>
+          </p:nvPr>
+        </p:nvSpPr>
+        <p:spPr/>
+        <p:txBody>
+          <a:bodyPr/>
+          <a:lstStyle/>
+          <a:p>
+            <a:endParaRPr lang="en-US"/>
+          </a:p>
+        </p:txBody>
+      </p:sp>
+    </p:spTree>
+    <p:extLst>
+      <p:ext uri="{BB962C8B-B14F-4D97-AF65-F5344CB8AC3E}">
+        <p14:creationId xmlns:p14="http://schemas.microsoft.com/office/powerpoint/2010/main" val="1632897692"/>
+      </p:ext>
+    </p:extLst>
+  </p:cSld>
+  <p:clrMapOvr>
+    <a:masterClrMapping/>
+  </p:clrMapOvr>
+</p:sld>
+</file>
+
 <file path=ppt/slides/slide2.xml><?xml version="1.0" encoding="utf-8"?>
 <p:sld xmlns:a="http://schemas.openxmlformats.org/drawingml/2006/main" xmlns:r="http://schemas.openxmlformats.org/officeDocument/2006/relationships" xmlns:p="http://schemas.openxmlformats.org/presentationml/2006/main">
   <p:cSld>
@@ -12057,14 +12262,14 @@
           <p:nvPr>
             <p:extLst>
               <p:ext uri="{D42A27DB-BD31-4B8C-83A1-F6EECF244321}">
-                <p14:modId xmlns:p14="http://schemas.microsoft.com/office/powerpoint/2010/main" val="2636216396"/>
+                <p14:modId xmlns:p14="http://schemas.microsoft.com/office/powerpoint/2010/main" val="2309816840"/>
               </p:ext>
             </p:extLst>
           </p:nvPr>
         </p:nvGraphicFramePr>
         <p:xfrm>
           <a:off x="240384" y="691454"/>
-          <a:ext cx="11660465" cy="5186158"/>
+          <a:ext cx="11660465" cy="8733959"/>
         </p:xfrm>
         <a:graphic>
           <a:graphicData uri="http://schemas.openxmlformats.org/drawingml/2006/table">
@@ -12116,7 +12321,7 @@
                           <a:latin typeface="Arial" panose="020B0604020202020204" pitchFamily="34" charset="0"/>
                           <a:cs typeface="Arial" panose="020B0604020202020204" pitchFamily="34" charset="0"/>
                         </a:rPr>
-                        <a:t>Team</a:t>
+                        <a:t>Source</a:t>
                       </a:r>
                     </a:p>
                   </a:txBody>
@@ -12182,6 +12387,844 @@
                 <a:extLst>
                   <a:ext uri="{0D108BD9-81ED-4DB2-BD59-A6C34878D82A}">
                     <a16:rowId xmlns:a16="http://schemas.microsoft.com/office/drawing/2014/main" val="2245751984"/>
+                  </a:ext>
+                </a:extLst>
+              </a:tr>
+              <a:tr h="161584">
+                <a:tc>
+                  <a:txBody>
+                    <a:bodyPr/>
+                    <a:lstStyle/>
+                    <a:p>
+                      <a:pPr marL="0" marR="0" lvl="0" indent="0" algn="l" defTabSz="914400" rtl="0" eaLnBrk="1" fontAlgn="auto" latinLnBrk="0" hangingPunct="1">
+                        <a:lnSpc>
+                          <a:spcPct val="100000"/>
+                        </a:lnSpc>
+                        <a:spcBef>
+                          <a:spcPts val="0"/>
+                        </a:spcBef>
+                        <a:spcAft>
+                          <a:spcPts val="0"/>
+                        </a:spcAft>
+                        <a:buClrTx/>
+                        <a:buSzTx/>
+                        <a:buFont typeface="Arial" panose="020B0604020202020204" pitchFamily="34" charset="0"/>
+                        <a:buNone/>
+                        <a:tabLst/>
+                        <a:defRPr/>
+                      </a:pPr>
+                      <a:r>
+                        <a:rPr lang="en-US" sz="1000" dirty="0">
+                          <a:latin typeface="Arial" panose="020B0604020202020204" pitchFamily="34" charset="0"/>
+                          <a:cs typeface="Arial" panose="020B0604020202020204" pitchFamily="34" charset="0"/>
+                        </a:rPr>
+                        <a:t>Table 1</a:t>
+                      </a:r>
+                    </a:p>
+                    <a:p>
+                      <a:pPr marL="0" marR="0" lvl="0" indent="0" algn="l" defTabSz="914400" rtl="0" eaLnBrk="1" fontAlgn="auto" latinLnBrk="0" hangingPunct="1">
+                        <a:lnSpc>
+                          <a:spcPct val="100000"/>
+                        </a:lnSpc>
+                        <a:spcBef>
+                          <a:spcPts val="0"/>
+                        </a:spcBef>
+                        <a:spcAft>
+                          <a:spcPts val="0"/>
+                        </a:spcAft>
+                        <a:buClrTx/>
+                        <a:buSzTx/>
+                        <a:buFont typeface="Arial" panose="020B0604020202020204" pitchFamily="34" charset="0"/>
+                        <a:buNone/>
+                        <a:tabLst/>
+                        <a:defRPr/>
+                      </a:pPr>
+                      <a:r>
+                        <a:rPr lang="en-US" sz="1000" dirty="0">
+                          <a:latin typeface="Arial" panose="020B0604020202020204" pitchFamily="34" charset="0"/>
+                          <a:cs typeface="Arial" panose="020B0604020202020204" pitchFamily="34" charset="0"/>
+                        </a:rPr>
+                        <a:t>Table 2</a:t>
+                      </a:r>
+                    </a:p>
+                  </a:txBody>
+                  <a:tcPr/>
+                </a:tc>
+                <a:tc>
+                  <a:txBody>
+                    <a:bodyPr/>
+                    <a:lstStyle/>
+                    <a:p>
+                      <a:pPr marL="0" marR="0" lvl="0" indent="0" algn="l" defTabSz="914400" rtl="0" eaLnBrk="1" fontAlgn="auto" latinLnBrk="0" hangingPunct="1">
+                        <a:lnSpc>
+                          <a:spcPct val="100000"/>
+                        </a:lnSpc>
+                        <a:spcBef>
+                          <a:spcPts val="0"/>
+                        </a:spcBef>
+                        <a:spcAft>
+                          <a:spcPts val="0"/>
+                        </a:spcAft>
+                        <a:buClrTx/>
+                        <a:buSzTx/>
+                        <a:buFont typeface="Arial" panose="020B0604020202020204" pitchFamily="34" charset="0"/>
+                        <a:buNone/>
+                        <a:tabLst/>
+                        <a:defRPr/>
+                      </a:pPr>
+                      <a:r>
+                        <a:rPr lang="en-US" sz="1000" dirty="0">
+                          <a:latin typeface="Arial" panose="020B0604020202020204" pitchFamily="34" charset="0"/>
+                          <a:cs typeface="Arial" panose="020B0604020202020204" pitchFamily="34" charset="0"/>
+                        </a:rPr>
+                        <a:t>Delays</a:t>
+                      </a:r>
+                    </a:p>
+                  </a:txBody>
+                  <a:tcPr/>
+                </a:tc>
+                <a:tc>
+                  <a:txBody>
+                    <a:bodyPr/>
+                    <a:lstStyle/>
+                    <a:p>
+                      <a:pPr marL="0" marR="0" lvl="0" indent="0" algn="l" defTabSz="914400" rtl="0" eaLnBrk="1" fontAlgn="auto" latinLnBrk="0" hangingPunct="1">
+                        <a:lnSpc>
+                          <a:spcPct val="100000"/>
+                        </a:lnSpc>
+                        <a:spcBef>
+                          <a:spcPts val="0"/>
+                        </a:spcBef>
+                        <a:spcAft>
+                          <a:spcPts val="0"/>
+                        </a:spcAft>
+                        <a:buClrTx/>
+                        <a:buSzTx/>
+                        <a:buFontTx/>
+                        <a:buNone/>
+                        <a:tabLst/>
+                        <a:defRPr/>
+                      </a:pPr>
+                      <a:r>
+                        <a:rPr lang="en-US" sz="1000" dirty="0">
+                          <a:latin typeface="Arial" panose="020B0604020202020204" pitchFamily="34" charset="0"/>
+                          <a:cs typeface="Arial" panose="020B0604020202020204" pitchFamily="34" charset="0"/>
+                        </a:rPr>
+                        <a:t>Number of delayed, cancelled and diverted flights in all US for 20 years for </a:t>
+                      </a:r>
+                      <a:r>
+                        <a:rPr lang="en-US" sz="1000" b="1" dirty="0">
+                          <a:latin typeface="Arial" panose="020B0604020202020204" pitchFamily="34" charset="0"/>
+                          <a:cs typeface="Arial" panose="020B0604020202020204" pitchFamily="34" charset="0"/>
+                        </a:rPr>
+                        <a:t>any reason and for last 5 years for any reason.</a:t>
+                      </a:r>
+                    </a:p>
+                  </a:txBody>
+                  <a:tcPr/>
+                </a:tc>
+                <a:tc>
+                  <a:txBody>
+                    <a:bodyPr/>
+                    <a:lstStyle/>
+                    <a:p>
+                      <a:pPr marL="0" marR="0" lvl="0" indent="0" algn="l" defTabSz="914400" rtl="0" eaLnBrk="1" fontAlgn="auto" latinLnBrk="0" hangingPunct="1">
+                        <a:lnSpc>
+                          <a:spcPct val="100000"/>
+                        </a:lnSpc>
+                        <a:spcBef>
+                          <a:spcPts val="0"/>
+                        </a:spcBef>
+                        <a:spcAft>
+                          <a:spcPts val="0"/>
+                        </a:spcAft>
+                        <a:buClrTx/>
+                        <a:buSzTx/>
+                        <a:buFontTx/>
+                        <a:buNone/>
+                        <a:tabLst/>
+                        <a:defRPr/>
+                      </a:pPr>
+                      <a:r>
+                        <a:rPr lang="en-US" sz="1000" b="1" dirty="0">
+                          <a:highlight>
+                            <a:srgbClr val="FFFF00"/>
+                          </a:highlight>
+                          <a:latin typeface="Arial" panose="020B0604020202020204" pitchFamily="34" charset="0"/>
+                          <a:cs typeface="Arial" panose="020B0604020202020204" pitchFamily="34" charset="0"/>
+                        </a:rPr>
+                        <a:t>How have the delays for the last 5 years (2018 to 2022) compared to the prior years</a:t>
+                      </a:r>
+                    </a:p>
+                  </a:txBody>
+                  <a:tcPr/>
+                </a:tc>
+                <a:extLst>
+                  <a:ext uri="{0D108BD9-81ED-4DB2-BD59-A6C34878D82A}">
+                    <a16:rowId xmlns:a16="http://schemas.microsoft.com/office/drawing/2014/main" val="2164387241"/>
+                  </a:ext>
+                </a:extLst>
+              </a:tr>
+              <a:tr h="0">
+                <a:tc>
+                  <a:txBody>
+                    <a:bodyPr/>
+                    <a:lstStyle/>
+                    <a:p>
+                      <a:pPr marL="0" marR="0" lvl="0" indent="0" algn="l" defTabSz="914400" rtl="0" eaLnBrk="1" fontAlgn="auto" latinLnBrk="0" hangingPunct="1">
+                        <a:lnSpc>
+                          <a:spcPct val="100000"/>
+                        </a:lnSpc>
+                        <a:spcBef>
+                          <a:spcPts val="0"/>
+                        </a:spcBef>
+                        <a:spcAft>
+                          <a:spcPts val="0"/>
+                        </a:spcAft>
+                        <a:buClrTx/>
+                        <a:buSzTx/>
+                        <a:buFont typeface="Arial" panose="020B0604020202020204" pitchFamily="34" charset="0"/>
+                        <a:buNone/>
+                        <a:tabLst/>
+                        <a:defRPr/>
+                      </a:pPr>
+                      <a:r>
+                        <a:rPr lang="en-US" sz="1000" dirty="0">
+                          <a:latin typeface="Arial" panose="020B0604020202020204" pitchFamily="34" charset="0"/>
+                          <a:cs typeface="Arial" panose="020B0604020202020204" pitchFamily="34" charset="0"/>
+                        </a:rPr>
+                        <a:t>Table 3</a:t>
+                      </a:r>
+                    </a:p>
+                    <a:p>
+                      <a:pPr marL="0" marR="0" lvl="0" indent="0" algn="l" defTabSz="914400" rtl="0" eaLnBrk="1" fontAlgn="auto" latinLnBrk="0" hangingPunct="1">
+                        <a:lnSpc>
+                          <a:spcPct val="100000"/>
+                        </a:lnSpc>
+                        <a:spcBef>
+                          <a:spcPts val="0"/>
+                        </a:spcBef>
+                        <a:spcAft>
+                          <a:spcPts val="0"/>
+                        </a:spcAft>
+                        <a:buClrTx/>
+                        <a:buSzTx/>
+                        <a:buFont typeface="Arial" panose="020B0604020202020204" pitchFamily="34" charset="0"/>
+                        <a:buNone/>
+                        <a:tabLst/>
+                        <a:defRPr/>
+                      </a:pPr>
+                      <a:r>
+                        <a:rPr lang="en-US" sz="1000" dirty="0">
+                          <a:latin typeface="Arial" panose="020B0604020202020204" pitchFamily="34" charset="0"/>
+                          <a:cs typeface="Arial" panose="020B0604020202020204" pitchFamily="34" charset="0"/>
+                        </a:rPr>
+                        <a:t>Table 4</a:t>
+                      </a:r>
+                    </a:p>
+                  </a:txBody>
+                  <a:tcPr/>
+                </a:tc>
+                <a:tc>
+                  <a:txBody>
+                    <a:bodyPr/>
+                    <a:lstStyle/>
+                    <a:p>
+                      <a:pPr marL="0" marR="0" lvl="0" indent="0" algn="l" defTabSz="914400" rtl="0" eaLnBrk="1" fontAlgn="auto" latinLnBrk="0" hangingPunct="1">
+                        <a:lnSpc>
+                          <a:spcPct val="100000"/>
+                        </a:lnSpc>
+                        <a:spcBef>
+                          <a:spcPts val="0"/>
+                        </a:spcBef>
+                        <a:spcAft>
+                          <a:spcPts val="0"/>
+                        </a:spcAft>
+                        <a:buClrTx/>
+                        <a:buSzTx/>
+                        <a:buFont typeface="Arial" panose="020B0604020202020204" pitchFamily="34" charset="0"/>
+                        <a:buNone/>
+                        <a:tabLst/>
+                        <a:defRPr/>
+                      </a:pPr>
+                      <a:r>
+                        <a:rPr lang="en-US" sz="1000" dirty="0">
+                          <a:latin typeface="Arial" panose="020B0604020202020204" pitchFamily="34" charset="0"/>
+                          <a:cs typeface="Arial" panose="020B0604020202020204" pitchFamily="34" charset="0"/>
+                        </a:rPr>
+                        <a:t>Delays</a:t>
+                      </a:r>
+                    </a:p>
+                  </a:txBody>
+                  <a:tcPr/>
+                </a:tc>
+                <a:tc>
+                  <a:txBody>
+                    <a:bodyPr/>
+                    <a:lstStyle/>
+                    <a:p>
+                      <a:pPr marL="0" marR="0" lvl="0" indent="0" algn="l" defTabSz="914400" rtl="0" eaLnBrk="1" fontAlgn="auto" latinLnBrk="0" hangingPunct="1">
+                        <a:lnSpc>
+                          <a:spcPct val="100000"/>
+                        </a:lnSpc>
+                        <a:spcBef>
+                          <a:spcPts val="0"/>
+                        </a:spcBef>
+                        <a:spcAft>
+                          <a:spcPts val="0"/>
+                        </a:spcAft>
+                        <a:buClrTx/>
+                        <a:buSzTx/>
+                        <a:buFontTx/>
+                        <a:buNone/>
+                        <a:tabLst/>
+                        <a:defRPr/>
+                      </a:pPr>
+                      <a:r>
+                        <a:rPr lang="en-US" sz="1000" dirty="0">
+                          <a:latin typeface="Arial" panose="020B0604020202020204" pitchFamily="34" charset="0"/>
+                          <a:cs typeface="Arial" panose="020B0604020202020204" pitchFamily="34" charset="0"/>
+                        </a:rPr>
+                        <a:t>Number of delayed flights in all US for 20 years and last 5 years for </a:t>
+                      </a:r>
+                      <a:r>
+                        <a:rPr lang="en-US" sz="1000" b="1" dirty="0">
+                          <a:latin typeface="Arial" panose="020B0604020202020204" pitchFamily="34" charset="0"/>
+                          <a:cs typeface="Arial" panose="020B0604020202020204" pitchFamily="34" charset="0"/>
+                        </a:rPr>
+                        <a:t>any reason (includes all airlines in US) (total aggregate sum)</a:t>
+                      </a:r>
+                    </a:p>
+                  </a:txBody>
+                  <a:tcPr/>
+                </a:tc>
+                <a:tc>
+                  <a:txBody>
+                    <a:bodyPr/>
+                    <a:lstStyle/>
+                    <a:p>
+                      <a:pPr marL="0" marR="0" lvl="0" indent="0" algn="l" defTabSz="914400" rtl="0" eaLnBrk="1" fontAlgn="auto" latinLnBrk="0" hangingPunct="1">
+                        <a:lnSpc>
+                          <a:spcPct val="100000"/>
+                        </a:lnSpc>
+                        <a:spcBef>
+                          <a:spcPts val="0"/>
+                        </a:spcBef>
+                        <a:spcAft>
+                          <a:spcPts val="0"/>
+                        </a:spcAft>
+                        <a:buClrTx/>
+                        <a:buSzTx/>
+                        <a:buFontTx/>
+                        <a:buNone/>
+                        <a:tabLst/>
+                        <a:defRPr/>
+                      </a:pPr>
+                      <a:endParaRPr lang="en-US" sz="1000" b="1" dirty="0">
+                        <a:latin typeface="Arial" panose="020B0604020202020204" pitchFamily="34" charset="0"/>
+                        <a:cs typeface="Arial" panose="020B0604020202020204" pitchFamily="34" charset="0"/>
+                      </a:endParaRPr>
+                    </a:p>
+                  </a:txBody>
+                  <a:tcPr/>
+                </a:tc>
+                <a:extLst>
+                  <a:ext uri="{0D108BD9-81ED-4DB2-BD59-A6C34878D82A}">
+                    <a16:rowId xmlns:a16="http://schemas.microsoft.com/office/drawing/2014/main" val="783266091"/>
+                  </a:ext>
+                </a:extLst>
+              </a:tr>
+              <a:tr h="0">
+                <a:tc>
+                  <a:txBody>
+                    <a:bodyPr/>
+                    <a:lstStyle/>
+                    <a:p>
+                      <a:pPr marL="0" marR="0" lvl="0" indent="0" algn="l" defTabSz="914400" rtl="0" eaLnBrk="1" fontAlgn="auto" latinLnBrk="0" hangingPunct="1">
+                        <a:lnSpc>
+                          <a:spcPct val="100000"/>
+                        </a:lnSpc>
+                        <a:spcBef>
+                          <a:spcPts val="0"/>
+                        </a:spcBef>
+                        <a:spcAft>
+                          <a:spcPts val="0"/>
+                        </a:spcAft>
+                        <a:buClrTx/>
+                        <a:buSzTx/>
+                        <a:buFont typeface="Arial" panose="020B0604020202020204" pitchFamily="34" charset="0"/>
+                        <a:buNone/>
+                        <a:tabLst/>
+                        <a:defRPr/>
+                      </a:pPr>
+                      <a:r>
+                        <a:rPr lang="en-US" sz="1000" dirty="0">
+                          <a:latin typeface="Arial" panose="020B0604020202020204" pitchFamily="34" charset="0"/>
+                          <a:cs typeface="Arial" panose="020B0604020202020204" pitchFamily="34" charset="0"/>
+                        </a:rPr>
+                        <a:t>Table 5</a:t>
+                      </a:r>
+                    </a:p>
+                  </a:txBody>
+                  <a:tcPr/>
+                </a:tc>
+                <a:tc>
+                  <a:txBody>
+                    <a:bodyPr/>
+                    <a:lstStyle/>
+                    <a:p>
+                      <a:pPr marL="0" marR="0" lvl="0" indent="0" algn="l" defTabSz="914400" rtl="0" eaLnBrk="1" fontAlgn="auto" latinLnBrk="0" hangingPunct="1">
+                        <a:lnSpc>
+                          <a:spcPct val="100000"/>
+                        </a:lnSpc>
+                        <a:spcBef>
+                          <a:spcPts val="0"/>
+                        </a:spcBef>
+                        <a:spcAft>
+                          <a:spcPts val="0"/>
+                        </a:spcAft>
+                        <a:buClrTx/>
+                        <a:buSzTx/>
+                        <a:buFont typeface="Arial" panose="020B0604020202020204" pitchFamily="34" charset="0"/>
+                        <a:buNone/>
+                        <a:tabLst/>
+                        <a:defRPr/>
+                      </a:pPr>
+                      <a:r>
+                        <a:rPr lang="en-US" sz="1000" dirty="0">
+                          <a:latin typeface="Arial" panose="020B0604020202020204" pitchFamily="34" charset="0"/>
+                          <a:cs typeface="Arial" panose="020B0604020202020204" pitchFamily="34" charset="0"/>
+                        </a:rPr>
+                        <a:t>Delays</a:t>
+                      </a:r>
+                    </a:p>
+                  </a:txBody>
+                  <a:tcPr/>
+                </a:tc>
+                <a:tc>
+                  <a:txBody>
+                    <a:bodyPr/>
+                    <a:lstStyle/>
+                    <a:p>
+                      <a:pPr marL="0" marR="0" lvl="0" indent="0" algn="l" defTabSz="914400" rtl="0" eaLnBrk="1" fontAlgn="auto" latinLnBrk="0" hangingPunct="1">
+                        <a:lnSpc>
+                          <a:spcPct val="100000"/>
+                        </a:lnSpc>
+                        <a:spcBef>
+                          <a:spcPts val="0"/>
+                        </a:spcBef>
+                        <a:spcAft>
+                          <a:spcPts val="0"/>
+                        </a:spcAft>
+                        <a:buClrTx/>
+                        <a:buSzTx/>
+                        <a:buFontTx/>
+                        <a:buNone/>
+                        <a:tabLst/>
+                        <a:defRPr/>
+                      </a:pPr>
+                      <a:r>
+                        <a:rPr lang="en-US" sz="1000" dirty="0">
+                          <a:latin typeface="Arial" panose="020B0604020202020204" pitchFamily="34" charset="0"/>
+                          <a:cs typeface="Arial" panose="020B0604020202020204" pitchFamily="34" charset="0"/>
+                        </a:rPr>
+                        <a:t>Number of delayed flights in all US for 20 years and 5 years for </a:t>
+                      </a:r>
+                      <a:r>
+                        <a:rPr lang="en-US" sz="1000" b="1" dirty="0">
+                          <a:latin typeface="Arial" panose="020B0604020202020204" pitchFamily="34" charset="0"/>
+                          <a:cs typeface="Arial" panose="020B0604020202020204" pitchFamily="34" charset="0"/>
+                        </a:rPr>
+                        <a:t>any reason for select AIRPORTS (total aggregate sum) – airports with at least 1 month with &gt;= 50 weather delays in 2018 to 2022 by any airline</a:t>
+                      </a:r>
+                    </a:p>
+                  </a:txBody>
+                  <a:tcPr/>
+                </a:tc>
+                <a:tc>
+                  <a:txBody>
+                    <a:bodyPr/>
+                    <a:lstStyle/>
+                    <a:p>
+                      <a:pPr marL="0" marR="0" lvl="0" indent="0" algn="l" defTabSz="914400" rtl="0" eaLnBrk="1" fontAlgn="auto" latinLnBrk="0" hangingPunct="1">
+                        <a:lnSpc>
+                          <a:spcPct val="100000"/>
+                        </a:lnSpc>
+                        <a:spcBef>
+                          <a:spcPts val="0"/>
+                        </a:spcBef>
+                        <a:spcAft>
+                          <a:spcPts val="0"/>
+                        </a:spcAft>
+                        <a:buClrTx/>
+                        <a:buSzTx/>
+                        <a:buFontTx/>
+                        <a:buNone/>
+                        <a:tabLst/>
+                        <a:defRPr/>
+                      </a:pPr>
+                      <a:endParaRPr lang="en-US" sz="1000" b="1" dirty="0">
+                        <a:latin typeface="Arial" panose="020B0604020202020204" pitchFamily="34" charset="0"/>
+                        <a:cs typeface="Arial" panose="020B0604020202020204" pitchFamily="34" charset="0"/>
+                      </a:endParaRPr>
+                    </a:p>
+                  </a:txBody>
+                  <a:tcPr/>
+                </a:tc>
+                <a:extLst>
+                  <a:ext uri="{0D108BD9-81ED-4DB2-BD59-A6C34878D82A}">
+                    <a16:rowId xmlns:a16="http://schemas.microsoft.com/office/drawing/2014/main" val="1723643592"/>
+                  </a:ext>
+                </a:extLst>
+              </a:tr>
+              <a:tr h="0">
+                <a:tc>
+                  <a:txBody>
+                    <a:bodyPr/>
+                    <a:lstStyle/>
+                    <a:p>
+                      <a:pPr marL="0" marR="0" lvl="0" indent="0" algn="l" defTabSz="914400" rtl="0" eaLnBrk="1" fontAlgn="auto" latinLnBrk="0" hangingPunct="1">
+                        <a:lnSpc>
+                          <a:spcPct val="100000"/>
+                        </a:lnSpc>
+                        <a:spcBef>
+                          <a:spcPts val="0"/>
+                        </a:spcBef>
+                        <a:spcAft>
+                          <a:spcPts val="0"/>
+                        </a:spcAft>
+                        <a:buClrTx/>
+                        <a:buSzTx/>
+                        <a:buFont typeface="Arial" panose="020B0604020202020204" pitchFamily="34" charset="0"/>
+                        <a:buNone/>
+                        <a:tabLst/>
+                        <a:defRPr/>
+                      </a:pPr>
+                      <a:r>
+                        <a:rPr lang="en-US" sz="1000" dirty="0">
+                          <a:latin typeface="Arial" panose="020B0604020202020204" pitchFamily="34" charset="0"/>
+                          <a:cs typeface="Arial" panose="020B0604020202020204" pitchFamily="34" charset="0"/>
+                        </a:rPr>
+                        <a:t>Table 7</a:t>
+                      </a:r>
+                    </a:p>
+                    <a:p>
+                      <a:pPr marL="0" marR="0" lvl="0" indent="0" algn="l" defTabSz="914400" rtl="0" eaLnBrk="1" fontAlgn="auto" latinLnBrk="0" hangingPunct="1">
+                        <a:lnSpc>
+                          <a:spcPct val="100000"/>
+                        </a:lnSpc>
+                        <a:spcBef>
+                          <a:spcPts val="0"/>
+                        </a:spcBef>
+                        <a:spcAft>
+                          <a:spcPts val="0"/>
+                        </a:spcAft>
+                        <a:buClrTx/>
+                        <a:buSzTx/>
+                        <a:buFont typeface="Arial" panose="020B0604020202020204" pitchFamily="34" charset="0"/>
+                        <a:buNone/>
+                        <a:tabLst/>
+                        <a:defRPr/>
+                      </a:pPr>
+                      <a:r>
+                        <a:rPr lang="en-US" sz="1000" dirty="0">
+                          <a:latin typeface="Arial" panose="020B0604020202020204" pitchFamily="34" charset="0"/>
+                          <a:cs typeface="Arial" panose="020B0604020202020204" pitchFamily="34" charset="0"/>
+                        </a:rPr>
+                        <a:t>Table 8</a:t>
+                      </a:r>
+                    </a:p>
+                  </a:txBody>
+                  <a:tcPr/>
+                </a:tc>
+                <a:tc>
+                  <a:txBody>
+                    <a:bodyPr/>
+                    <a:lstStyle/>
+                    <a:p>
+                      <a:pPr marL="0" marR="0" lvl="0" indent="0" algn="l" defTabSz="914400" rtl="0" eaLnBrk="1" fontAlgn="auto" latinLnBrk="0" hangingPunct="1">
+                        <a:lnSpc>
+                          <a:spcPct val="100000"/>
+                        </a:lnSpc>
+                        <a:spcBef>
+                          <a:spcPts val="0"/>
+                        </a:spcBef>
+                        <a:spcAft>
+                          <a:spcPts val="0"/>
+                        </a:spcAft>
+                        <a:buClrTx/>
+                        <a:buSzTx/>
+                        <a:buFont typeface="Arial" panose="020B0604020202020204" pitchFamily="34" charset="0"/>
+                        <a:buNone/>
+                        <a:tabLst/>
+                        <a:defRPr/>
+                      </a:pPr>
+                      <a:r>
+                        <a:rPr lang="en-US" sz="1000" dirty="0">
+                          <a:latin typeface="Arial" panose="020B0604020202020204" pitchFamily="34" charset="0"/>
+                          <a:cs typeface="Arial" panose="020B0604020202020204" pitchFamily="34" charset="0"/>
+                        </a:rPr>
+                        <a:t>Delays</a:t>
+                      </a:r>
+                    </a:p>
+                  </a:txBody>
+                  <a:tcPr/>
+                </a:tc>
+                <a:tc>
+                  <a:txBody>
+                    <a:bodyPr/>
+                    <a:lstStyle/>
+                    <a:p>
+                      <a:pPr marL="0" marR="0" lvl="0" indent="0" algn="l" defTabSz="914400" rtl="0" eaLnBrk="1" fontAlgn="auto" latinLnBrk="0" hangingPunct="1">
+                        <a:lnSpc>
+                          <a:spcPct val="100000"/>
+                        </a:lnSpc>
+                        <a:spcBef>
+                          <a:spcPts val="0"/>
+                        </a:spcBef>
+                        <a:spcAft>
+                          <a:spcPts val="0"/>
+                        </a:spcAft>
+                        <a:buClrTx/>
+                        <a:buSzTx/>
+                        <a:buFontTx/>
+                        <a:buNone/>
+                        <a:tabLst/>
+                        <a:defRPr/>
+                      </a:pPr>
+                      <a:r>
+                        <a:rPr lang="en-US" sz="1000" dirty="0">
+                          <a:latin typeface="Arial" panose="020B0604020202020204" pitchFamily="34" charset="0"/>
+                          <a:cs typeface="Arial" panose="020B0604020202020204" pitchFamily="34" charset="0"/>
+                        </a:rPr>
+                        <a:t>Number of delayed flights in all US for 20 years and 5 years for </a:t>
+                      </a:r>
+                      <a:r>
+                        <a:rPr lang="en-US" sz="1000" b="1" dirty="0">
+                          <a:latin typeface="Arial" panose="020B0604020202020204" pitchFamily="34" charset="0"/>
+                          <a:cs typeface="Arial" panose="020B0604020202020204" pitchFamily="34" charset="0"/>
+                        </a:rPr>
+                        <a:t>any reason for 5 AIRLINES (total aggregate sum)</a:t>
+                      </a:r>
+                    </a:p>
+                  </a:txBody>
+                  <a:tcPr/>
+                </a:tc>
+                <a:tc>
+                  <a:txBody>
+                    <a:bodyPr/>
+                    <a:lstStyle/>
+                    <a:p>
+                      <a:pPr marL="0" marR="0" lvl="0" indent="0" algn="l" defTabSz="914400" rtl="0" eaLnBrk="1" fontAlgn="auto" latinLnBrk="0" hangingPunct="1">
+                        <a:lnSpc>
+                          <a:spcPct val="100000"/>
+                        </a:lnSpc>
+                        <a:spcBef>
+                          <a:spcPts val="0"/>
+                        </a:spcBef>
+                        <a:spcAft>
+                          <a:spcPts val="0"/>
+                        </a:spcAft>
+                        <a:buClrTx/>
+                        <a:buSzTx/>
+                        <a:buFontTx/>
+                        <a:buNone/>
+                        <a:tabLst/>
+                        <a:defRPr/>
+                      </a:pPr>
+                      <a:r>
+                        <a:rPr lang="en-US" sz="1000" b="1" dirty="0">
+                          <a:latin typeface="Arial" panose="020B0604020202020204" pitchFamily="34" charset="0"/>
+                          <a:cs typeface="Arial" panose="020B0604020202020204" pitchFamily="34" charset="0"/>
+                        </a:rPr>
+                        <a:t>7 – aggregate</a:t>
+                      </a:r>
+                    </a:p>
+                    <a:p>
+                      <a:pPr marL="0" marR="0" lvl="0" indent="0" algn="l" defTabSz="914400" rtl="0" eaLnBrk="1" fontAlgn="auto" latinLnBrk="0" hangingPunct="1">
+                        <a:lnSpc>
+                          <a:spcPct val="100000"/>
+                        </a:lnSpc>
+                        <a:spcBef>
+                          <a:spcPts val="0"/>
+                        </a:spcBef>
+                        <a:spcAft>
+                          <a:spcPts val="0"/>
+                        </a:spcAft>
+                        <a:buClrTx/>
+                        <a:buSzTx/>
+                        <a:buFontTx/>
+                        <a:buNone/>
+                        <a:tabLst/>
+                        <a:defRPr/>
+                      </a:pPr>
+                      <a:r>
+                        <a:rPr lang="en-US" sz="1000" b="1" dirty="0">
+                          <a:latin typeface="Arial" panose="020B0604020202020204" pitchFamily="34" charset="0"/>
+                          <a:cs typeface="Arial" panose="020B0604020202020204" pitchFamily="34" charset="0"/>
+                        </a:rPr>
+                        <a:t>8 – per airline per year</a:t>
+                      </a:r>
+                    </a:p>
+                  </a:txBody>
+                  <a:tcPr/>
+                </a:tc>
+                <a:extLst>
+                  <a:ext uri="{0D108BD9-81ED-4DB2-BD59-A6C34878D82A}">
+                    <a16:rowId xmlns:a16="http://schemas.microsoft.com/office/drawing/2014/main" val="4225425671"/>
+                  </a:ext>
+                </a:extLst>
+              </a:tr>
+              <a:tr h="1810441">
+                <a:tc>
+                  <a:txBody>
+                    <a:bodyPr/>
+                    <a:lstStyle/>
+                    <a:p>
+                      <a:pPr marL="0" marR="0" lvl="0" indent="0" algn="l" defTabSz="914400" rtl="0" eaLnBrk="1" fontAlgn="auto" latinLnBrk="0" hangingPunct="1">
+                        <a:lnSpc>
+                          <a:spcPct val="100000"/>
+                        </a:lnSpc>
+                        <a:spcBef>
+                          <a:spcPts val="0"/>
+                        </a:spcBef>
+                        <a:spcAft>
+                          <a:spcPts val="0"/>
+                        </a:spcAft>
+                        <a:buClrTx/>
+                        <a:buSzTx/>
+                        <a:buFont typeface="Arial" panose="020B0604020202020204" pitchFamily="34" charset="0"/>
+                        <a:buNone/>
+                        <a:tabLst/>
+                        <a:defRPr/>
+                      </a:pPr>
+                      <a:r>
+                        <a:rPr lang="en-US" sz="1000" dirty="0">
+                          <a:latin typeface="Arial" panose="020B0604020202020204" pitchFamily="34" charset="0"/>
+                          <a:cs typeface="Arial" panose="020B0604020202020204" pitchFamily="34" charset="0"/>
+                        </a:rPr>
+                        <a:t>Table 9</a:t>
+                      </a:r>
+                    </a:p>
+                  </a:txBody>
+                  <a:tcPr/>
+                </a:tc>
+                <a:tc>
+                  <a:txBody>
+                    <a:bodyPr/>
+                    <a:lstStyle/>
+                    <a:p>
+                      <a:pPr marL="0" marR="0" lvl="0" indent="0" algn="l" defTabSz="914400" rtl="0" eaLnBrk="1" fontAlgn="auto" latinLnBrk="0" hangingPunct="1">
+                        <a:lnSpc>
+                          <a:spcPct val="100000"/>
+                        </a:lnSpc>
+                        <a:spcBef>
+                          <a:spcPts val="0"/>
+                        </a:spcBef>
+                        <a:spcAft>
+                          <a:spcPts val="0"/>
+                        </a:spcAft>
+                        <a:buClrTx/>
+                        <a:buSzTx/>
+                        <a:buFont typeface="Arial" panose="020B0604020202020204" pitchFamily="34" charset="0"/>
+                        <a:buNone/>
+                        <a:tabLst/>
+                        <a:defRPr/>
+                      </a:pPr>
+                      <a:r>
+                        <a:rPr lang="en-US" sz="1000" dirty="0">
+                          <a:latin typeface="Arial" panose="020B0604020202020204" pitchFamily="34" charset="0"/>
+                          <a:cs typeface="Arial" panose="020B0604020202020204" pitchFamily="34" charset="0"/>
+                        </a:rPr>
+                        <a:t>Delays</a:t>
+                      </a:r>
+                    </a:p>
+                  </a:txBody>
+                  <a:tcPr/>
+                </a:tc>
+                <a:tc>
+                  <a:txBody>
+                    <a:bodyPr/>
+                    <a:lstStyle/>
+                    <a:p>
+                      <a:pPr marL="0" indent="0">
+                        <a:buNone/>
+                      </a:pPr>
+                      <a:r>
+                        <a:rPr lang="en-US" sz="1000" b="1" dirty="0">
+                          <a:highlight>
+                            <a:srgbClr val="FFFF00"/>
+                          </a:highlight>
+                          <a:latin typeface="Arial" panose="020B0604020202020204" pitchFamily="34" charset="0"/>
+                          <a:cs typeface="Arial" panose="020B0604020202020204" pitchFamily="34" charset="0"/>
+                        </a:rPr>
+                        <a:t>Number of delayed flights per airport and airline </a:t>
+                      </a:r>
+                    </a:p>
+                  </a:txBody>
+                  <a:tcPr/>
+                </a:tc>
+                <a:tc>
+                  <a:txBody>
+                    <a:bodyPr/>
+                    <a:lstStyle/>
+                    <a:p>
+                      <a:pPr marL="0" marR="0" lvl="0" indent="0" algn="l" defTabSz="914400" rtl="0" eaLnBrk="1" fontAlgn="auto" latinLnBrk="0" hangingPunct="1">
+                        <a:lnSpc>
+                          <a:spcPct val="100000"/>
+                        </a:lnSpc>
+                        <a:spcBef>
+                          <a:spcPts val="0"/>
+                        </a:spcBef>
+                        <a:spcAft>
+                          <a:spcPts val="0"/>
+                        </a:spcAft>
+                        <a:buClrTx/>
+                        <a:buSzTx/>
+                        <a:buFontTx/>
+                        <a:buNone/>
+                        <a:tabLst/>
+                        <a:defRPr/>
+                      </a:pPr>
+                      <a:r>
+                        <a:rPr lang="en-US" sz="1000" b="1" dirty="0">
+                          <a:latin typeface="Arial" panose="020B0604020202020204" pitchFamily="34" charset="0"/>
+                          <a:cs typeface="Arial" panose="020B0604020202020204" pitchFamily="34" charset="0"/>
+                        </a:rPr>
+                        <a:t>Show weather delays </a:t>
+                      </a:r>
+                      <a:r>
+                        <a:rPr lang="en-US" sz="1000" b="1">
+                          <a:latin typeface="Arial" panose="020B0604020202020204" pitchFamily="34" charset="0"/>
+                          <a:cs typeface="Arial" panose="020B0604020202020204" pitchFamily="34" charset="0"/>
+                        </a:rPr>
+                        <a:t>from Table 12 </a:t>
+                      </a:r>
+                      <a:r>
+                        <a:rPr lang="en-US" sz="1000" b="1" dirty="0">
+                          <a:latin typeface="Arial" panose="020B0604020202020204" pitchFamily="34" charset="0"/>
+                          <a:cs typeface="Arial" panose="020B0604020202020204" pitchFamily="34" charset="0"/>
+                        </a:rPr>
+                        <a:t>over Table 13 as percentage to </a:t>
+                      </a:r>
+                      <a:r>
+                        <a:rPr lang="en-US" sz="1000" b="1">
+                          <a:latin typeface="Arial" panose="020B0604020202020204" pitchFamily="34" charset="0"/>
+                          <a:cs typeface="Arial" panose="020B0604020202020204" pitchFamily="34" charset="0"/>
+                        </a:rPr>
+                        <a:t>total arrival delays</a:t>
+                      </a:r>
+                      <a:endParaRPr lang="en-US" sz="1000" b="1" dirty="0">
+                        <a:latin typeface="Arial" panose="020B0604020202020204" pitchFamily="34" charset="0"/>
+                        <a:cs typeface="Arial" panose="020B0604020202020204" pitchFamily="34" charset="0"/>
+                      </a:endParaRPr>
+                    </a:p>
+                  </a:txBody>
+                  <a:tcPr/>
+                </a:tc>
+                <a:extLst>
+                  <a:ext uri="{0D108BD9-81ED-4DB2-BD59-A6C34878D82A}">
+                    <a16:rowId xmlns:a16="http://schemas.microsoft.com/office/drawing/2014/main" val="395846462"/>
                   </a:ext>
                 </a:extLst>
               </a:tr>
@@ -12238,13 +13281,10 @@
                         <a:tabLst/>
                         <a:defRPr/>
                       </a:pPr>
-                      <a:r>
-                        <a:rPr lang="en-US" sz="1000" dirty="0">
-                          <a:latin typeface="Arial" panose="020B0604020202020204" pitchFamily="34" charset="0"/>
-                          <a:cs typeface="Arial" panose="020B0604020202020204" pitchFamily="34" charset="0"/>
-                        </a:rPr>
-                        <a:t>Delays</a:t>
-                      </a:r>
+                      <a:endParaRPr lang="en-US" sz="1000" dirty="0">
+                        <a:latin typeface="Arial" panose="020B0604020202020204" pitchFamily="34" charset="0"/>
+                        <a:cs typeface="Arial" panose="020B0604020202020204" pitchFamily="34" charset="0"/>
+                      </a:endParaRPr>
                     </a:p>
                   </a:txBody>
                   <a:tcPr/>
@@ -12253,110 +13293,6 @@
                   <a:txBody>
                     <a:bodyPr/>
                     <a:lstStyle/>
-                    <a:p>
-                      <a:pPr marL="0" indent="0">
-                        <a:buNone/>
-                      </a:pPr>
-                      <a:r>
-                        <a:rPr lang="en-US" sz="1000" dirty="0">
-                          <a:highlight>
-                            <a:srgbClr val="FFFF00"/>
-                          </a:highlight>
-                          <a:latin typeface="Arial" panose="020B0604020202020204" pitchFamily="34" charset="0"/>
-                          <a:cs typeface="Arial" panose="020B0604020202020204" pitchFamily="34" charset="0"/>
-                        </a:rPr>
-                        <a:t>Number of delayed, cancelled and diverted flights in all US for 5 years for </a:t>
-                      </a:r>
-                      <a:r>
-                        <a:rPr lang="en-US" sz="1000" b="1" dirty="0">
-                          <a:highlight>
-                            <a:srgbClr val="FFFF00"/>
-                          </a:highlight>
-                          <a:latin typeface="Arial" panose="020B0604020202020204" pitchFamily="34" charset="0"/>
-                          <a:cs typeface="Arial" panose="020B0604020202020204" pitchFamily="34" charset="0"/>
-                        </a:rPr>
-                        <a:t>any reason (arr_del15 from main </a:t>
-                      </a:r>
-                      <a:r>
-                        <a:rPr lang="en-US" sz="1000" b="1" dirty="0" err="1">
-                          <a:highlight>
-                            <a:srgbClr val="FFFF00"/>
-                          </a:highlight>
-                          <a:latin typeface="Arial" panose="020B0604020202020204" pitchFamily="34" charset="0"/>
-                          <a:cs typeface="Arial" panose="020B0604020202020204" pitchFamily="34" charset="0"/>
-                        </a:rPr>
-                        <a:t>df</a:t>
-                      </a:r>
-                      <a:r>
-                        <a:rPr lang="en-US" sz="1000" b="1" dirty="0">
-                          <a:highlight>
-                            <a:srgbClr val="FFFF00"/>
-                          </a:highlight>
-                          <a:latin typeface="Arial" panose="020B0604020202020204" pitchFamily="34" charset="0"/>
-                          <a:cs typeface="Arial" panose="020B0604020202020204" pitchFamily="34" charset="0"/>
-                        </a:rPr>
-                        <a:t>, include the 5 columns with reasons, weather, </a:t>
-                      </a:r>
-                      <a:r>
-                        <a:rPr lang="en-US" sz="1000" b="1" dirty="0" err="1">
-                          <a:highlight>
-                            <a:srgbClr val="FFFF00"/>
-                          </a:highlight>
-                          <a:latin typeface="Arial" panose="020B0604020202020204" pitchFamily="34" charset="0"/>
-                          <a:cs typeface="Arial" panose="020B0604020202020204" pitchFamily="34" charset="0"/>
-                        </a:rPr>
-                        <a:t>nas</a:t>
-                      </a:r>
-                      <a:r>
-                        <a:rPr lang="en-US" sz="1000" b="1" dirty="0">
-                          <a:highlight>
-                            <a:srgbClr val="FFFF00"/>
-                          </a:highlight>
-                          <a:latin typeface="Arial" panose="020B0604020202020204" pitchFamily="34" charset="0"/>
-                          <a:cs typeface="Arial" panose="020B0604020202020204" pitchFamily="34" charset="0"/>
-                        </a:rPr>
-                        <a:t>, </a:t>
-                      </a:r>
-                      <a:r>
-                        <a:rPr lang="en-US" sz="1000" b="1" dirty="0" err="1">
-                          <a:highlight>
-                            <a:srgbClr val="FFFF00"/>
-                          </a:highlight>
-                          <a:latin typeface="Arial" panose="020B0604020202020204" pitchFamily="34" charset="0"/>
-                          <a:cs typeface="Arial" panose="020B0604020202020204" pitchFamily="34" charset="0"/>
-                        </a:rPr>
-                        <a:t>etc</a:t>
-                      </a:r>
-                      <a:r>
-                        <a:rPr lang="en-US" sz="1000" b="1" dirty="0">
-                          <a:highlight>
-                            <a:srgbClr val="FFFF00"/>
-                          </a:highlight>
-                          <a:latin typeface="Arial" panose="020B0604020202020204" pitchFamily="34" charset="0"/>
-                          <a:cs typeface="Arial" panose="020B0604020202020204" pitchFamily="34" charset="0"/>
-                        </a:rPr>
-                        <a:t>)</a:t>
-                      </a:r>
-                    </a:p>
-                    <a:p>
-                      <a:pPr marL="0" indent="0">
-                        <a:buNone/>
-                      </a:pPr>
-                      <a:r>
-                        <a:rPr lang="en-US" sz="1000" dirty="0">
-                          <a:latin typeface="Arial" panose="020B0604020202020204" pitchFamily="34" charset="0"/>
-                          <a:cs typeface="Arial" panose="020B0604020202020204" pitchFamily="34" charset="0"/>
-                        </a:rPr>
-                        <a:t>Number of delayed flights in all US for 5 years for </a:t>
-                      </a:r>
-                      <a:r>
-                        <a:rPr lang="en-US" sz="1000" b="1" dirty="0">
-                          <a:latin typeface="Arial" panose="020B0604020202020204" pitchFamily="34" charset="0"/>
-                          <a:cs typeface="Arial" panose="020B0604020202020204" pitchFamily="34" charset="0"/>
-                        </a:rPr>
-                        <a:t>any reason for 5 AIRLINES </a:t>
-                      </a:r>
-                    </a:p>
                     <a:p>
                       <a:pPr marL="0" indent="0">
                         <a:buNone/>
@@ -15794,7 +16730,7 @@
                     <a:p>
                       <a:pPr algn="ctr" rtl="0" fontAlgn="ctr"/>
                       <a:r>
-                        <a:rPr lang="en-US" sz="1400" b="0" i="0" u="none" strike="noStrike">
+                        <a:rPr lang="en-US" sz="1400" b="0" i="0" u="none" strike="noStrike" dirty="0">
                           <a:solidFill>
                             <a:srgbClr val="000000"/>
                           </a:solidFill>
@@ -15981,7 +16917,7 @@
                     <a:p>
                       <a:pPr algn="ctr" rtl="0" fontAlgn="ctr"/>
                       <a:r>
-                        <a:rPr lang="en-US" sz="1400" b="0" i="0" u="none" strike="noStrike">
+                        <a:rPr lang="en-US" sz="1400" b="0" i="0" u="none" strike="noStrike" dirty="0">
                           <a:solidFill>
                             <a:srgbClr val="000000"/>
                           </a:solidFill>
@@ -16168,7 +17104,7 @@
                     <a:p>
                       <a:pPr algn="ctr" rtl="0" fontAlgn="ctr"/>
                       <a:r>
-                        <a:rPr lang="en-US" sz="1400" b="0" i="0" u="none" strike="noStrike">
+                        <a:rPr lang="en-US" sz="1400" b="0" i="0" u="none" strike="noStrike" dirty="0">
                           <a:solidFill>
                             <a:srgbClr val="000000"/>
                           </a:solidFill>
@@ -16195,7 +17131,7 @@
                     <a:p>
                       <a:pPr algn="l" rtl="0" fontAlgn="ctr"/>
                       <a:r>
-                        <a:rPr lang="en-US" sz="1400" b="0" i="0" u="none" strike="noStrike">
+                        <a:rPr lang="en-US" sz="1400" b="0" i="0" u="none" strike="noStrike" dirty="0">
                           <a:solidFill>
                             <a:srgbClr val="000000"/>
                           </a:solidFill>
@@ -16255,7 +17191,7 @@
                     <a:p>
                       <a:pPr algn="ctr" rtl="0" fontAlgn="ctr"/>
                       <a:r>
-                        <a:rPr lang="en-US" sz="1400" b="0" i="0" u="none" strike="noStrike">
+                        <a:rPr lang="en-US" sz="1400" b="0" i="0" u="none" strike="noStrike" dirty="0">
                           <a:solidFill>
                             <a:srgbClr val="000000"/>
                           </a:solidFill>
@@ -16315,7 +17251,7 @@
                     <a:p>
                       <a:pPr algn="ctr" rtl="0" fontAlgn="ctr"/>
                       <a:r>
-                        <a:rPr lang="en-US" sz="1400" b="0" i="0" u="none" strike="noStrike">
+                        <a:rPr lang="en-US" sz="1400" b="0" i="0" u="none" strike="noStrike" dirty="0">
                           <a:solidFill>
                             <a:srgbClr val="000000"/>
                           </a:solidFill>
@@ -16335,7 +17271,7 @@
                     <a:p>
                       <a:pPr algn="ctr" rtl="0" fontAlgn="ctr"/>
                       <a:r>
-                        <a:rPr lang="en-US" sz="1400" b="0" i="0" u="none" strike="noStrike">
+                        <a:rPr lang="en-US" sz="1400" b="0" i="0" u="none" strike="noStrike" dirty="0">
                           <a:solidFill>
                             <a:srgbClr val="000000"/>
                           </a:solidFill>
@@ -16355,7 +17291,7 @@
                     <a:p>
                       <a:pPr algn="ctr" rtl="0" fontAlgn="ctr"/>
                       <a:r>
-                        <a:rPr lang="en-US" sz="1400" b="0" i="0" u="none" strike="noStrike">
+                        <a:rPr lang="en-US" sz="1400" b="0" i="0" u="none" strike="noStrike" dirty="0">
                           <a:solidFill>
                             <a:srgbClr val="000000"/>
                           </a:solidFill>
@@ -16442,7 +17378,7 @@
                     <a:p>
                       <a:pPr algn="ctr" rtl="0" fontAlgn="ctr"/>
                       <a:r>
-                        <a:rPr lang="en-US" sz="1400" b="0" i="0" u="none" strike="noStrike">
+                        <a:rPr lang="en-US" sz="1400" b="0" i="0" u="none" strike="noStrike" dirty="0">
                           <a:solidFill>
                             <a:srgbClr val="000000"/>
                           </a:solidFill>
@@ -16462,7 +17398,7 @@
                     <a:p>
                       <a:pPr algn="ctr" fontAlgn="t"/>
                       <a:r>
-                        <a:rPr lang="en-US" sz="1800" b="0" i="0" u="none" strike="noStrike">
+                        <a:rPr lang="en-US" sz="1800" b="0" i="0" u="none" strike="noStrike" dirty="0">
                           <a:solidFill>
                             <a:srgbClr val="000000"/>
                           </a:solidFill>
@@ -16482,7 +17418,7 @@
                     <a:p>
                       <a:pPr algn="ctr" fontAlgn="t"/>
                       <a:r>
-                        <a:rPr lang="en-US" sz="1800" b="0" i="0" u="none" strike="noStrike">
+                        <a:rPr lang="en-US" sz="1800" b="0" i="0" u="none" strike="noStrike" dirty="0">
                           <a:solidFill>
                             <a:srgbClr val="000000"/>
                           </a:solidFill>
@@ -16669,7 +17605,7 @@
                     <a:p>
                       <a:pPr algn="ctr" fontAlgn="t"/>
                       <a:r>
-                        <a:rPr lang="en-US" sz="1800" b="0" i="0" u="none" strike="noStrike">
+                        <a:rPr lang="en-US" sz="1800" b="0" i="0" u="none" strike="noStrike" dirty="0">
                           <a:solidFill>
                             <a:srgbClr val="000000"/>
                           </a:solidFill>
@@ -17230,7 +18166,7 @@
                     <a:p>
                       <a:pPr algn="ctr" rtl="0" fontAlgn="ctr"/>
                       <a:r>
-                        <a:rPr lang="en-US" sz="1400" b="0" i="0" u="none" strike="noStrike">
+                        <a:rPr lang="en-US" sz="1400" b="0" i="0" u="none" strike="noStrike" dirty="0">
                           <a:solidFill>
                             <a:srgbClr val="000000"/>
                           </a:solidFill>

</xml_diff>